<commit_message>
Presentation ### Changes - More or less 'completed' the powerpoint
### Todo
- Add considerations for comparing optimiser types
</commit_message>
<xml_diff>
--- a/P2963116/P2963116_ppt.pptx
+++ b/P2963116/P2963116_ppt.pptx
@@ -7,13 +7,16 @@
   <p:sldIdLst>
     <p:sldId id="256" r:id="rId2"/>
     <p:sldId id="257" r:id="rId3"/>
-    <p:sldId id="258" r:id="rId4"/>
+    <p:sldId id="265" r:id="rId4"/>
     <p:sldId id="259" r:id="rId5"/>
-    <p:sldId id="260" r:id="rId6"/>
-    <p:sldId id="261" r:id="rId7"/>
-    <p:sldId id="262" r:id="rId8"/>
-    <p:sldId id="263" r:id="rId9"/>
-    <p:sldId id="264" r:id="rId10"/>
+    <p:sldId id="269" r:id="rId6"/>
+    <p:sldId id="258" r:id="rId7"/>
+    <p:sldId id="267" r:id="rId8"/>
+    <p:sldId id="268" r:id="rId9"/>
+    <p:sldId id="262" r:id="rId10"/>
+    <p:sldId id="264" r:id="rId11"/>
+    <p:sldId id="270" r:id="rId12"/>
+    <p:sldId id="260" r:id="rId13"/>
   </p:sldIdLst>
   <p:sldSz cx="12192000" cy="6858000"/>
   <p:notesSz cx="6858000" cy="9144000"/>
@@ -112,6 +115,11 @@
       </a:defRPr>
     </a:lvl9pPr>
   </p:defaultTextStyle>
+  <p:extLst>
+    <p:ext uri="{EFAFB233-063F-42B5-8137-9DF3F51BA10A}">
+      <p15:sldGuideLst xmlns:p15="http://schemas.microsoft.com/office/powerpoint/2012/main"/>
+    </p:ext>
+  </p:extLst>
 </p:presentation>
 </file>
 
@@ -284,7 +292,7 @@
           <a:p>
             <a:fld id="{4A62E54F-74CC-41CA-B59D-BE68632D6B50}" type="datetimeFigureOut">
               <a:rPr kumimoji="1" lang="ja-JP" altLang="en-US" smtClean="0"/>
-              <a:t>2025/10/28</a:t>
+              <a:t>2025/10/29</a:t>
             </a:fld>
             <a:endParaRPr kumimoji="1" lang="ja-JP" altLang="en-US"/>
           </a:p>
@@ -427,6 +435,13 @@
               <a:tailEnd/>
             </a:ln>
           </p:spPr>
+          <p:txBody>
+            <a:bodyPr/>
+            <a:lstStyle/>
+            <a:p>
+              <a:endParaRPr lang="ja-JP" altLang="en-US"/>
+            </a:p>
+          </p:txBody>
         </p:sp>
         <p:sp>
           <p:nvSpPr>
@@ -485,6 +500,13 @@
               <a:tailEnd/>
             </a:ln>
           </p:spPr>
+          <p:txBody>
+            <a:bodyPr/>
+            <a:lstStyle/>
+            <a:p>
+              <a:endParaRPr lang="ja-JP" altLang="en-US"/>
+            </a:p>
+          </p:txBody>
         </p:sp>
       </p:grpSp>
     </p:spTree>
@@ -646,7 +668,7 @@
           <a:p>
             <a:fld id="{4A62E54F-74CC-41CA-B59D-BE68632D6B50}" type="datetimeFigureOut">
               <a:rPr kumimoji="1" lang="ja-JP" altLang="en-US" smtClean="0"/>
-              <a:t>2025/10/28</a:t>
+              <a:t>2025/10/29</a:t>
             </a:fld>
             <a:endParaRPr kumimoji="1" lang="ja-JP" altLang="en-US"/>
           </a:p>
@@ -858,7 +880,7 @@
           <a:p>
             <a:fld id="{4A62E54F-74CC-41CA-B59D-BE68632D6B50}" type="datetimeFigureOut">
               <a:rPr kumimoji="1" lang="ja-JP" altLang="en-US" smtClean="0"/>
-              <a:t>2025/10/28</a:t>
+              <a:t>2025/10/29</a:t>
             </a:fld>
             <a:endParaRPr kumimoji="1" lang="ja-JP" altLang="en-US"/>
           </a:p>
@@ -1060,7 +1082,7 @@
           <a:p>
             <a:fld id="{4A62E54F-74CC-41CA-B59D-BE68632D6B50}" type="datetimeFigureOut">
               <a:rPr kumimoji="1" lang="ja-JP" altLang="en-US" smtClean="0"/>
-              <a:t>2025/10/28</a:t>
+              <a:t>2025/10/29</a:t>
             </a:fld>
             <a:endParaRPr kumimoji="1" lang="ja-JP" altLang="en-US"/>
           </a:p>
@@ -1337,7 +1359,7 @@
           <a:p>
             <a:fld id="{4A62E54F-74CC-41CA-B59D-BE68632D6B50}" type="datetimeFigureOut">
               <a:rPr kumimoji="1" lang="ja-JP" altLang="en-US" smtClean="0"/>
-              <a:t>2025/10/28</a:t>
+              <a:t>2025/10/29</a:t>
             </a:fld>
             <a:endParaRPr kumimoji="1" lang="ja-JP" altLang="en-US"/>
           </a:p>
@@ -1795,7 +1817,7 @@
           <a:p>
             <a:fld id="{4A62E54F-74CC-41CA-B59D-BE68632D6B50}" type="datetimeFigureOut">
               <a:rPr kumimoji="1" lang="ja-JP" altLang="en-US" smtClean="0"/>
-              <a:t>2025/10/28</a:t>
+              <a:t>2025/10/29</a:t>
             </a:fld>
             <a:endParaRPr kumimoji="1" lang="ja-JP" altLang="en-US"/>
           </a:p>
@@ -2336,7 +2358,7 @@
           <a:p>
             <a:fld id="{4A62E54F-74CC-41CA-B59D-BE68632D6B50}" type="datetimeFigureOut">
               <a:rPr kumimoji="1" lang="ja-JP" altLang="en-US" smtClean="0"/>
-              <a:t>2025/10/28</a:t>
+              <a:t>2025/10/29</a:t>
             </a:fld>
             <a:endParaRPr kumimoji="1" lang="ja-JP" altLang="en-US"/>
           </a:p>
@@ -2454,7 +2476,7 @@
           <a:p>
             <a:fld id="{4A62E54F-74CC-41CA-B59D-BE68632D6B50}" type="datetimeFigureOut">
               <a:rPr kumimoji="1" lang="ja-JP" altLang="en-US" smtClean="0"/>
-              <a:t>2025/10/28</a:t>
+              <a:t>2025/10/29</a:t>
             </a:fld>
             <a:endParaRPr kumimoji="1" lang="ja-JP" altLang="en-US"/>
           </a:p>
@@ -2549,7 +2571,7 @@
           <a:p>
             <a:fld id="{4A62E54F-74CC-41CA-B59D-BE68632D6B50}" type="datetimeFigureOut">
               <a:rPr kumimoji="1" lang="ja-JP" altLang="en-US" smtClean="0"/>
-              <a:t>2025/10/28</a:t>
+              <a:t>2025/10/29</a:t>
             </a:fld>
             <a:endParaRPr kumimoji="1" lang="ja-JP" altLang="en-US"/>
           </a:p>
@@ -2927,7 +2949,7 @@
           <a:p>
             <a:fld id="{4A62E54F-74CC-41CA-B59D-BE68632D6B50}" type="datetimeFigureOut">
               <a:rPr kumimoji="1" lang="ja-JP" altLang="en-US" smtClean="0"/>
-              <a:t>2025/10/28</a:t>
+              <a:t>2025/10/29</a:t>
             </a:fld>
             <a:endParaRPr kumimoji="1" lang="ja-JP" altLang="en-US"/>
           </a:p>
@@ -3315,7 +3337,7 @@
           <a:p>
             <a:fld id="{4A62E54F-74CC-41CA-B59D-BE68632D6B50}" type="datetimeFigureOut">
               <a:rPr kumimoji="1" lang="ja-JP" altLang="en-US" smtClean="0"/>
-              <a:t>2025/10/28</a:t>
+              <a:t>2025/10/29</a:t>
             </a:fld>
             <a:endParaRPr kumimoji="1" lang="ja-JP" altLang="en-US"/>
           </a:p>
@@ -3625,7 +3647,7 @@
           <a:p>
             <a:fld id="{4A62E54F-74CC-41CA-B59D-BE68632D6B50}" type="datetimeFigureOut">
               <a:rPr kumimoji="1" lang="ja-JP" altLang="en-US" smtClean="0"/>
-              <a:t>2025/10/28</a:t>
+              <a:t>2025/10/29</a:t>
             </a:fld>
             <a:endParaRPr kumimoji="1" lang="ja-JP" altLang="en-US"/>
           </a:p>
@@ -3742,6 +3764,13 @@
             <a:schemeClr val="lt1"/>
           </a:fontRef>
         </p:style>
+        <p:txBody>
+          <a:bodyPr/>
+          <a:lstStyle/>
+          <a:p>
+            <a:endParaRPr lang="ja-JP" altLang="en-US"/>
+          </a:p>
+        </p:txBody>
       </p:sp>
     </p:spTree>
     <p:extLst>
@@ -4485,7 +4514,7 @@
 </p:sld>
 </file>
 
-<file path=ppt/slides/slide2.xml><?xml version="1.0" encoding="utf-8"?>
+<file path=ppt/slides/slide10.xml><?xml version="1.0" encoding="utf-8"?>
 <p:sld xmlns:a="http://schemas.openxmlformats.org/drawingml/2006/main" xmlns:r="http://schemas.openxmlformats.org/officeDocument/2006/relationships" xmlns:p="http://schemas.openxmlformats.org/presentationml/2006/main">
   <p:cSld>
     <p:spTree>
@@ -4507,6 +4536,380 @@
           <p:cNvPr id="2" name="タイトル 1">
             <a:extLst>
               <a:ext uri="{FF2B5EF4-FFF2-40B4-BE49-F238E27FC236}">
+                <a16:creationId xmlns:a16="http://schemas.microsoft.com/office/drawing/2014/main" id="{43273D1C-8DF5-9BC7-395C-19AEFCD4C743}"/>
+              </a:ext>
+            </a:extLst>
+          </p:cNvPr>
+          <p:cNvSpPr>
+            <a:spLocks noGrp="1"/>
+          </p:cNvSpPr>
+          <p:nvPr>
+            <p:ph type="title"/>
+          </p:nvPr>
+        </p:nvSpPr>
+        <p:spPr/>
+        <p:txBody>
+          <a:bodyPr/>
+          <a:lstStyle/>
+          <a:p>
+            <a:r>
+              <a:rPr lang="en-US" altLang="ja-JP" dirty="0"/>
+              <a:t>Hyperparameters</a:t>
+            </a:r>
+            <a:endParaRPr kumimoji="1" lang="ja-JP" altLang="en-US" dirty="0"/>
+          </a:p>
+        </p:txBody>
+      </p:sp>
+      <p:sp>
+        <p:nvSpPr>
+          <p:cNvPr id="3" name="コンテンツ プレースホルダー 2">
+            <a:extLst>
+              <a:ext uri="{FF2B5EF4-FFF2-40B4-BE49-F238E27FC236}">
+                <a16:creationId xmlns:a16="http://schemas.microsoft.com/office/drawing/2014/main" id="{17A2C808-DADE-6C6C-80CC-E55857884A4F}"/>
+              </a:ext>
+            </a:extLst>
+          </p:cNvPr>
+          <p:cNvSpPr>
+            <a:spLocks noGrp="1"/>
+          </p:cNvSpPr>
+          <p:nvPr>
+            <p:ph idx="1"/>
+          </p:nvPr>
+        </p:nvSpPr>
+        <p:spPr/>
+        <p:txBody>
+          <a:bodyPr/>
+          <a:lstStyle/>
+          <a:p>
+            <a:r>
+              <a:rPr kumimoji="1" lang="en-US" altLang="ja-JP" dirty="0"/>
+              <a:t>SGD vs Adam</a:t>
+            </a:r>
+          </a:p>
+          <a:p>
+            <a:r>
+              <a:rPr lang="en-US" altLang="ja-JP" dirty="0"/>
+              <a:t>Epochs and learning rate</a:t>
+            </a:r>
+          </a:p>
+          <a:p>
+            <a:r>
+              <a:rPr lang="en-US" altLang="ja-JP" dirty="0"/>
+              <a:t>Criterion/Activation – </a:t>
+            </a:r>
+            <a:r>
+              <a:rPr lang="en-US" altLang="ja-JP" dirty="0" err="1"/>
+              <a:t>NLLLoss</a:t>
+            </a:r>
+            <a:r>
+              <a:rPr lang="en-US" altLang="ja-JP" dirty="0"/>
+              <a:t> and Log </a:t>
+            </a:r>
+            <a:r>
+              <a:rPr lang="en-US" altLang="ja-JP" dirty="0" err="1"/>
+              <a:t>Softmax</a:t>
+            </a:r>
+            <a:endParaRPr lang="en-US" altLang="ja-JP" dirty="0"/>
+          </a:p>
+        </p:txBody>
+      </p:sp>
+    </p:spTree>
+    <p:extLst>
+      <p:ext uri="{BB962C8B-B14F-4D97-AF65-F5344CB8AC3E}">
+        <p14:creationId xmlns:p14="http://schemas.microsoft.com/office/powerpoint/2010/main" val="1025219748"/>
+      </p:ext>
+    </p:extLst>
+  </p:cSld>
+  <p:clrMapOvr>
+    <a:masterClrMapping/>
+  </p:clrMapOvr>
+</p:sld>
+</file>
+
+<file path=ppt/slides/slide11.xml><?xml version="1.0" encoding="utf-8"?>
+<p:sld xmlns:a="http://schemas.openxmlformats.org/drawingml/2006/main" xmlns:r="http://schemas.openxmlformats.org/officeDocument/2006/relationships" xmlns:p="http://schemas.openxmlformats.org/presentationml/2006/main">
+  <p:cSld>
+    <p:spTree>
+      <p:nvGrpSpPr>
+        <p:cNvPr id="1" name=""/>
+        <p:cNvGrpSpPr/>
+        <p:nvPr/>
+      </p:nvGrpSpPr>
+      <p:grpSpPr>
+        <a:xfrm>
+          <a:off x="0" y="0"/>
+          <a:ext cx="0" cy="0"/>
+          <a:chOff x="0" y="0"/>
+          <a:chExt cx="0" cy="0"/>
+        </a:xfrm>
+      </p:grpSpPr>
+      <p:sp>
+        <p:nvSpPr>
+          <p:cNvPr id="2" name="タイトル 1">
+            <a:extLst>
+              <a:ext uri="{FF2B5EF4-FFF2-40B4-BE49-F238E27FC236}">
+                <a16:creationId xmlns:a16="http://schemas.microsoft.com/office/drawing/2014/main" id="{46EE35D0-1436-B1E0-0822-335CACCB1E3E}"/>
+              </a:ext>
+            </a:extLst>
+          </p:cNvPr>
+          <p:cNvSpPr>
+            <a:spLocks noGrp="1"/>
+          </p:cNvSpPr>
+          <p:nvPr>
+            <p:ph type="title"/>
+          </p:nvPr>
+        </p:nvSpPr>
+        <p:spPr/>
+        <p:txBody>
+          <a:bodyPr/>
+          <a:lstStyle/>
+          <a:p>
+            <a:r>
+              <a:rPr kumimoji="1" lang="en-US" altLang="ja-JP" dirty="0" err="1"/>
+              <a:t>Optimiser</a:t>
+            </a:r>
+            <a:r>
+              <a:rPr kumimoji="1" lang="en-US" altLang="ja-JP" dirty="0"/>
+              <a:t> Comparison</a:t>
+            </a:r>
+            <a:endParaRPr kumimoji="1" lang="ja-JP" altLang="en-US" dirty="0"/>
+          </a:p>
+        </p:txBody>
+      </p:sp>
+      <p:sp>
+        <p:nvSpPr>
+          <p:cNvPr id="3" name="コンテンツ プレースホルダー 2">
+            <a:extLst>
+              <a:ext uri="{FF2B5EF4-FFF2-40B4-BE49-F238E27FC236}">
+                <a16:creationId xmlns:a16="http://schemas.microsoft.com/office/drawing/2014/main" id="{61A88A68-9D7E-59D9-C730-272DA5A36964}"/>
+              </a:ext>
+            </a:extLst>
+          </p:cNvPr>
+          <p:cNvSpPr>
+            <a:spLocks noGrp="1"/>
+          </p:cNvSpPr>
+          <p:nvPr>
+            <p:ph idx="1"/>
+          </p:nvPr>
+        </p:nvSpPr>
+        <p:spPr/>
+        <p:txBody>
+          <a:bodyPr/>
+          <a:lstStyle/>
+          <a:p>
+            <a:endParaRPr kumimoji="1" lang="ja-JP" altLang="en-US" dirty="0"/>
+          </a:p>
+        </p:txBody>
+      </p:sp>
+    </p:spTree>
+    <p:extLst>
+      <p:ext uri="{BB962C8B-B14F-4D97-AF65-F5344CB8AC3E}">
+        <p14:creationId xmlns:p14="http://schemas.microsoft.com/office/powerpoint/2010/main" val="936852346"/>
+      </p:ext>
+    </p:extLst>
+  </p:cSld>
+  <p:clrMapOvr>
+    <a:masterClrMapping/>
+  </p:clrMapOvr>
+</p:sld>
+</file>
+
+<file path=ppt/slides/slide12.xml><?xml version="1.0" encoding="utf-8"?>
+<p:sld xmlns:a="http://schemas.openxmlformats.org/drawingml/2006/main" xmlns:r="http://schemas.openxmlformats.org/officeDocument/2006/relationships" xmlns:p="http://schemas.openxmlformats.org/presentationml/2006/main">
+  <p:cSld>
+    <p:spTree>
+      <p:nvGrpSpPr>
+        <p:cNvPr id="1" name=""/>
+        <p:cNvGrpSpPr/>
+        <p:nvPr/>
+      </p:nvGrpSpPr>
+      <p:grpSpPr>
+        <a:xfrm>
+          <a:off x="0" y="0"/>
+          <a:ext cx="0" cy="0"/>
+          <a:chOff x="0" y="0"/>
+          <a:chExt cx="0" cy="0"/>
+        </a:xfrm>
+      </p:grpSpPr>
+      <p:sp>
+        <p:nvSpPr>
+          <p:cNvPr id="2" name="タイトル 1">
+            <a:extLst>
+              <a:ext uri="{FF2B5EF4-FFF2-40B4-BE49-F238E27FC236}">
+                <a16:creationId xmlns:a16="http://schemas.microsoft.com/office/drawing/2014/main" id="{0B7B0D47-A7D7-5539-5F46-80293CE0745C}"/>
+              </a:ext>
+            </a:extLst>
+          </p:cNvPr>
+          <p:cNvSpPr>
+            <a:spLocks noGrp="1"/>
+          </p:cNvSpPr>
+          <p:nvPr>
+            <p:ph type="title"/>
+          </p:nvPr>
+        </p:nvSpPr>
+        <p:spPr/>
+        <p:txBody>
+          <a:bodyPr/>
+          <a:lstStyle/>
+          <a:p>
+            <a:r>
+              <a:rPr lang="en-US" altLang="ja-JP" dirty="0"/>
+              <a:t>Other ways to mitigate overfitting</a:t>
+            </a:r>
+            <a:endParaRPr kumimoji="1" lang="ja-JP" altLang="en-US" dirty="0"/>
+          </a:p>
+        </p:txBody>
+      </p:sp>
+      <p:sp>
+        <p:nvSpPr>
+          <p:cNvPr id="3" name="コンテンツ プレースホルダー 2">
+            <a:extLst>
+              <a:ext uri="{FF2B5EF4-FFF2-40B4-BE49-F238E27FC236}">
+                <a16:creationId xmlns:a16="http://schemas.microsoft.com/office/drawing/2014/main" id="{847A6AEA-C476-27F1-905F-90747AFA9557}"/>
+              </a:ext>
+            </a:extLst>
+          </p:cNvPr>
+          <p:cNvSpPr>
+            <a:spLocks noGrp="1"/>
+          </p:cNvSpPr>
+          <p:nvPr>
+            <p:ph idx="1"/>
+          </p:nvPr>
+        </p:nvSpPr>
+        <p:spPr/>
+        <p:txBody>
+          <a:bodyPr/>
+          <a:lstStyle/>
+          <a:p>
+            <a:r>
+              <a:rPr kumimoji="1" lang="en-US" altLang="ja-JP" dirty="0"/>
+              <a:t>Data augmentation</a:t>
+            </a:r>
+          </a:p>
+          <a:p>
+            <a:r>
+              <a:rPr lang="en-US" altLang="ja-JP" dirty="0" err="1"/>
+              <a:t>Regularisation</a:t>
+            </a:r>
+            <a:r>
+              <a:rPr lang="en-US" altLang="ja-JP" dirty="0"/>
+              <a:t> </a:t>
+            </a:r>
+          </a:p>
+          <a:p>
+            <a:r>
+              <a:rPr kumimoji="1" lang="en-US" altLang="ja-JP" dirty="0"/>
+              <a:t>Early stopping</a:t>
+            </a:r>
+            <a:endParaRPr kumimoji="1" lang="ja-JP" altLang="en-US" dirty="0"/>
+          </a:p>
+        </p:txBody>
+      </p:sp>
+    </p:spTree>
+    <p:extLst>
+      <p:ext uri="{BB962C8B-B14F-4D97-AF65-F5344CB8AC3E}">
+        <p14:creationId xmlns:p14="http://schemas.microsoft.com/office/powerpoint/2010/main" val="3471478476"/>
+      </p:ext>
+    </p:extLst>
+  </p:cSld>
+  <p:clrMapOvr>
+    <a:masterClrMapping/>
+  </p:clrMapOvr>
+</p:sld>
+</file>
+
+<file path=ppt/slides/slide2.xml><?xml version="1.0" encoding="utf-8"?>
+<p:sld xmlns:a="http://schemas.openxmlformats.org/drawingml/2006/main" xmlns:r="http://schemas.openxmlformats.org/officeDocument/2006/relationships" xmlns:p="http://schemas.openxmlformats.org/presentationml/2006/main">
+  <p:cSld>
+    <p:bg>
+      <p:bgPr>
+        <a:solidFill>
+          <a:schemeClr val="bg2"/>
+        </a:solidFill>
+        <a:effectLst/>
+      </p:bgPr>
+    </p:bg>
+    <p:spTree>
+      <p:nvGrpSpPr>
+        <p:cNvPr id="1" name=""/>
+        <p:cNvGrpSpPr/>
+        <p:nvPr/>
+      </p:nvGrpSpPr>
+      <p:grpSpPr>
+        <a:xfrm>
+          <a:off x="0" y="0"/>
+          <a:ext cx="0" cy="0"/>
+          <a:chOff x="0" y="0"/>
+          <a:chExt cx="0" cy="0"/>
+        </a:xfrm>
+      </p:grpSpPr>
+      <p:sp>
+        <p:nvSpPr>
+          <p:cNvPr id="16" name="Rectangle 15">
+            <a:extLst>
+              <a:ext uri="{FF2B5EF4-FFF2-40B4-BE49-F238E27FC236}">
+                <a16:creationId xmlns:a16="http://schemas.microsoft.com/office/drawing/2014/main" id="{0F90CED2-72DA-49F5-8068-294F7EEF1388}"/>
+              </a:ext>
+              <a:ext uri="{C183D7F6-B498-43B3-948B-1728B52AA6E4}">
+                <adec:decorative xmlns:adec="http://schemas.microsoft.com/office/drawing/2017/decorative" val="1"/>
+              </a:ext>
+            </a:extLst>
+          </p:cNvPr>
+          <p:cNvSpPr>
+            <a:spLocks noGrp="1" noRot="1" noChangeAspect="1" noMove="1" noResize="1" noEditPoints="1" noAdjustHandles="1" noChangeArrowheads="1" noChangeShapeType="1" noTextEdit="1"/>
+          </p:cNvSpPr>
+          <p:nvPr>
+            <p:extLst>
+              <p:ext uri="{386F3935-93C4-4BCD-93E2-E3B085C9AB24}">
+                <p16:designElem xmlns:p16="http://schemas.microsoft.com/office/powerpoint/2015/main" val="1"/>
+              </p:ext>
+            </p:extLst>
+          </p:nvPr>
+        </p:nvSpPr>
+        <p:spPr>
+          <a:xfrm>
+            <a:off x="478095" y="376"/>
+            <a:ext cx="228600" cy="6858000"/>
+          </a:xfrm>
+          <a:prstGeom prst="rect">
+            <a:avLst/>
+          </a:prstGeom>
+          <a:solidFill>
+            <a:schemeClr val="tx2"/>
+          </a:solidFill>
+          <a:ln>
+            <a:noFill/>
+          </a:ln>
+        </p:spPr>
+        <p:style>
+          <a:lnRef idx="2">
+            <a:schemeClr val="accent1">
+              <a:shade val="50000"/>
+            </a:schemeClr>
+          </a:lnRef>
+          <a:fillRef idx="1">
+            <a:schemeClr val="accent1"/>
+          </a:fillRef>
+          <a:effectRef idx="0">
+            <a:schemeClr val="accent1"/>
+          </a:effectRef>
+          <a:fontRef idx="minor">
+            <a:schemeClr val="lt1"/>
+          </a:fontRef>
+        </p:style>
+        <p:txBody>
+          <a:bodyPr/>
+          <a:lstStyle/>
+          <a:p>
+            <a:endParaRPr lang="ja-JP" altLang="en-US"/>
+          </a:p>
+        </p:txBody>
+      </p:sp>
+      <p:sp>
+        <p:nvSpPr>
+          <p:cNvPr id="2" name="タイトル 1">
+            <a:extLst>
+              <a:ext uri="{FF2B5EF4-FFF2-40B4-BE49-F238E27FC236}">
                 <a16:creationId xmlns:a16="http://schemas.microsoft.com/office/drawing/2014/main" id="{E39B7154-1B52-C5DA-8E68-E30940BDB3A7}"/>
               </a:ext>
             </a:extLst>
@@ -4518,44 +4921,536 @@
             <p:ph type="title"/>
           </p:nvPr>
         </p:nvSpPr>
-        <p:spPr/>
+        <p:spPr>
+          <a:xfrm>
+            <a:off x="1371600" y="685800"/>
+            <a:ext cx="9601200" cy="1485900"/>
+          </a:xfrm>
+        </p:spPr>
         <p:txBody>
-          <a:bodyPr/>
+          <a:bodyPr vert="horz" lIns="91440" tIns="45720" rIns="91440" bIns="45720" rtlCol="0" anchor="t">
+            <a:normAutofit/>
+          </a:bodyPr>
           <a:lstStyle/>
           <a:p>
             <a:r>
               <a:rPr kumimoji="1" lang="en-US" altLang="ja-JP" dirty="0"/>
               <a:t>ANN Architecture</a:t>
             </a:r>
-            <a:endParaRPr kumimoji="1" lang="ja-JP" altLang="en-US" dirty="0"/>
+            <a:endParaRPr kumimoji="1" lang="en-US" altLang="ja-JP"/>
           </a:p>
         </p:txBody>
       </p:sp>
-      <p:sp>
-        <p:nvSpPr>
-          <p:cNvPr id="3" name="コンテンツ プレースホルダー 2">
+      <p:graphicFrame>
+        <p:nvGraphicFramePr>
+          <p:cNvPr id="13" name="コンテンツ プレースホルダー 3">
             <a:extLst>
               <a:ext uri="{FF2B5EF4-FFF2-40B4-BE49-F238E27FC236}">
-                <a16:creationId xmlns:a16="http://schemas.microsoft.com/office/drawing/2014/main" id="{4367E656-C652-67B5-4794-38DBDE5A5484}"/>
+                <a16:creationId xmlns:a16="http://schemas.microsoft.com/office/drawing/2014/main" id="{97109025-F990-A6B3-9CCB-69DFA8790344}"/>
               </a:ext>
             </a:extLst>
           </p:cNvPr>
-          <p:cNvSpPr>
-            <a:spLocks noGrp="1"/>
-          </p:cNvSpPr>
-          <p:nvPr>
-            <p:ph idx="1"/>
-          </p:nvPr>
-        </p:nvSpPr>
-        <p:spPr/>
-        <p:txBody>
-          <a:bodyPr/>
-          <a:lstStyle/>
-          <a:p>
-            <a:endParaRPr kumimoji="1" lang="ja-JP" altLang="en-US" dirty="0"/>
-          </a:p>
-        </p:txBody>
-      </p:sp>
+          <p:cNvGraphicFramePr>
+            <a:graphicFrameLocks noGrp="1"/>
+          </p:cNvGraphicFramePr>
+          <p:nvPr>
+            <p:ph sz="half" idx="1"/>
+            <p:extLst>
+              <p:ext uri="{D42A27DB-BD31-4B8C-83A1-F6EECF244321}">
+                <p14:modId xmlns:p14="http://schemas.microsoft.com/office/powerpoint/2010/main" val="2440605440"/>
+              </p:ext>
+            </p:extLst>
+          </p:nvPr>
+        </p:nvGraphicFramePr>
+        <p:xfrm>
+          <a:off x="1434854" y="2286000"/>
+          <a:ext cx="9474693" cy="3581403"/>
+        </p:xfrm>
+        <a:graphic>
+          <a:graphicData uri="http://schemas.openxmlformats.org/drawingml/2006/table">
+            <a:tbl>
+              <a:tblPr firstRow="1" bandRow="1">
+                <a:tableStyleId>{073A0DAA-6AF3-43AB-8588-CEC1D06C72B9}</a:tableStyleId>
+              </a:tblPr>
+              <a:tblGrid>
+                <a:gridCol w="2008524">
+                  <a:extLst>
+                    <a:ext uri="{9D8B030D-6E8A-4147-A177-3AD203B41FA5}">
+                      <a16:colId xmlns:a16="http://schemas.microsoft.com/office/drawing/2014/main" val="492625597"/>
+                    </a:ext>
+                  </a:extLst>
+                </a:gridCol>
+                <a:gridCol w="2008524">
+                  <a:extLst>
+                    <a:ext uri="{9D8B030D-6E8A-4147-A177-3AD203B41FA5}">
+                      <a16:colId xmlns:a16="http://schemas.microsoft.com/office/drawing/2014/main" val="4176513003"/>
+                    </a:ext>
+                  </a:extLst>
+                </a:gridCol>
+                <a:gridCol w="2405315">
+                  <a:extLst>
+                    <a:ext uri="{9D8B030D-6E8A-4147-A177-3AD203B41FA5}">
+                      <a16:colId xmlns:a16="http://schemas.microsoft.com/office/drawing/2014/main" val="1436058226"/>
+                    </a:ext>
+                  </a:extLst>
+                </a:gridCol>
+                <a:gridCol w="3052330">
+                  <a:extLst>
+                    <a:ext uri="{9D8B030D-6E8A-4147-A177-3AD203B41FA5}">
+                      <a16:colId xmlns:a16="http://schemas.microsoft.com/office/drawing/2014/main" val="2557779021"/>
+                    </a:ext>
+                  </a:extLst>
+                </a:gridCol>
+              </a:tblGrid>
+              <a:tr h="511629">
+                <a:tc>
+                  <a:txBody>
+                    <a:bodyPr/>
+                    <a:lstStyle/>
+                    <a:p>
+                      <a:r>
+                        <a:rPr kumimoji="1" lang="en-US" altLang="ja-JP" sz="2300"/>
+                        <a:t>Layer</a:t>
+                      </a:r>
+                      <a:endParaRPr kumimoji="1" lang="ja-JP" altLang="en-US" sz="2300"/>
+                    </a:p>
+                  </a:txBody>
+                  <a:tcPr marL="116279" marR="116279" marT="58140" marB="58140"/>
+                </a:tc>
+                <a:tc>
+                  <a:txBody>
+                    <a:bodyPr/>
+                    <a:lstStyle/>
+                    <a:p>
+                      <a:r>
+                        <a:rPr kumimoji="1" lang="en-US" altLang="ja-JP" sz="2300"/>
+                        <a:t>Type</a:t>
+                      </a:r>
+                      <a:endParaRPr kumimoji="1" lang="ja-JP" altLang="en-US" sz="2300"/>
+                    </a:p>
+                  </a:txBody>
+                  <a:tcPr marL="116279" marR="116279" marT="58140" marB="58140"/>
+                </a:tc>
+                <a:tc>
+                  <a:txBody>
+                    <a:bodyPr/>
+                    <a:lstStyle/>
+                    <a:p>
+                      <a:r>
+                        <a:rPr kumimoji="1" lang="en-US" altLang="ja-JP" sz="2300"/>
+                        <a:t>Size</a:t>
+                      </a:r>
+                      <a:endParaRPr kumimoji="1" lang="ja-JP" altLang="en-US" sz="2300"/>
+                    </a:p>
+                  </a:txBody>
+                  <a:tcPr marL="116279" marR="116279" marT="58140" marB="58140"/>
+                </a:tc>
+                <a:tc>
+                  <a:txBody>
+                    <a:bodyPr/>
+                    <a:lstStyle/>
+                    <a:p>
+                      <a:r>
+                        <a:rPr kumimoji="1" lang="en-US" altLang="ja-JP" sz="2300"/>
+                        <a:t>Activation</a:t>
+                      </a:r>
+                      <a:endParaRPr kumimoji="1" lang="ja-JP" altLang="en-US" sz="2300"/>
+                    </a:p>
+                  </a:txBody>
+                  <a:tcPr marL="116279" marR="116279" marT="58140" marB="58140"/>
+                </a:tc>
+                <a:extLst>
+                  <a:ext uri="{0D108BD9-81ED-4DB2-BD59-A6C34878D82A}">
+                    <a16:rowId xmlns:a16="http://schemas.microsoft.com/office/drawing/2014/main" val="564266015"/>
+                  </a:ext>
+                </a:extLst>
+              </a:tr>
+              <a:tr h="511629">
+                <a:tc>
+                  <a:txBody>
+                    <a:bodyPr/>
+                    <a:lstStyle/>
+                    <a:p>
+                      <a:r>
+                        <a:rPr kumimoji="1" lang="en-US" altLang="ja-JP" sz="2300"/>
+                        <a:t>Input</a:t>
+                      </a:r>
+                      <a:endParaRPr kumimoji="1" lang="ja-JP" altLang="en-US" sz="2300"/>
+                    </a:p>
+                  </a:txBody>
+                  <a:tcPr marL="116279" marR="116279" marT="58140" marB="58140"/>
+                </a:tc>
+                <a:tc>
+                  <a:txBody>
+                    <a:bodyPr/>
+                    <a:lstStyle/>
+                    <a:p>
+                      <a:r>
+                        <a:rPr kumimoji="1" lang="en-US" altLang="ja-JP" sz="2300"/>
+                        <a:t>Image</a:t>
+                      </a:r>
+                      <a:endParaRPr kumimoji="1" lang="ja-JP" altLang="en-US" sz="2300"/>
+                    </a:p>
+                  </a:txBody>
+                  <a:tcPr marL="116279" marR="116279" marT="58140" marB="58140"/>
+                </a:tc>
+                <a:tc>
+                  <a:txBody>
+                    <a:bodyPr/>
+                    <a:lstStyle/>
+                    <a:p>
+                      <a:r>
+                        <a:rPr kumimoji="1" lang="en-US" altLang="ja-JP" sz="2300"/>
+                        <a:t>28x28x1</a:t>
+                      </a:r>
+                      <a:endParaRPr kumimoji="1" lang="ja-JP" altLang="en-US" sz="2300"/>
+                    </a:p>
+                  </a:txBody>
+                  <a:tcPr marL="116279" marR="116279" marT="58140" marB="58140"/>
+                </a:tc>
+                <a:tc>
+                  <a:txBody>
+                    <a:bodyPr/>
+                    <a:lstStyle/>
+                    <a:p>
+                      <a:r>
+                        <a:rPr kumimoji="1" lang="en-US" altLang="ja-JP" sz="2300"/>
+                        <a:t>-</a:t>
+                      </a:r>
+                      <a:endParaRPr kumimoji="1" lang="ja-JP" altLang="en-US" sz="2300"/>
+                    </a:p>
+                  </a:txBody>
+                  <a:tcPr marL="116279" marR="116279" marT="58140" marB="58140"/>
+                </a:tc>
+                <a:extLst>
+                  <a:ext uri="{0D108BD9-81ED-4DB2-BD59-A6C34878D82A}">
+                    <a16:rowId xmlns:a16="http://schemas.microsoft.com/office/drawing/2014/main" val="4045395388"/>
+                  </a:ext>
+                </a:extLst>
+              </a:tr>
+              <a:tr h="511629">
+                <a:tc>
+                  <a:txBody>
+                    <a:bodyPr/>
+                    <a:lstStyle/>
+                    <a:p>
+                      <a:r>
+                        <a:rPr kumimoji="1" lang="en-US" altLang="ja-JP" sz="2300" dirty="0"/>
+                        <a:t>Flatten</a:t>
+                      </a:r>
+                      <a:endParaRPr kumimoji="1" lang="ja-JP" altLang="en-US" sz="2300" dirty="0"/>
+                    </a:p>
+                  </a:txBody>
+                  <a:tcPr marL="116279" marR="116279" marT="58140" marB="58140"/>
+                </a:tc>
+                <a:tc>
+                  <a:txBody>
+                    <a:bodyPr/>
+                    <a:lstStyle/>
+                    <a:p>
+                      <a:r>
+                        <a:rPr kumimoji="1" lang="en-US" altLang="ja-JP" sz="2300"/>
+                        <a:t>Flatten</a:t>
+                      </a:r>
+                      <a:endParaRPr kumimoji="1" lang="ja-JP" altLang="en-US" sz="2300"/>
+                    </a:p>
+                  </a:txBody>
+                  <a:tcPr marL="116279" marR="116279" marT="58140" marB="58140"/>
+                </a:tc>
+                <a:tc>
+                  <a:txBody>
+                    <a:bodyPr/>
+                    <a:lstStyle/>
+                    <a:p>
+                      <a:r>
+                        <a:rPr kumimoji="1" lang="en-US" altLang="ja-JP" sz="2300"/>
+                        <a:t>784</a:t>
+                      </a:r>
+                      <a:endParaRPr kumimoji="1" lang="ja-JP" altLang="en-US" sz="2300"/>
+                    </a:p>
+                  </a:txBody>
+                  <a:tcPr marL="116279" marR="116279" marT="58140" marB="58140"/>
+                </a:tc>
+                <a:tc>
+                  <a:txBody>
+                    <a:bodyPr/>
+                    <a:lstStyle/>
+                    <a:p>
+                      <a:r>
+                        <a:rPr kumimoji="1" lang="en-US" altLang="ja-JP" sz="2300"/>
+                        <a:t>-</a:t>
+                      </a:r>
+                      <a:endParaRPr kumimoji="1" lang="ja-JP" altLang="en-US" sz="2300"/>
+                    </a:p>
+                  </a:txBody>
+                  <a:tcPr marL="116279" marR="116279" marT="58140" marB="58140"/>
+                </a:tc>
+                <a:extLst>
+                  <a:ext uri="{0D108BD9-81ED-4DB2-BD59-A6C34878D82A}">
+                    <a16:rowId xmlns:a16="http://schemas.microsoft.com/office/drawing/2014/main" val="3639936735"/>
+                  </a:ext>
+                </a:extLst>
+              </a:tr>
+              <a:tr h="511629">
+                <a:tc>
+                  <a:txBody>
+                    <a:bodyPr/>
+                    <a:lstStyle/>
+                    <a:p>
+                      <a:r>
+                        <a:rPr kumimoji="1" lang="en-US" altLang="ja-JP" sz="2300"/>
+                        <a:t>1</a:t>
+                      </a:r>
+                      <a:endParaRPr kumimoji="1" lang="ja-JP" altLang="en-US" sz="2300"/>
+                    </a:p>
+                  </a:txBody>
+                  <a:tcPr marL="116279" marR="116279" marT="58140" marB="58140"/>
+                </a:tc>
+                <a:tc>
+                  <a:txBody>
+                    <a:bodyPr/>
+                    <a:lstStyle/>
+                    <a:p>
+                      <a:r>
+                        <a:rPr kumimoji="1" lang="en-US" altLang="ja-JP" sz="2300"/>
+                        <a:t>Linear</a:t>
+                      </a:r>
+                      <a:endParaRPr kumimoji="1" lang="ja-JP" altLang="en-US" sz="2300"/>
+                    </a:p>
+                  </a:txBody>
+                  <a:tcPr marL="116279" marR="116279" marT="58140" marB="58140"/>
+                </a:tc>
+                <a:tc>
+                  <a:txBody>
+                    <a:bodyPr/>
+                    <a:lstStyle/>
+                    <a:p>
+                      <a:r>
+                        <a:rPr kumimoji="1" lang="en-US" altLang="ja-JP" sz="2300"/>
+                        <a:t>392</a:t>
+                      </a:r>
+                      <a:endParaRPr kumimoji="1" lang="ja-JP" altLang="en-US" sz="2300"/>
+                    </a:p>
+                  </a:txBody>
+                  <a:tcPr marL="116279" marR="116279" marT="58140" marB="58140"/>
+                </a:tc>
+                <a:tc>
+                  <a:txBody>
+                    <a:bodyPr/>
+                    <a:lstStyle/>
+                    <a:p>
+                      <a:r>
+                        <a:rPr kumimoji="1" lang="en-US" altLang="ja-JP" sz="2300" err="1"/>
+                        <a:t>ReLU</a:t>
+                      </a:r>
+                      <a:endParaRPr kumimoji="1" lang="ja-JP" altLang="en-US" sz="2300"/>
+                    </a:p>
+                  </a:txBody>
+                  <a:tcPr marL="116279" marR="116279" marT="58140" marB="58140"/>
+                </a:tc>
+                <a:extLst>
+                  <a:ext uri="{0D108BD9-81ED-4DB2-BD59-A6C34878D82A}">
+                    <a16:rowId xmlns:a16="http://schemas.microsoft.com/office/drawing/2014/main" val="674952096"/>
+                  </a:ext>
+                </a:extLst>
+              </a:tr>
+              <a:tr h="511629">
+                <a:tc>
+                  <a:txBody>
+                    <a:bodyPr/>
+                    <a:lstStyle/>
+                    <a:p>
+                      <a:r>
+                        <a:rPr kumimoji="1" lang="en-US" altLang="ja-JP" sz="2300"/>
+                        <a:t>2</a:t>
+                      </a:r>
+                      <a:endParaRPr kumimoji="1" lang="ja-JP" altLang="en-US" sz="2300"/>
+                    </a:p>
+                  </a:txBody>
+                  <a:tcPr marL="116279" marR="116279" marT="58140" marB="58140"/>
+                </a:tc>
+                <a:tc>
+                  <a:txBody>
+                    <a:bodyPr/>
+                    <a:lstStyle/>
+                    <a:p>
+                      <a:r>
+                        <a:rPr kumimoji="1" lang="en-US" altLang="ja-JP" sz="2300"/>
+                        <a:t>Linear</a:t>
+                      </a:r>
+                      <a:endParaRPr kumimoji="1" lang="ja-JP" altLang="en-US" sz="2300"/>
+                    </a:p>
+                  </a:txBody>
+                  <a:tcPr marL="116279" marR="116279" marT="58140" marB="58140"/>
+                </a:tc>
+                <a:tc>
+                  <a:txBody>
+                    <a:bodyPr/>
+                    <a:lstStyle/>
+                    <a:p>
+                      <a:r>
+                        <a:rPr kumimoji="1" lang="en-US" altLang="ja-JP" sz="2300"/>
+                        <a:t>196</a:t>
+                      </a:r>
+                      <a:endParaRPr kumimoji="1" lang="ja-JP" altLang="en-US" sz="2300"/>
+                    </a:p>
+                  </a:txBody>
+                  <a:tcPr marL="116279" marR="116279" marT="58140" marB="58140"/>
+                </a:tc>
+                <a:tc>
+                  <a:txBody>
+                    <a:bodyPr/>
+                    <a:lstStyle/>
+                    <a:p>
+                      <a:r>
+                        <a:rPr kumimoji="1" lang="en-US" altLang="ja-JP" sz="2300" err="1"/>
+                        <a:t>ReLU</a:t>
+                      </a:r>
+                      <a:endParaRPr kumimoji="1" lang="ja-JP" altLang="en-US" sz="2300"/>
+                    </a:p>
+                  </a:txBody>
+                  <a:tcPr marL="116279" marR="116279" marT="58140" marB="58140"/>
+                </a:tc>
+                <a:extLst>
+                  <a:ext uri="{0D108BD9-81ED-4DB2-BD59-A6C34878D82A}">
+                    <a16:rowId xmlns:a16="http://schemas.microsoft.com/office/drawing/2014/main" val="2281561552"/>
+                  </a:ext>
+                </a:extLst>
+              </a:tr>
+              <a:tr h="511629">
+                <a:tc>
+                  <a:txBody>
+                    <a:bodyPr/>
+                    <a:lstStyle/>
+                    <a:p>
+                      <a:r>
+                        <a:rPr kumimoji="1" lang="en-US" altLang="ja-JP" sz="2300"/>
+                        <a:t>3</a:t>
+                      </a:r>
+                      <a:endParaRPr kumimoji="1" lang="ja-JP" altLang="en-US" sz="2300"/>
+                    </a:p>
+                  </a:txBody>
+                  <a:tcPr marL="116279" marR="116279" marT="58140" marB="58140"/>
+                </a:tc>
+                <a:tc>
+                  <a:txBody>
+                    <a:bodyPr/>
+                    <a:lstStyle/>
+                    <a:p>
+                      <a:r>
+                        <a:rPr kumimoji="1" lang="en-US" altLang="ja-JP" sz="2300"/>
+                        <a:t>Linear</a:t>
+                      </a:r>
+                      <a:endParaRPr kumimoji="1" lang="ja-JP" altLang="en-US" sz="2300"/>
+                    </a:p>
+                  </a:txBody>
+                  <a:tcPr marL="116279" marR="116279" marT="58140" marB="58140"/>
+                </a:tc>
+                <a:tc>
+                  <a:txBody>
+                    <a:bodyPr/>
+                    <a:lstStyle/>
+                    <a:p>
+                      <a:r>
+                        <a:rPr kumimoji="1" lang="en-US" altLang="ja-JP" sz="2300"/>
+                        <a:t>98</a:t>
+                      </a:r>
+                      <a:endParaRPr kumimoji="1" lang="ja-JP" altLang="en-US" sz="2300"/>
+                    </a:p>
+                  </a:txBody>
+                  <a:tcPr marL="116279" marR="116279" marT="58140" marB="58140"/>
+                </a:tc>
+                <a:tc>
+                  <a:txBody>
+                    <a:bodyPr/>
+                    <a:lstStyle/>
+                    <a:p>
+                      <a:r>
+                        <a:rPr kumimoji="1" lang="en-US" altLang="ja-JP" sz="2300" err="1"/>
+                        <a:t>ReLU</a:t>
+                      </a:r>
+                      <a:endParaRPr kumimoji="1" lang="ja-JP" altLang="en-US" sz="2300"/>
+                    </a:p>
+                  </a:txBody>
+                  <a:tcPr marL="116279" marR="116279" marT="58140" marB="58140"/>
+                </a:tc>
+                <a:extLst>
+                  <a:ext uri="{0D108BD9-81ED-4DB2-BD59-A6C34878D82A}">
+                    <a16:rowId xmlns:a16="http://schemas.microsoft.com/office/drawing/2014/main" val="2169240604"/>
+                  </a:ext>
+                </a:extLst>
+              </a:tr>
+              <a:tr h="511629">
+                <a:tc>
+                  <a:txBody>
+                    <a:bodyPr/>
+                    <a:lstStyle/>
+                    <a:p>
+                      <a:r>
+                        <a:rPr kumimoji="1" lang="en-US" altLang="ja-JP" sz="2300"/>
+                        <a:t>Output</a:t>
+                      </a:r>
+                      <a:endParaRPr kumimoji="1" lang="ja-JP" altLang="en-US" sz="2300"/>
+                    </a:p>
+                  </a:txBody>
+                  <a:tcPr marL="116279" marR="116279" marT="58140" marB="58140"/>
+                </a:tc>
+                <a:tc>
+                  <a:txBody>
+                    <a:bodyPr/>
+                    <a:lstStyle/>
+                    <a:p>
+                      <a:r>
+                        <a:rPr kumimoji="1" lang="en-US" altLang="ja-JP" sz="2300"/>
+                        <a:t>Linear</a:t>
+                      </a:r>
+                      <a:endParaRPr kumimoji="1" lang="ja-JP" altLang="en-US" sz="2300"/>
+                    </a:p>
+                  </a:txBody>
+                  <a:tcPr marL="116279" marR="116279" marT="58140" marB="58140"/>
+                </a:tc>
+                <a:tc>
+                  <a:txBody>
+                    <a:bodyPr/>
+                    <a:lstStyle/>
+                    <a:p>
+                      <a:r>
+                        <a:rPr kumimoji="1" lang="en-US" altLang="ja-JP" sz="2300"/>
+                        <a:t>10</a:t>
+                      </a:r>
+                      <a:endParaRPr kumimoji="1" lang="ja-JP" altLang="en-US" sz="2300"/>
+                    </a:p>
+                  </a:txBody>
+                  <a:tcPr marL="116279" marR="116279" marT="58140" marB="58140"/>
+                </a:tc>
+                <a:tc>
+                  <a:txBody>
+                    <a:bodyPr/>
+                    <a:lstStyle/>
+                    <a:p>
+                      <a:r>
+                        <a:rPr kumimoji="1" lang="en-US" altLang="ja-JP" sz="2300" dirty="0"/>
+                        <a:t>Log </a:t>
+                      </a:r>
+                      <a:r>
+                        <a:rPr kumimoji="1" lang="en-US" altLang="ja-JP" sz="2300" dirty="0" err="1"/>
+                        <a:t>Softmax</a:t>
+                      </a:r>
+                      <a:endParaRPr kumimoji="1" lang="ja-JP" altLang="en-US" sz="2300" dirty="0"/>
+                    </a:p>
+                  </a:txBody>
+                  <a:tcPr marL="116279" marR="116279" marT="58140" marB="58140"/>
+                </a:tc>
+                <a:extLst>
+                  <a:ext uri="{0D108BD9-81ED-4DB2-BD59-A6C34878D82A}">
+                    <a16:rowId xmlns:a16="http://schemas.microsoft.com/office/drawing/2014/main" val="775611540"/>
+                  </a:ext>
+                </a:extLst>
+              </a:tr>
+            </a:tbl>
+          </a:graphicData>
+        </a:graphic>
+      </p:graphicFrame>
     </p:spTree>
     <p:extLst>
       <p:ext uri="{BB962C8B-B14F-4D97-AF65-F5344CB8AC3E}">
@@ -4591,7 +5486,7 @@
           <p:cNvPr id="2" name="タイトル 1">
             <a:extLst>
               <a:ext uri="{FF2B5EF4-FFF2-40B4-BE49-F238E27FC236}">
-                <a16:creationId xmlns:a16="http://schemas.microsoft.com/office/drawing/2014/main" id="{EFECE46C-FFB3-8185-6EF7-17A41D69E6A6}"/>
+                <a16:creationId xmlns:a16="http://schemas.microsoft.com/office/drawing/2014/main" id="{05D6DD5A-7C14-14B2-258E-959C9EB08F7D}"/>
               </a:ext>
             </a:extLst>
           </p:cNvPr>
@@ -4608,42 +5503,87 @@
           <a:lstStyle/>
           <a:p>
             <a:r>
-              <a:rPr kumimoji="1" lang="en-US" altLang="ja-JP" dirty="0"/>
-              <a:t>CNN Architecture</a:t>
+              <a:rPr lang="en-US" altLang="ja-JP" dirty="0"/>
+              <a:t>Training Performance</a:t>
             </a:r>
             <a:endParaRPr kumimoji="1" lang="ja-JP" altLang="en-US" dirty="0"/>
           </a:p>
         </p:txBody>
       </p:sp>
-      <p:sp>
-        <p:nvSpPr>
-          <p:cNvPr id="3" name="コンテンツ プレースホルダー 2">
+      <p:pic>
+        <p:nvPicPr>
+          <p:cNvPr id="12" name="コンテンツ プレースホルダー 11" descr="グラフ, 折れ線グラフ, ヒストグラム&#10;&#10;AI 生成コンテンツは誤りを含む可能性があります。">
             <a:extLst>
               <a:ext uri="{FF2B5EF4-FFF2-40B4-BE49-F238E27FC236}">
-                <a16:creationId xmlns:a16="http://schemas.microsoft.com/office/drawing/2014/main" id="{D9B8552C-13F0-A9BE-12FB-4E1E4C3937B7}"/>
+                <a16:creationId xmlns:a16="http://schemas.microsoft.com/office/drawing/2014/main" id="{F9BDD864-BB02-C470-65F6-A515428454C0}"/>
               </a:ext>
             </a:extLst>
           </p:cNvPr>
-          <p:cNvSpPr>
-            <a:spLocks noGrp="1"/>
-          </p:cNvSpPr>
-          <p:nvPr>
-            <p:ph idx="1"/>
-          </p:nvPr>
-        </p:nvSpPr>
-        <p:spPr/>
-        <p:txBody>
-          <a:bodyPr/>
-          <a:lstStyle/>
-          <a:p>
-            <a:endParaRPr kumimoji="1" lang="ja-JP" altLang="en-US"/>
-          </a:p>
-        </p:txBody>
-      </p:sp>
+          <p:cNvPicPr>
+            <a:picLocks noGrp="1" noChangeAspect="1"/>
+          </p:cNvPicPr>
+          <p:nvPr>
+            <p:ph sz="half" idx="1"/>
+          </p:nvPr>
+        </p:nvPicPr>
+        <p:blipFill>
+          <a:blip r:embed="rId2">
+            <a:extLst>
+              <a:ext uri="{28A0092B-C50C-407E-A947-70E740481C1C}">
+                <a14:useLocalDpi xmlns:a14="http://schemas.microsoft.com/office/drawing/2010/main" val="0"/>
+              </a:ext>
+            </a:extLst>
+          </a:blip>
+          <a:stretch>
+            <a:fillRect/>
+          </a:stretch>
+        </p:blipFill>
+        <p:spPr>
+          <a:xfrm>
+            <a:off x="1371600" y="2298212"/>
+            <a:ext cx="4448175" cy="3556976"/>
+          </a:xfrm>
+        </p:spPr>
+      </p:pic>
+      <p:pic>
+        <p:nvPicPr>
+          <p:cNvPr id="14" name="コンテンツ プレースホルダー 13" descr="グラフィカル ユーザー インターフェイス&#10;&#10;AI 生成コンテンツは誤りを含む可能性があります。">
+            <a:extLst>
+              <a:ext uri="{FF2B5EF4-FFF2-40B4-BE49-F238E27FC236}">
+                <a16:creationId xmlns:a16="http://schemas.microsoft.com/office/drawing/2014/main" id="{D6F5E5C2-88B1-D72A-99FA-85F12A81F7DB}"/>
+              </a:ext>
+            </a:extLst>
+          </p:cNvPr>
+          <p:cNvPicPr>
+            <a:picLocks noGrp="1" noChangeAspect="1"/>
+          </p:cNvPicPr>
+          <p:nvPr>
+            <p:ph sz="half" idx="2"/>
+          </p:nvPr>
+        </p:nvPicPr>
+        <p:blipFill>
+          <a:blip r:embed="rId3">
+            <a:extLst>
+              <a:ext uri="{28A0092B-C50C-407E-A947-70E740481C1C}">
+                <a14:useLocalDpi xmlns:a14="http://schemas.microsoft.com/office/drawing/2010/main" val="0"/>
+              </a:ext>
+            </a:extLst>
+          </a:blip>
+          <a:stretch>
+            <a:fillRect/>
+          </a:stretch>
+        </p:blipFill>
+        <p:spPr>
+          <a:xfrm>
+            <a:off x="6671646" y="2286000"/>
+            <a:ext cx="4154133" cy="3581400"/>
+          </a:xfrm>
+        </p:spPr>
+      </p:pic>
     </p:spTree>
     <p:extLst>
       <p:ext uri="{BB962C8B-B14F-4D97-AF65-F5344CB8AC3E}">
-        <p14:creationId xmlns:p14="http://schemas.microsoft.com/office/powerpoint/2010/main" val="700771612"/>
+        <p14:creationId xmlns:p14="http://schemas.microsoft.com/office/powerpoint/2010/main" val="1496060311"/>
       </p:ext>
     </p:extLst>
   </p:cSld>
@@ -4656,6 +5596,14 @@
 <file path=ppt/slides/slide4.xml><?xml version="1.0" encoding="utf-8"?>
 <p:sld xmlns:a="http://schemas.openxmlformats.org/drawingml/2006/main" xmlns:r="http://schemas.openxmlformats.org/officeDocument/2006/relationships" xmlns:p="http://schemas.openxmlformats.org/presentationml/2006/main">
   <p:cSld>
+    <p:bg>
+      <p:bgPr>
+        <a:solidFill>
+          <a:schemeClr val="bg2"/>
+        </a:solidFill>
+        <a:effectLst/>
+      </p:bgPr>
+    </p:bg>
     <p:spTree>
       <p:nvGrpSpPr>
         <p:cNvPr id="1" name=""/>
@@ -4686,44 +5634,713 @@
             <p:ph type="title"/>
           </p:nvPr>
         </p:nvSpPr>
-        <p:spPr/>
+        <p:spPr>
+          <a:xfrm>
+            <a:off x="1371600" y="685800"/>
+            <a:ext cx="9601200" cy="1485900"/>
+          </a:xfrm>
+        </p:spPr>
         <p:txBody>
-          <a:bodyPr/>
+          <a:bodyPr>
+            <a:normAutofit/>
+          </a:bodyPr>
           <a:lstStyle/>
           <a:p>
             <a:r>
               <a:rPr kumimoji="1" lang="en-US" altLang="ja-JP" dirty="0"/>
-              <a:t>Dropout</a:t>
+              <a:t>Implementing Dropout</a:t>
             </a:r>
             <a:endParaRPr kumimoji="1" lang="ja-JP" altLang="en-US" dirty="0"/>
           </a:p>
         </p:txBody>
       </p:sp>
-      <p:sp>
-        <p:nvSpPr>
-          <p:cNvPr id="3" name="コンテンツ プレースホルダー 2">
+      <p:graphicFrame>
+        <p:nvGraphicFramePr>
+          <p:cNvPr id="9" name="コンテンツ プレースホルダー 3">
             <a:extLst>
               <a:ext uri="{FF2B5EF4-FFF2-40B4-BE49-F238E27FC236}">
-                <a16:creationId xmlns:a16="http://schemas.microsoft.com/office/drawing/2014/main" id="{37378D1F-AC82-8DED-AC9A-9913436C44D4}"/>
+                <a16:creationId xmlns:a16="http://schemas.microsoft.com/office/drawing/2014/main" id="{8137D65D-99B7-3B9C-FC51-36E3CD7BE5A4}"/>
               </a:ext>
             </a:extLst>
           </p:cNvPr>
-          <p:cNvSpPr>
-            <a:spLocks noGrp="1"/>
-          </p:cNvSpPr>
+          <p:cNvGraphicFramePr>
+            <a:graphicFrameLocks noGrp="1"/>
+          </p:cNvGraphicFramePr>
           <p:nvPr>
             <p:ph idx="1"/>
-          </p:nvPr>
-        </p:nvSpPr>
-        <p:spPr/>
-        <p:txBody>
-          <a:bodyPr/>
-          <a:lstStyle/>
-          <a:p>
-            <a:endParaRPr kumimoji="1" lang="ja-JP" altLang="en-US"/>
-          </a:p>
-        </p:txBody>
-      </p:sp>
+            <p:extLst>
+              <p:ext uri="{D42A27DB-BD31-4B8C-83A1-F6EECF244321}">
+                <p14:modId xmlns:p14="http://schemas.microsoft.com/office/powerpoint/2010/main" val="3121188854"/>
+              </p:ext>
+            </p:extLst>
+          </p:nvPr>
+        </p:nvGraphicFramePr>
+        <p:xfrm>
+          <a:off x="1459650" y="2286000"/>
+          <a:ext cx="9425102" cy="3581400"/>
+        </p:xfrm>
+        <a:graphic>
+          <a:graphicData uri="http://schemas.openxmlformats.org/drawingml/2006/table">
+            <a:tbl>
+              <a:tblPr firstRow="1" bandRow="1">
+                <a:tableStyleId>{073A0DAA-6AF3-43AB-8588-CEC1D06C72B9}</a:tableStyleId>
+              </a:tblPr>
+              <a:tblGrid>
+                <a:gridCol w="1981459">
+                  <a:extLst>
+                    <a:ext uri="{9D8B030D-6E8A-4147-A177-3AD203B41FA5}">
+                      <a16:colId xmlns:a16="http://schemas.microsoft.com/office/drawing/2014/main" val="492625597"/>
+                    </a:ext>
+                  </a:extLst>
+                </a:gridCol>
+                <a:gridCol w="2176302">
+                  <a:extLst>
+                    <a:ext uri="{9D8B030D-6E8A-4147-A177-3AD203B41FA5}">
+                      <a16:colId xmlns:a16="http://schemas.microsoft.com/office/drawing/2014/main" val="4176513003"/>
+                    </a:ext>
+                  </a:extLst>
+                </a:gridCol>
+                <a:gridCol w="2340743">
+                  <a:extLst>
+                    <a:ext uri="{9D8B030D-6E8A-4147-A177-3AD203B41FA5}">
+                      <a16:colId xmlns:a16="http://schemas.microsoft.com/office/drawing/2014/main" val="1436058226"/>
+                    </a:ext>
+                  </a:extLst>
+                </a:gridCol>
+                <a:gridCol w="2926598">
+                  <a:extLst>
+                    <a:ext uri="{9D8B030D-6E8A-4147-A177-3AD203B41FA5}">
+                      <a16:colId xmlns:a16="http://schemas.microsoft.com/office/drawing/2014/main" val="2557779021"/>
+                    </a:ext>
+                  </a:extLst>
+                </a:gridCol>
+              </a:tblGrid>
+              <a:tr h="358140">
+                <a:tc>
+                  <a:txBody>
+                    <a:bodyPr/>
+                    <a:lstStyle/>
+                    <a:p>
+                      <a:r>
+                        <a:rPr kumimoji="1" lang="en-US" altLang="ja-JP" sz="1600"/>
+                        <a:t>Layer</a:t>
+                      </a:r>
+                      <a:endParaRPr kumimoji="1" lang="ja-JP" altLang="en-US" sz="1600"/>
+                    </a:p>
+                  </a:txBody>
+                  <a:tcPr marL="81395" marR="81395" marT="40698" marB="40698"/>
+                </a:tc>
+                <a:tc>
+                  <a:txBody>
+                    <a:bodyPr/>
+                    <a:lstStyle/>
+                    <a:p>
+                      <a:r>
+                        <a:rPr kumimoji="1" lang="en-US" altLang="ja-JP" sz="1600"/>
+                        <a:t>Type</a:t>
+                      </a:r>
+                      <a:endParaRPr kumimoji="1" lang="ja-JP" altLang="en-US" sz="1600"/>
+                    </a:p>
+                  </a:txBody>
+                  <a:tcPr marL="81395" marR="81395" marT="40698" marB="40698"/>
+                </a:tc>
+                <a:tc>
+                  <a:txBody>
+                    <a:bodyPr/>
+                    <a:lstStyle/>
+                    <a:p>
+                      <a:r>
+                        <a:rPr kumimoji="1" lang="en-US" altLang="ja-JP" sz="1600"/>
+                        <a:t>Size</a:t>
+                      </a:r>
+                      <a:endParaRPr kumimoji="1" lang="ja-JP" altLang="en-US" sz="1600"/>
+                    </a:p>
+                  </a:txBody>
+                  <a:tcPr marL="81395" marR="81395" marT="40698" marB="40698"/>
+                </a:tc>
+                <a:tc>
+                  <a:txBody>
+                    <a:bodyPr/>
+                    <a:lstStyle/>
+                    <a:p>
+                      <a:r>
+                        <a:rPr kumimoji="1" lang="en-US" altLang="ja-JP" sz="1600"/>
+                        <a:t>Activation</a:t>
+                      </a:r>
+                      <a:endParaRPr kumimoji="1" lang="ja-JP" altLang="en-US" sz="1600"/>
+                    </a:p>
+                  </a:txBody>
+                  <a:tcPr marL="81395" marR="81395" marT="40698" marB="40698"/>
+                </a:tc>
+                <a:extLst>
+                  <a:ext uri="{0D108BD9-81ED-4DB2-BD59-A6C34878D82A}">
+                    <a16:rowId xmlns:a16="http://schemas.microsoft.com/office/drawing/2014/main" val="564266015"/>
+                  </a:ext>
+                </a:extLst>
+              </a:tr>
+              <a:tr h="358140">
+                <a:tc>
+                  <a:txBody>
+                    <a:bodyPr/>
+                    <a:lstStyle/>
+                    <a:p>
+                      <a:r>
+                        <a:rPr kumimoji="1" lang="en-US" altLang="ja-JP" sz="1600"/>
+                        <a:t>Input</a:t>
+                      </a:r>
+                      <a:endParaRPr kumimoji="1" lang="ja-JP" altLang="en-US" sz="1600"/>
+                    </a:p>
+                  </a:txBody>
+                  <a:tcPr marL="81395" marR="81395" marT="40698" marB="40698"/>
+                </a:tc>
+                <a:tc>
+                  <a:txBody>
+                    <a:bodyPr/>
+                    <a:lstStyle/>
+                    <a:p>
+                      <a:r>
+                        <a:rPr kumimoji="1" lang="en-US" altLang="ja-JP" sz="1600"/>
+                        <a:t>Image</a:t>
+                      </a:r>
+                      <a:endParaRPr kumimoji="1" lang="ja-JP" altLang="en-US" sz="1600"/>
+                    </a:p>
+                  </a:txBody>
+                  <a:tcPr marL="81395" marR="81395" marT="40698" marB="40698"/>
+                </a:tc>
+                <a:tc>
+                  <a:txBody>
+                    <a:bodyPr/>
+                    <a:lstStyle/>
+                    <a:p>
+                      <a:r>
+                        <a:rPr kumimoji="1" lang="en-US" altLang="ja-JP" sz="1600"/>
+                        <a:t>28x28x1</a:t>
+                      </a:r>
+                      <a:endParaRPr kumimoji="1" lang="ja-JP" altLang="en-US" sz="1600"/>
+                    </a:p>
+                  </a:txBody>
+                  <a:tcPr marL="81395" marR="81395" marT="40698" marB="40698"/>
+                </a:tc>
+                <a:tc>
+                  <a:txBody>
+                    <a:bodyPr/>
+                    <a:lstStyle/>
+                    <a:p>
+                      <a:r>
+                        <a:rPr kumimoji="1" lang="en-US" altLang="ja-JP" sz="1600"/>
+                        <a:t>-</a:t>
+                      </a:r>
+                      <a:endParaRPr kumimoji="1" lang="ja-JP" altLang="en-US" sz="1600"/>
+                    </a:p>
+                  </a:txBody>
+                  <a:tcPr marL="81395" marR="81395" marT="40698" marB="40698"/>
+                </a:tc>
+                <a:extLst>
+                  <a:ext uri="{0D108BD9-81ED-4DB2-BD59-A6C34878D82A}">
+                    <a16:rowId xmlns:a16="http://schemas.microsoft.com/office/drawing/2014/main" val="4045395388"/>
+                  </a:ext>
+                </a:extLst>
+              </a:tr>
+              <a:tr h="358140">
+                <a:tc>
+                  <a:txBody>
+                    <a:bodyPr/>
+                    <a:lstStyle/>
+                    <a:p>
+                      <a:r>
+                        <a:rPr kumimoji="1" lang="en-US" altLang="ja-JP" sz="1600"/>
+                        <a:t>Flatten</a:t>
+                      </a:r>
+                      <a:endParaRPr kumimoji="1" lang="ja-JP" altLang="en-US" sz="1600"/>
+                    </a:p>
+                  </a:txBody>
+                  <a:tcPr marL="81395" marR="81395" marT="40698" marB="40698"/>
+                </a:tc>
+                <a:tc>
+                  <a:txBody>
+                    <a:bodyPr/>
+                    <a:lstStyle/>
+                    <a:p>
+                      <a:r>
+                        <a:rPr kumimoji="1" lang="en-US" altLang="ja-JP" sz="1600"/>
+                        <a:t>Flatten</a:t>
+                      </a:r>
+                      <a:endParaRPr kumimoji="1" lang="ja-JP" altLang="en-US" sz="1600"/>
+                    </a:p>
+                  </a:txBody>
+                  <a:tcPr marL="81395" marR="81395" marT="40698" marB="40698"/>
+                </a:tc>
+                <a:tc>
+                  <a:txBody>
+                    <a:bodyPr/>
+                    <a:lstStyle/>
+                    <a:p>
+                      <a:r>
+                        <a:rPr kumimoji="1" lang="en-US" altLang="ja-JP" sz="1600"/>
+                        <a:t>784</a:t>
+                      </a:r>
+                      <a:endParaRPr kumimoji="1" lang="ja-JP" altLang="en-US" sz="1600"/>
+                    </a:p>
+                  </a:txBody>
+                  <a:tcPr marL="81395" marR="81395" marT="40698" marB="40698"/>
+                </a:tc>
+                <a:tc>
+                  <a:txBody>
+                    <a:bodyPr/>
+                    <a:lstStyle/>
+                    <a:p>
+                      <a:r>
+                        <a:rPr kumimoji="1" lang="en-US" altLang="ja-JP" sz="1600"/>
+                        <a:t>-</a:t>
+                      </a:r>
+                      <a:endParaRPr kumimoji="1" lang="ja-JP" altLang="en-US" sz="1600"/>
+                    </a:p>
+                  </a:txBody>
+                  <a:tcPr marL="81395" marR="81395" marT="40698" marB="40698"/>
+                </a:tc>
+                <a:extLst>
+                  <a:ext uri="{0D108BD9-81ED-4DB2-BD59-A6C34878D82A}">
+                    <a16:rowId xmlns:a16="http://schemas.microsoft.com/office/drawing/2014/main" val="3639936735"/>
+                  </a:ext>
+                </a:extLst>
+              </a:tr>
+              <a:tr h="358140">
+                <a:tc>
+                  <a:txBody>
+                    <a:bodyPr/>
+                    <a:lstStyle/>
+                    <a:p>
+                      <a:r>
+                        <a:rPr kumimoji="1" lang="en-US" altLang="ja-JP" sz="1600"/>
+                        <a:t>1</a:t>
+                      </a:r>
+                      <a:endParaRPr kumimoji="1" lang="ja-JP" altLang="en-US" sz="1600"/>
+                    </a:p>
+                  </a:txBody>
+                  <a:tcPr marL="81395" marR="81395" marT="40698" marB="40698"/>
+                </a:tc>
+                <a:tc>
+                  <a:txBody>
+                    <a:bodyPr/>
+                    <a:lstStyle/>
+                    <a:p>
+                      <a:r>
+                        <a:rPr kumimoji="1" lang="en-US" altLang="ja-JP" sz="1600"/>
+                        <a:t>Linear</a:t>
+                      </a:r>
+                      <a:endParaRPr kumimoji="1" lang="ja-JP" altLang="en-US" sz="1600"/>
+                    </a:p>
+                  </a:txBody>
+                  <a:tcPr marL="81395" marR="81395" marT="40698" marB="40698"/>
+                </a:tc>
+                <a:tc>
+                  <a:txBody>
+                    <a:bodyPr/>
+                    <a:lstStyle/>
+                    <a:p>
+                      <a:r>
+                        <a:rPr kumimoji="1" lang="en-US" altLang="ja-JP" sz="1600"/>
+                        <a:t>392</a:t>
+                      </a:r>
+                      <a:endParaRPr kumimoji="1" lang="ja-JP" altLang="en-US" sz="1600"/>
+                    </a:p>
+                  </a:txBody>
+                  <a:tcPr marL="81395" marR="81395" marT="40698" marB="40698"/>
+                </a:tc>
+                <a:tc>
+                  <a:txBody>
+                    <a:bodyPr/>
+                    <a:lstStyle/>
+                    <a:p>
+                      <a:r>
+                        <a:rPr kumimoji="1" lang="en-US" altLang="ja-JP" sz="1600" err="1"/>
+                        <a:t>ReLU</a:t>
+                      </a:r>
+                      <a:endParaRPr kumimoji="1" lang="ja-JP" altLang="en-US" sz="1600"/>
+                    </a:p>
+                  </a:txBody>
+                  <a:tcPr marL="81395" marR="81395" marT="40698" marB="40698"/>
+                </a:tc>
+                <a:extLst>
+                  <a:ext uri="{0D108BD9-81ED-4DB2-BD59-A6C34878D82A}">
+                    <a16:rowId xmlns:a16="http://schemas.microsoft.com/office/drawing/2014/main" val="674952096"/>
+                  </a:ext>
+                </a:extLst>
+              </a:tr>
+              <a:tr h="358140">
+                <a:tc>
+                  <a:txBody>
+                    <a:bodyPr/>
+                    <a:lstStyle/>
+                    <a:p>
+                      <a:endParaRPr kumimoji="1" lang="ja-JP" altLang="en-US" sz="1600"/>
+                    </a:p>
+                  </a:txBody>
+                  <a:tcPr marL="81395" marR="81395" marT="40698" marB="40698"/>
+                </a:tc>
+                <a:tc>
+                  <a:txBody>
+                    <a:bodyPr/>
+                    <a:lstStyle/>
+                    <a:p>
+                      <a:r>
+                        <a:rPr kumimoji="1" lang="en-US" altLang="ja-JP" sz="1600"/>
+                        <a:t>Dropout</a:t>
+                      </a:r>
+                      <a:endParaRPr kumimoji="1" lang="ja-JP" altLang="en-US" sz="1600"/>
+                    </a:p>
+                  </a:txBody>
+                  <a:tcPr marL="81395" marR="81395" marT="40698" marB="40698"/>
+                </a:tc>
+                <a:tc>
+                  <a:txBody>
+                    <a:bodyPr/>
+                    <a:lstStyle/>
+                    <a:p>
+                      <a:r>
+                        <a:rPr kumimoji="1" lang="en-US" altLang="ja-JP" sz="1600"/>
+                        <a:t>p=0.2</a:t>
+                      </a:r>
+                      <a:endParaRPr kumimoji="1" lang="ja-JP" altLang="en-US" sz="1600"/>
+                    </a:p>
+                  </a:txBody>
+                  <a:tcPr marL="81395" marR="81395" marT="40698" marB="40698"/>
+                </a:tc>
+                <a:tc>
+                  <a:txBody>
+                    <a:bodyPr/>
+                    <a:lstStyle/>
+                    <a:p>
+                      <a:r>
+                        <a:rPr kumimoji="1" lang="en-US" altLang="ja-JP" sz="1600"/>
+                        <a:t>-</a:t>
+                      </a:r>
+                      <a:endParaRPr kumimoji="1" lang="ja-JP" altLang="en-US" sz="1600"/>
+                    </a:p>
+                  </a:txBody>
+                  <a:tcPr marL="81395" marR="81395" marT="40698" marB="40698"/>
+                </a:tc>
+                <a:extLst>
+                  <a:ext uri="{0D108BD9-81ED-4DB2-BD59-A6C34878D82A}">
+                    <a16:rowId xmlns:a16="http://schemas.microsoft.com/office/drawing/2014/main" val="1297855404"/>
+                  </a:ext>
+                </a:extLst>
+              </a:tr>
+              <a:tr h="358140">
+                <a:tc>
+                  <a:txBody>
+                    <a:bodyPr/>
+                    <a:lstStyle/>
+                    <a:p>
+                      <a:r>
+                        <a:rPr kumimoji="1" lang="en-US" altLang="ja-JP" sz="1600"/>
+                        <a:t>2</a:t>
+                      </a:r>
+                      <a:endParaRPr kumimoji="1" lang="ja-JP" altLang="en-US" sz="1600"/>
+                    </a:p>
+                  </a:txBody>
+                  <a:tcPr marL="81395" marR="81395" marT="40698" marB="40698"/>
+                </a:tc>
+                <a:tc>
+                  <a:txBody>
+                    <a:bodyPr/>
+                    <a:lstStyle/>
+                    <a:p>
+                      <a:r>
+                        <a:rPr kumimoji="1" lang="en-US" altLang="ja-JP" sz="1600"/>
+                        <a:t>Linear</a:t>
+                      </a:r>
+                      <a:endParaRPr kumimoji="1" lang="ja-JP" altLang="en-US" sz="1600"/>
+                    </a:p>
+                  </a:txBody>
+                  <a:tcPr marL="81395" marR="81395" marT="40698" marB="40698"/>
+                </a:tc>
+                <a:tc>
+                  <a:txBody>
+                    <a:bodyPr/>
+                    <a:lstStyle/>
+                    <a:p>
+                      <a:r>
+                        <a:rPr kumimoji="1" lang="en-US" altLang="ja-JP" sz="1600"/>
+                        <a:t>196</a:t>
+                      </a:r>
+                      <a:endParaRPr kumimoji="1" lang="ja-JP" altLang="en-US" sz="1600"/>
+                    </a:p>
+                  </a:txBody>
+                  <a:tcPr marL="81395" marR="81395" marT="40698" marB="40698"/>
+                </a:tc>
+                <a:tc>
+                  <a:txBody>
+                    <a:bodyPr/>
+                    <a:lstStyle/>
+                    <a:p>
+                      <a:r>
+                        <a:rPr kumimoji="1" lang="en-US" altLang="ja-JP" sz="1600" err="1"/>
+                        <a:t>ReLU</a:t>
+                      </a:r>
+                      <a:endParaRPr kumimoji="1" lang="ja-JP" altLang="en-US" sz="1600"/>
+                    </a:p>
+                  </a:txBody>
+                  <a:tcPr marL="81395" marR="81395" marT="40698" marB="40698"/>
+                </a:tc>
+                <a:extLst>
+                  <a:ext uri="{0D108BD9-81ED-4DB2-BD59-A6C34878D82A}">
+                    <a16:rowId xmlns:a16="http://schemas.microsoft.com/office/drawing/2014/main" val="2281561552"/>
+                  </a:ext>
+                </a:extLst>
+              </a:tr>
+              <a:tr h="358140">
+                <a:tc>
+                  <a:txBody>
+                    <a:bodyPr/>
+                    <a:lstStyle/>
+                    <a:p>
+                      <a:endParaRPr kumimoji="1" lang="ja-JP" altLang="en-US" sz="1600"/>
+                    </a:p>
+                  </a:txBody>
+                  <a:tcPr marL="81395" marR="81395" marT="40698" marB="40698"/>
+                </a:tc>
+                <a:tc>
+                  <a:txBody>
+                    <a:bodyPr/>
+                    <a:lstStyle/>
+                    <a:p>
+                      <a:r>
+                        <a:rPr kumimoji="1" lang="en-US" altLang="ja-JP" sz="1600"/>
+                        <a:t>Dropout</a:t>
+                      </a:r>
+                      <a:endParaRPr kumimoji="1" lang="ja-JP" altLang="en-US" sz="1600"/>
+                    </a:p>
+                  </a:txBody>
+                  <a:tcPr marL="81395" marR="81395" marT="40698" marB="40698"/>
+                </a:tc>
+                <a:tc>
+                  <a:txBody>
+                    <a:bodyPr/>
+                    <a:lstStyle/>
+                    <a:p>
+                      <a:r>
+                        <a:rPr kumimoji="1" lang="en-US" altLang="ja-JP" sz="1600"/>
+                        <a:t>p=0.2</a:t>
+                      </a:r>
+                      <a:endParaRPr kumimoji="1" lang="ja-JP" altLang="en-US" sz="1600"/>
+                    </a:p>
+                  </a:txBody>
+                  <a:tcPr marL="81395" marR="81395" marT="40698" marB="40698"/>
+                </a:tc>
+                <a:tc>
+                  <a:txBody>
+                    <a:bodyPr/>
+                    <a:lstStyle/>
+                    <a:p>
+                      <a:r>
+                        <a:rPr kumimoji="1" lang="en-US" altLang="ja-JP" sz="1600"/>
+                        <a:t>-</a:t>
+                      </a:r>
+                      <a:endParaRPr kumimoji="1" lang="ja-JP" altLang="en-US" sz="1600"/>
+                    </a:p>
+                  </a:txBody>
+                  <a:tcPr marL="81395" marR="81395" marT="40698" marB="40698"/>
+                </a:tc>
+                <a:extLst>
+                  <a:ext uri="{0D108BD9-81ED-4DB2-BD59-A6C34878D82A}">
+                    <a16:rowId xmlns:a16="http://schemas.microsoft.com/office/drawing/2014/main" val="2091509339"/>
+                  </a:ext>
+                </a:extLst>
+              </a:tr>
+              <a:tr h="358140">
+                <a:tc>
+                  <a:txBody>
+                    <a:bodyPr/>
+                    <a:lstStyle/>
+                    <a:p>
+                      <a:r>
+                        <a:rPr kumimoji="1" lang="en-US" altLang="ja-JP" sz="1600"/>
+                        <a:t>3</a:t>
+                      </a:r>
+                      <a:endParaRPr kumimoji="1" lang="ja-JP" altLang="en-US" sz="1600"/>
+                    </a:p>
+                  </a:txBody>
+                  <a:tcPr marL="81395" marR="81395" marT="40698" marB="40698"/>
+                </a:tc>
+                <a:tc>
+                  <a:txBody>
+                    <a:bodyPr/>
+                    <a:lstStyle/>
+                    <a:p>
+                      <a:r>
+                        <a:rPr kumimoji="1" lang="en-US" altLang="ja-JP" sz="1600"/>
+                        <a:t>Linear</a:t>
+                      </a:r>
+                      <a:endParaRPr kumimoji="1" lang="ja-JP" altLang="en-US" sz="1600"/>
+                    </a:p>
+                  </a:txBody>
+                  <a:tcPr marL="81395" marR="81395" marT="40698" marB="40698"/>
+                </a:tc>
+                <a:tc>
+                  <a:txBody>
+                    <a:bodyPr/>
+                    <a:lstStyle/>
+                    <a:p>
+                      <a:r>
+                        <a:rPr kumimoji="1" lang="en-US" altLang="ja-JP" sz="1600"/>
+                        <a:t>98</a:t>
+                      </a:r>
+                      <a:endParaRPr kumimoji="1" lang="ja-JP" altLang="en-US" sz="1600"/>
+                    </a:p>
+                  </a:txBody>
+                  <a:tcPr marL="81395" marR="81395" marT="40698" marB="40698"/>
+                </a:tc>
+                <a:tc>
+                  <a:txBody>
+                    <a:bodyPr/>
+                    <a:lstStyle/>
+                    <a:p>
+                      <a:r>
+                        <a:rPr kumimoji="1" lang="en-US" altLang="ja-JP" sz="1600" err="1"/>
+                        <a:t>ReLU</a:t>
+                      </a:r>
+                      <a:endParaRPr kumimoji="1" lang="ja-JP" altLang="en-US" sz="1600"/>
+                    </a:p>
+                  </a:txBody>
+                  <a:tcPr marL="81395" marR="81395" marT="40698" marB="40698"/>
+                </a:tc>
+                <a:extLst>
+                  <a:ext uri="{0D108BD9-81ED-4DB2-BD59-A6C34878D82A}">
+                    <a16:rowId xmlns:a16="http://schemas.microsoft.com/office/drawing/2014/main" val="2169240604"/>
+                  </a:ext>
+                </a:extLst>
+              </a:tr>
+              <a:tr h="358140">
+                <a:tc>
+                  <a:txBody>
+                    <a:bodyPr/>
+                    <a:lstStyle/>
+                    <a:p>
+                      <a:endParaRPr kumimoji="1" lang="ja-JP" altLang="en-US" sz="1600"/>
+                    </a:p>
+                  </a:txBody>
+                  <a:tcPr marL="81395" marR="81395" marT="40698" marB="40698"/>
+                </a:tc>
+                <a:tc>
+                  <a:txBody>
+                    <a:bodyPr/>
+                    <a:lstStyle/>
+                    <a:p>
+                      <a:r>
+                        <a:rPr kumimoji="1" lang="en-US" altLang="ja-JP" sz="1600"/>
+                        <a:t>Dropout</a:t>
+                      </a:r>
+                      <a:endParaRPr kumimoji="1" lang="ja-JP" altLang="en-US" sz="1600"/>
+                    </a:p>
+                  </a:txBody>
+                  <a:tcPr marL="81395" marR="81395" marT="40698" marB="40698"/>
+                </a:tc>
+                <a:tc>
+                  <a:txBody>
+                    <a:bodyPr/>
+                    <a:lstStyle/>
+                    <a:p>
+                      <a:r>
+                        <a:rPr kumimoji="1" lang="en-US" altLang="ja-JP" sz="1600"/>
+                        <a:t>p=0.2</a:t>
+                      </a:r>
+                      <a:endParaRPr kumimoji="1" lang="ja-JP" altLang="en-US" sz="1600"/>
+                    </a:p>
+                  </a:txBody>
+                  <a:tcPr marL="81395" marR="81395" marT="40698" marB="40698"/>
+                </a:tc>
+                <a:tc>
+                  <a:txBody>
+                    <a:bodyPr/>
+                    <a:lstStyle/>
+                    <a:p>
+                      <a:r>
+                        <a:rPr kumimoji="1" lang="en-US" altLang="ja-JP" sz="1600"/>
+                        <a:t>-</a:t>
+                      </a:r>
+                      <a:endParaRPr kumimoji="1" lang="ja-JP" altLang="en-US" sz="1600"/>
+                    </a:p>
+                  </a:txBody>
+                  <a:tcPr marL="81395" marR="81395" marT="40698" marB="40698"/>
+                </a:tc>
+                <a:extLst>
+                  <a:ext uri="{0D108BD9-81ED-4DB2-BD59-A6C34878D82A}">
+                    <a16:rowId xmlns:a16="http://schemas.microsoft.com/office/drawing/2014/main" val="2639242605"/>
+                  </a:ext>
+                </a:extLst>
+              </a:tr>
+              <a:tr h="358140">
+                <a:tc>
+                  <a:txBody>
+                    <a:bodyPr/>
+                    <a:lstStyle/>
+                    <a:p>
+                      <a:r>
+                        <a:rPr kumimoji="1" lang="en-US" altLang="ja-JP" sz="1600"/>
+                        <a:t>Output</a:t>
+                      </a:r>
+                      <a:endParaRPr kumimoji="1" lang="ja-JP" altLang="en-US" sz="1600"/>
+                    </a:p>
+                  </a:txBody>
+                  <a:tcPr marL="81395" marR="81395" marT="40698" marB="40698"/>
+                </a:tc>
+                <a:tc>
+                  <a:txBody>
+                    <a:bodyPr/>
+                    <a:lstStyle/>
+                    <a:p>
+                      <a:r>
+                        <a:rPr kumimoji="1" lang="en-US" altLang="ja-JP" sz="1600"/>
+                        <a:t>Linear</a:t>
+                      </a:r>
+                      <a:endParaRPr kumimoji="1" lang="ja-JP" altLang="en-US" sz="1600"/>
+                    </a:p>
+                  </a:txBody>
+                  <a:tcPr marL="81395" marR="81395" marT="40698" marB="40698"/>
+                </a:tc>
+                <a:tc>
+                  <a:txBody>
+                    <a:bodyPr/>
+                    <a:lstStyle/>
+                    <a:p>
+                      <a:r>
+                        <a:rPr kumimoji="1" lang="en-US" altLang="ja-JP" sz="1600"/>
+                        <a:t>10</a:t>
+                      </a:r>
+                      <a:endParaRPr kumimoji="1" lang="ja-JP" altLang="en-US" sz="1600"/>
+                    </a:p>
+                  </a:txBody>
+                  <a:tcPr marL="81395" marR="81395" marT="40698" marB="40698"/>
+                </a:tc>
+                <a:tc>
+                  <a:txBody>
+                    <a:bodyPr/>
+                    <a:lstStyle/>
+                    <a:p>
+                      <a:r>
+                        <a:rPr kumimoji="1" lang="en-US" altLang="ja-JP" sz="1600" dirty="0"/>
+                        <a:t>Log </a:t>
+                      </a:r>
+                      <a:r>
+                        <a:rPr kumimoji="1" lang="en-US" altLang="ja-JP" sz="1600" dirty="0" err="1"/>
+                        <a:t>Softmax</a:t>
+                      </a:r>
+                      <a:endParaRPr kumimoji="1" lang="ja-JP" altLang="en-US" sz="1600" dirty="0"/>
+                    </a:p>
+                  </a:txBody>
+                  <a:tcPr marL="81395" marR="81395" marT="40698" marB="40698"/>
+                </a:tc>
+                <a:extLst>
+                  <a:ext uri="{0D108BD9-81ED-4DB2-BD59-A6C34878D82A}">
+                    <a16:rowId xmlns:a16="http://schemas.microsoft.com/office/drawing/2014/main" val="775611540"/>
+                  </a:ext>
+                </a:extLst>
+              </a:tr>
+            </a:tbl>
+          </a:graphicData>
+        </a:graphic>
+      </p:graphicFrame>
     </p:spTree>
     <p:extLst>
       <p:ext uri="{BB962C8B-B14F-4D97-AF65-F5344CB8AC3E}">
@@ -4759,7 +6376,7 @@
           <p:cNvPr id="2" name="タイトル 1">
             <a:extLst>
               <a:ext uri="{FF2B5EF4-FFF2-40B4-BE49-F238E27FC236}">
-                <a16:creationId xmlns:a16="http://schemas.microsoft.com/office/drawing/2014/main" id="{0B7B0D47-A7D7-5539-5F46-80293CE0745C}"/>
+                <a16:creationId xmlns:a16="http://schemas.microsoft.com/office/drawing/2014/main" id="{F8102474-9DBE-BD8C-DDF5-1E604BA724A3}"/>
               </a:ext>
             </a:extLst>
           </p:cNvPr>
@@ -4776,42 +6393,91 @@
           <a:lstStyle/>
           <a:p>
             <a:r>
+              <a:rPr kumimoji="1" lang="en-US" altLang="ja-JP" dirty="0"/>
+              <a:t>Training </a:t>
+            </a:r>
+            <a:r>
               <a:rPr lang="en-US" altLang="ja-JP" dirty="0"/>
-              <a:t>Data Augmentation</a:t>
+              <a:t>Improvements</a:t>
             </a:r>
             <a:endParaRPr kumimoji="1" lang="ja-JP" altLang="en-US" dirty="0"/>
           </a:p>
         </p:txBody>
       </p:sp>
-      <p:sp>
-        <p:nvSpPr>
-          <p:cNvPr id="3" name="コンテンツ プレースホルダー 2">
+      <p:pic>
+        <p:nvPicPr>
+          <p:cNvPr id="7" name="コンテンツ プレースホルダー 6" descr="グラフ, 折れ線グラフ&#10;&#10;AI 生成コンテンツは誤りを含む可能性があります。">
             <a:extLst>
               <a:ext uri="{FF2B5EF4-FFF2-40B4-BE49-F238E27FC236}">
-                <a16:creationId xmlns:a16="http://schemas.microsoft.com/office/drawing/2014/main" id="{847A6AEA-C476-27F1-905F-90747AFA9557}"/>
+                <a16:creationId xmlns:a16="http://schemas.microsoft.com/office/drawing/2014/main" id="{7146BF29-0052-D5A7-4667-774DB36C6938}"/>
               </a:ext>
             </a:extLst>
           </p:cNvPr>
-          <p:cNvSpPr>
-            <a:spLocks noGrp="1"/>
-          </p:cNvSpPr>
-          <p:nvPr>
-            <p:ph idx="1"/>
-          </p:nvPr>
-        </p:nvSpPr>
-        <p:spPr/>
-        <p:txBody>
-          <a:bodyPr/>
-          <a:lstStyle/>
-          <a:p>
-            <a:endParaRPr kumimoji="1" lang="ja-JP" altLang="en-US"/>
-          </a:p>
-        </p:txBody>
-      </p:sp>
+          <p:cNvPicPr>
+            <a:picLocks noGrp="1" noChangeAspect="1"/>
+          </p:cNvPicPr>
+          <p:nvPr>
+            <p:ph sz="half" idx="1"/>
+          </p:nvPr>
+        </p:nvPicPr>
+        <p:blipFill>
+          <a:blip r:embed="rId2">
+            <a:extLst>
+              <a:ext uri="{28A0092B-C50C-407E-A947-70E740481C1C}">
+                <a14:useLocalDpi xmlns:a14="http://schemas.microsoft.com/office/drawing/2010/main" val="0"/>
+              </a:ext>
+            </a:extLst>
+          </a:blip>
+          <a:stretch>
+            <a:fillRect/>
+          </a:stretch>
+        </p:blipFill>
+        <p:spPr>
+          <a:xfrm>
+            <a:off x="1371600" y="2322870"/>
+            <a:ext cx="4448175" cy="3507659"/>
+          </a:xfrm>
+        </p:spPr>
+      </p:pic>
+      <p:pic>
+        <p:nvPicPr>
+          <p:cNvPr id="9" name="コンテンツ プレースホルダー 8" descr="グラフィカル ユーザー インターフェイス が含まれている画像&#10;&#10;AI 生成コンテンツは誤りを含む可能性があります。">
+            <a:extLst>
+              <a:ext uri="{FF2B5EF4-FFF2-40B4-BE49-F238E27FC236}">
+                <a16:creationId xmlns:a16="http://schemas.microsoft.com/office/drawing/2014/main" id="{E5A10D4D-2A40-B36F-3F90-3C435901EBE1}"/>
+              </a:ext>
+            </a:extLst>
+          </p:cNvPr>
+          <p:cNvPicPr>
+            <a:picLocks noGrp="1" noChangeAspect="1"/>
+          </p:cNvPicPr>
+          <p:nvPr>
+            <p:ph sz="half" idx="2"/>
+          </p:nvPr>
+        </p:nvPicPr>
+        <p:blipFill>
+          <a:blip r:embed="rId3">
+            <a:extLst>
+              <a:ext uri="{28A0092B-C50C-407E-A947-70E740481C1C}">
+                <a14:useLocalDpi xmlns:a14="http://schemas.microsoft.com/office/drawing/2010/main" val="0"/>
+              </a:ext>
+            </a:extLst>
+          </a:blip>
+          <a:stretch>
+            <a:fillRect/>
+          </a:stretch>
+        </p:blipFill>
+        <p:spPr>
+          <a:xfrm>
+            <a:off x="6671646" y="2286000"/>
+            <a:ext cx="4154133" cy="3581400"/>
+          </a:xfrm>
+        </p:spPr>
+      </p:pic>
     </p:spTree>
     <p:extLst>
       <p:ext uri="{BB962C8B-B14F-4D97-AF65-F5344CB8AC3E}">
-        <p14:creationId xmlns:p14="http://schemas.microsoft.com/office/powerpoint/2010/main" val="3471478476"/>
+        <p14:creationId xmlns:p14="http://schemas.microsoft.com/office/powerpoint/2010/main" val="2681167170"/>
       </p:ext>
     </p:extLst>
   </p:cSld>
@@ -4843,7 +6509,7 @@
           <p:cNvPr id="2" name="タイトル 1">
             <a:extLst>
               <a:ext uri="{FF2B5EF4-FFF2-40B4-BE49-F238E27FC236}">
-                <a16:creationId xmlns:a16="http://schemas.microsoft.com/office/drawing/2014/main" id="{E712944C-823B-B741-EDC3-7CD8C1F8DDB7}"/>
+                <a16:creationId xmlns:a16="http://schemas.microsoft.com/office/drawing/2014/main" id="{EFECE46C-FFB3-8185-6EF7-17A41D69E6A6}"/>
               </a:ext>
             </a:extLst>
           </p:cNvPr>
@@ -4861,7 +6527,7 @@
           <a:p>
             <a:r>
               <a:rPr kumimoji="1" lang="en-US" altLang="ja-JP" dirty="0"/>
-              <a:t>Training Results</a:t>
+              <a:t>CNN Architecture</a:t>
             </a:r>
             <a:endParaRPr kumimoji="1" lang="ja-JP" altLang="en-US" dirty="0"/>
           </a:p>
@@ -4872,7 +6538,7 @@
           <p:cNvPr id="3" name="コンテンツ プレースホルダー 2">
             <a:extLst>
               <a:ext uri="{FF2B5EF4-FFF2-40B4-BE49-F238E27FC236}">
-                <a16:creationId xmlns:a16="http://schemas.microsoft.com/office/drawing/2014/main" id="{E9F724B5-3406-AA3E-5768-844EB0835C37}"/>
+                <a16:creationId xmlns:a16="http://schemas.microsoft.com/office/drawing/2014/main" id="{D9B8552C-13F0-A9BE-12FB-4E1E4C3937B7}"/>
               </a:ext>
             </a:extLst>
           </p:cNvPr>
@@ -4888,14 +6554,61 @@
           <a:bodyPr/>
           <a:lstStyle/>
           <a:p>
-            <a:endParaRPr kumimoji="1" lang="ja-JP" altLang="en-US"/>
+            <a:r>
+              <a:rPr lang="en-US" altLang="ja-JP" dirty="0"/>
+              <a:t>4 convolution layers with 2 max pool layers.</a:t>
+            </a:r>
+          </a:p>
+          <a:p>
+            <a:r>
+              <a:rPr kumimoji="1" lang="en-US" altLang="ja-JP" dirty="0"/>
+              <a:t>3 Dense layers after flattening the output of the convolution layers.</a:t>
+            </a:r>
+            <a:endParaRPr kumimoji="1" lang="ja-JP" altLang="en-US" dirty="0"/>
           </a:p>
         </p:txBody>
       </p:sp>
+      <p:pic>
+        <p:nvPicPr>
+          <p:cNvPr id="5" name="グラフィックス 4">
+            <a:extLst>
+              <a:ext uri="{FF2B5EF4-FFF2-40B4-BE49-F238E27FC236}">
+                <a16:creationId xmlns:a16="http://schemas.microsoft.com/office/drawing/2014/main" id="{08A53BBB-04BB-58AE-7CB0-75E168F77001}"/>
+              </a:ext>
+            </a:extLst>
+          </p:cNvPr>
+          <p:cNvPicPr>
+            <a:picLocks noChangeAspect="1"/>
+          </p:cNvPicPr>
+          <p:nvPr/>
+        </p:nvPicPr>
+        <p:blipFill>
+          <a:blip r:embed="rId2">
+            <a:extLst>
+              <a:ext uri="{96DAC541-7B7A-43D3-8B79-37D633B846F1}">
+                <asvg:svgBlip xmlns:asvg="http://schemas.microsoft.com/office/drawing/2016/SVG/main" r:embed="rId3"/>
+              </a:ext>
+            </a:extLst>
+          </a:blip>
+          <a:srcRect l="26188" t="38334" b="31666"/>
+          <a:stretch>
+            <a:fillRect/>
+          </a:stretch>
+        </p:blipFill>
+        <p:spPr>
+          <a:xfrm>
+            <a:off x="1681883" y="3429000"/>
+            <a:ext cx="8828233" cy="2057401"/>
+          </a:xfrm>
+          <a:prstGeom prst="rect">
+            <a:avLst/>
+          </a:prstGeom>
+        </p:spPr>
+      </p:pic>
     </p:spTree>
     <p:extLst>
       <p:ext uri="{BB962C8B-B14F-4D97-AF65-F5344CB8AC3E}">
-        <p14:creationId xmlns:p14="http://schemas.microsoft.com/office/powerpoint/2010/main" val="498845173"/>
+        <p14:creationId xmlns:p14="http://schemas.microsoft.com/office/powerpoint/2010/main" val="700771612"/>
       </p:ext>
     </p:extLst>
   </p:cSld>
@@ -4908,6 +6621,14 @@
 <file path=ppt/slides/slide7.xml><?xml version="1.0" encoding="utf-8"?>
 <p:sld xmlns:a="http://schemas.openxmlformats.org/drawingml/2006/main" xmlns:r="http://schemas.openxmlformats.org/officeDocument/2006/relationships" xmlns:p="http://schemas.openxmlformats.org/presentationml/2006/main">
   <p:cSld>
+    <p:bg>
+      <p:bgPr>
+        <a:solidFill>
+          <a:schemeClr val="bg2"/>
+        </a:solidFill>
+        <a:effectLst/>
+      </p:bgPr>
+    </p:bg>
     <p:spTree>
       <p:nvGrpSpPr>
         <p:cNvPr id="1" name=""/>
@@ -4927,7 +6648,7 @@
           <p:cNvPr id="2" name="タイトル 1">
             <a:extLst>
               <a:ext uri="{FF2B5EF4-FFF2-40B4-BE49-F238E27FC236}">
-                <a16:creationId xmlns:a16="http://schemas.microsoft.com/office/drawing/2014/main" id="{20D3DF80-F0DA-1556-353B-295C73F06B7D}"/>
+                <a16:creationId xmlns:a16="http://schemas.microsoft.com/office/drawing/2014/main" id="{123D7C79-3DDD-E2BD-6A43-D3D0BDE83886}"/>
               </a:ext>
             </a:extLst>
           </p:cNvPr>
@@ -4938,48 +6659,1566 @@
             <p:ph type="title"/>
           </p:nvPr>
         </p:nvSpPr>
-        <p:spPr/>
+        <p:spPr>
+          <a:xfrm>
+            <a:off x="1371600" y="685800"/>
+            <a:ext cx="9601200" cy="1485900"/>
+          </a:xfrm>
+        </p:spPr>
         <p:txBody>
-          <a:bodyPr/>
+          <a:bodyPr>
+            <a:normAutofit/>
+          </a:bodyPr>
           <a:lstStyle/>
           <a:p>
             <a:r>
-              <a:rPr lang="en-US" altLang="ja-JP" dirty="0"/>
-              <a:t>Accuracy Comparison</a:t>
+              <a:rPr kumimoji="1" lang="en-US" altLang="ja-JP" dirty="0"/>
+              <a:t>Overall:</a:t>
             </a:r>
             <a:endParaRPr kumimoji="1" lang="ja-JP" altLang="en-US" dirty="0"/>
           </a:p>
         </p:txBody>
       </p:sp>
-      <p:sp>
-        <p:nvSpPr>
-          <p:cNvPr id="3" name="コンテンツ プレースホルダー 2">
+      <p:graphicFrame>
+        <p:nvGraphicFramePr>
+          <p:cNvPr id="4" name="コンテンツ プレースホルダー 3">
             <a:extLst>
               <a:ext uri="{FF2B5EF4-FFF2-40B4-BE49-F238E27FC236}">
-                <a16:creationId xmlns:a16="http://schemas.microsoft.com/office/drawing/2014/main" id="{F14AE0E8-D48D-930E-1830-53366B5B9FA7}"/>
+                <a16:creationId xmlns:a16="http://schemas.microsoft.com/office/drawing/2014/main" id="{C8302839-D377-4C15-5136-B62C86C30E85}"/>
               </a:ext>
             </a:extLst>
           </p:cNvPr>
-          <p:cNvSpPr>
-            <a:spLocks noGrp="1"/>
-          </p:cNvSpPr>
+          <p:cNvGraphicFramePr>
+            <a:graphicFrameLocks noGrp="1"/>
+          </p:cNvGraphicFramePr>
           <p:nvPr>
             <p:ph idx="1"/>
-          </p:nvPr>
-        </p:nvSpPr>
-        <p:spPr/>
-        <p:txBody>
-          <a:bodyPr/>
-          <a:lstStyle/>
-          <a:p>
-            <a:endParaRPr kumimoji="1" lang="ja-JP" altLang="en-US"/>
-          </a:p>
-        </p:txBody>
-      </p:sp>
+            <p:extLst>
+              <p:ext uri="{D42A27DB-BD31-4B8C-83A1-F6EECF244321}">
+                <p14:modId xmlns:p14="http://schemas.microsoft.com/office/powerpoint/2010/main" val="3614208744"/>
+              </p:ext>
+            </p:extLst>
+          </p:nvPr>
+        </p:nvGraphicFramePr>
+        <p:xfrm>
+          <a:off x="1484792" y="2286000"/>
+          <a:ext cx="9374819" cy="3581410"/>
+        </p:xfrm>
+        <a:graphic>
+          <a:graphicData uri="http://schemas.openxmlformats.org/drawingml/2006/table">
+            <a:tbl>
+              <a:tblPr firstRow="1" bandRow="1">
+                <a:tableStyleId>{073A0DAA-6AF3-43AB-8588-CEC1D06C72B9}</a:tableStyleId>
+              </a:tblPr>
+              <a:tblGrid>
+                <a:gridCol w="1275444">
+                  <a:extLst>
+                    <a:ext uri="{9D8B030D-6E8A-4147-A177-3AD203B41FA5}">
+                      <a16:colId xmlns:a16="http://schemas.microsoft.com/office/drawing/2014/main" val="1879966933"/>
+                    </a:ext>
+                  </a:extLst>
+                </a:gridCol>
+                <a:gridCol w="1361792">
+                  <a:extLst>
+                    <a:ext uri="{9D8B030D-6E8A-4147-A177-3AD203B41FA5}">
+                      <a16:colId xmlns:a16="http://schemas.microsoft.com/office/drawing/2014/main" val="1963412920"/>
+                    </a:ext>
+                  </a:extLst>
+                </a:gridCol>
+                <a:gridCol w="1502877">
+                  <a:extLst>
+                    <a:ext uri="{9D8B030D-6E8A-4147-A177-3AD203B41FA5}">
+                      <a16:colId xmlns:a16="http://schemas.microsoft.com/office/drawing/2014/main" val="1574051892"/>
+                    </a:ext>
+                  </a:extLst>
+                </a:gridCol>
+                <a:gridCol w="1275444">
+                  <a:extLst>
+                    <a:ext uri="{9D8B030D-6E8A-4147-A177-3AD203B41FA5}">
+                      <a16:colId xmlns:a16="http://schemas.microsoft.com/office/drawing/2014/main" val="4030585622"/>
+                    </a:ext>
+                  </a:extLst>
+                </a:gridCol>
+                <a:gridCol w="1293798">
+                  <a:extLst>
+                    <a:ext uri="{9D8B030D-6E8A-4147-A177-3AD203B41FA5}">
+                      <a16:colId xmlns:a16="http://schemas.microsoft.com/office/drawing/2014/main" val="3712970586"/>
+                    </a:ext>
+                  </a:extLst>
+                </a:gridCol>
+                <a:gridCol w="1275444">
+                  <a:extLst>
+                    <a:ext uri="{9D8B030D-6E8A-4147-A177-3AD203B41FA5}">
+                      <a16:colId xmlns:a16="http://schemas.microsoft.com/office/drawing/2014/main" val="1158452690"/>
+                    </a:ext>
+                  </a:extLst>
+                </a:gridCol>
+                <a:gridCol w="1390020">
+                  <a:extLst>
+                    <a:ext uri="{9D8B030D-6E8A-4147-A177-3AD203B41FA5}">
+                      <a16:colId xmlns:a16="http://schemas.microsoft.com/office/drawing/2014/main" val="3634120696"/>
+                    </a:ext>
+                  </a:extLst>
+                </a:gridCol>
+              </a:tblGrid>
+              <a:tr h="255815">
+                <a:tc gridSpan="2">
+                  <a:txBody>
+                    <a:bodyPr/>
+                    <a:lstStyle/>
+                    <a:p>
+                      <a:r>
+                        <a:rPr kumimoji="1" lang="en-US" altLang="ja-JP" sz="1100" dirty="0"/>
+                        <a:t>Layer</a:t>
+                      </a:r>
+                      <a:endParaRPr kumimoji="1" lang="ja-JP" altLang="en-US" sz="1100" dirty="0"/>
+                    </a:p>
+                  </a:txBody>
+                  <a:tcPr marL="58140" marR="58140" marT="29070" marB="29070"/>
+                </a:tc>
+                <a:tc hMerge="1">
+                  <a:txBody>
+                    <a:bodyPr/>
+                    <a:lstStyle/>
+                    <a:p>
+                      <a:endParaRPr kumimoji="1" lang="ja-JP" altLang="en-US" dirty="0"/>
+                    </a:p>
+                  </a:txBody>
+                  <a:tcPr/>
+                </a:tc>
+                <a:tc>
+                  <a:txBody>
+                    <a:bodyPr/>
+                    <a:lstStyle/>
+                    <a:p>
+                      <a:r>
+                        <a:rPr kumimoji="1" lang="en-US" altLang="ja-JP" sz="1100"/>
+                        <a:t>Feature Maps</a:t>
+                      </a:r>
+                      <a:endParaRPr kumimoji="1" lang="ja-JP" altLang="en-US" sz="1100"/>
+                    </a:p>
+                  </a:txBody>
+                  <a:tcPr marL="58140" marR="58140" marT="29070" marB="29070"/>
+                </a:tc>
+                <a:tc>
+                  <a:txBody>
+                    <a:bodyPr/>
+                    <a:lstStyle/>
+                    <a:p>
+                      <a:r>
+                        <a:rPr kumimoji="1" lang="en-US" altLang="ja-JP" sz="1100"/>
+                        <a:t>Size</a:t>
+                      </a:r>
+                      <a:endParaRPr kumimoji="1" lang="ja-JP" altLang="en-US" sz="1100"/>
+                    </a:p>
+                  </a:txBody>
+                  <a:tcPr marL="58140" marR="58140" marT="29070" marB="29070"/>
+                </a:tc>
+                <a:tc>
+                  <a:txBody>
+                    <a:bodyPr/>
+                    <a:lstStyle/>
+                    <a:p>
+                      <a:r>
+                        <a:rPr kumimoji="1" lang="en-US" altLang="ja-JP" sz="1100"/>
+                        <a:t>Kernel Size</a:t>
+                      </a:r>
+                      <a:endParaRPr kumimoji="1" lang="ja-JP" altLang="en-US" sz="1100"/>
+                    </a:p>
+                  </a:txBody>
+                  <a:tcPr marL="58140" marR="58140" marT="29070" marB="29070"/>
+                </a:tc>
+                <a:tc>
+                  <a:txBody>
+                    <a:bodyPr/>
+                    <a:lstStyle/>
+                    <a:p>
+                      <a:r>
+                        <a:rPr kumimoji="1" lang="en-US" altLang="ja-JP" sz="1100"/>
+                        <a:t>Stride</a:t>
+                      </a:r>
+                      <a:endParaRPr kumimoji="1" lang="ja-JP" altLang="en-US" sz="1100"/>
+                    </a:p>
+                  </a:txBody>
+                  <a:tcPr marL="58140" marR="58140" marT="29070" marB="29070"/>
+                </a:tc>
+                <a:tc>
+                  <a:txBody>
+                    <a:bodyPr/>
+                    <a:lstStyle/>
+                    <a:p>
+                      <a:r>
+                        <a:rPr kumimoji="1" lang="en-US" altLang="ja-JP" sz="1100"/>
+                        <a:t>Activation</a:t>
+                      </a:r>
+                      <a:endParaRPr kumimoji="1" lang="ja-JP" altLang="en-US" sz="1100"/>
+                    </a:p>
+                  </a:txBody>
+                  <a:tcPr marL="58140" marR="58140" marT="29070" marB="29070"/>
+                </a:tc>
+                <a:extLst>
+                  <a:ext uri="{0D108BD9-81ED-4DB2-BD59-A6C34878D82A}">
+                    <a16:rowId xmlns:a16="http://schemas.microsoft.com/office/drawing/2014/main" val="3954135237"/>
+                  </a:ext>
+                </a:extLst>
+              </a:tr>
+              <a:tr h="255815">
+                <a:tc>
+                  <a:txBody>
+                    <a:bodyPr/>
+                    <a:lstStyle/>
+                    <a:p>
+                      <a:r>
+                        <a:rPr kumimoji="1" lang="en-US" altLang="ja-JP" sz="1100"/>
+                        <a:t>Input</a:t>
+                      </a:r>
+                      <a:endParaRPr kumimoji="1" lang="ja-JP" altLang="en-US" sz="1100"/>
+                    </a:p>
+                  </a:txBody>
+                  <a:tcPr marL="58140" marR="58140" marT="29070" marB="29070"/>
+                </a:tc>
+                <a:tc>
+                  <a:txBody>
+                    <a:bodyPr/>
+                    <a:lstStyle/>
+                    <a:p>
+                      <a:r>
+                        <a:rPr kumimoji="1" lang="en-US" altLang="ja-JP" sz="1100"/>
+                        <a:t>Image</a:t>
+                      </a:r>
+                      <a:endParaRPr kumimoji="1" lang="ja-JP" altLang="en-US" sz="1100"/>
+                    </a:p>
+                  </a:txBody>
+                  <a:tcPr marL="58140" marR="58140" marT="29070" marB="29070"/>
+                </a:tc>
+                <a:tc>
+                  <a:txBody>
+                    <a:bodyPr/>
+                    <a:lstStyle/>
+                    <a:p>
+                      <a:r>
+                        <a:rPr kumimoji="1" lang="en-US" altLang="ja-JP" sz="1100"/>
+                        <a:t>1</a:t>
+                      </a:r>
+                      <a:endParaRPr kumimoji="1" lang="ja-JP" altLang="en-US" sz="1100"/>
+                    </a:p>
+                  </a:txBody>
+                  <a:tcPr marL="58140" marR="58140" marT="29070" marB="29070"/>
+                </a:tc>
+                <a:tc>
+                  <a:txBody>
+                    <a:bodyPr/>
+                    <a:lstStyle/>
+                    <a:p>
+                      <a:r>
+                        <a:rPr kumimoji="1" lang="en-US" altLang="ja-JP" sz="1100"/>
+                        <a:t>28x28x1</a:t>
+                      </a:r>
+                      <a:endParaRPr kumimoji="1" lang="ja-JP" altLang="en-US" sz="1100"/>
+                    </a:p>
+                  </a:txBody>
+                  <a:tcPr marL="58140" marR="58140" marT="29070" marB="29070"/>
+                </a:tc>
+                <a:tc>
+                  <a:txBody>
+                    <a:bodyPr/>
+                    <a:lstStyle/>
+                    <a:p>
+                      <a:r>
+                        <a:rPr kumimoji="1" lang="en-US" altLang="ja-JP" sz="1100"/>
+                        <a:t>-</a:t>
+                      </a:r>
+                      <a:endParaRPr kumimoji="1" lang="ja-JP" altLang="en-US" sz="1100"/>
+                    </a:p>
+                  </a:txBody>
+                  <a:tcPr marL="58140" marR="58140" marT="29070" marB="29070"/>
+                </a:tc>
+                <a:tc>
+                  <a:txBody>
+                    <a:bodyPr/>
+                    <a:lstStyle/>
+                    <a:p>
+                      <a:r>
+                        <a:rPr kumimoji="1" lang="en-US" altLang="ja-JP" sz="1100"/>
+                        <a:t>-</a:t>
+                      </a:r>
+                      <a:endParaRPr kumimoji="1" lang="ja-JP" altLang="en-US" sz="1100"/>
+                    </a:p>
+                  </a:txBody>
+                  <a:tcPr marL="58140" marR="58140" marT="29070" marB="29070"/>
+                </a:tc>
+                <a:tc>
+                  <a:txBody>
+                    <a:bodyPr/>
+                    <a:lstStyle/>
+                    <a:p>
+                      <a:r>
+                        <a:rPr kumimoji="1" lang="en-US" altLang="ja-JP" sz="1100"/>
+                        <a:t>-</a:t>
+                      </a:r>
+                      <a:endParaRPr kumimoji="1" lang="ja-JP" altLang="en-US" sz="1100"/>
+                    </a:p>
+                  </a:txBody>
+                  <a:tcPr marL="58140" marR="58140" marT="29070" marB="29070"/>
+                </a:tc>
+                <a:extLst>
+                  <a:ext uri="{0D108BD9-81ED-4DB2-BD59-A6C34878D82A}">
+                    <a16:rowId xmlns:a16="http://schemas.microsoft.com/office/drawing/2014/main" val="548919792"/>
+                  </a:ext>
+                </a:extLst>
+              </a:tr>
+              <a:tr h="255815">
+                <a:tc>
+                  <a:txBody>
+                    <a:bodyPr/>
+                    <a:lstStyle/>
+                    <a:p>
+                      <a:r>
+                        <a:rPr kumimoji="1" lang="en-US" altLang="ja-JP" sz="1100"/>
+                        <a:t>1</a:t>
+                      </a:r>
+                      <a:endParaRPr kumimoji="1" lang="ja-JP" altLang="en-US" sz="1100"/>
+                    </a:p>
+                  </a:txBody>
+                  <a:tcPr marL="58140" marR="58140" marT="29070" marB="29070"/>
+                </a:tc>
+                <a:tc>
+                  <a:txBody>
+                    <a:bodyPr/>
+                    <a:lstStyle/>
+                    <a:p>
+                      <a:r>
+                        <a:rPr kumimoji="1" lang="en-US" altLang="ja-JP" sz="1100"/>
+                        <a:t>Convolution</a:t>
+                      </a:r>
+                      <a:endParaRPr kumimoji="1" lang="ja-JP" altLang="en-US" sz="1100"/>
+                    </a:p>
+                  </a:txBody>
+                  <a:tcPr marL="58140" marR="58140" marT="29070" marB="29070"/>
+                </a:tc>
+                <a:tc>
+                  <a:txBody>
+                    <a:bodyPr/>
+                    <a:lstStyle/>
+                    <a:p>
+                      <a:r>
+                        <a:rPr kumimoji="1" lang="en-US" altLang="ja-JP" sz="1100"/>
+                        <a:t>32</a:t>
+                      </a:r>
+                      <a:endParaRPr kumimoji="1" lang="ja-JP" altLang="en-US" sz="1100"/>
+                    </a:p>
+                  </a:txBody>
+                  <a:tcPr marL="58140" marR="58140" marT="29070" marB="29070"/>
+                </a:tc>
+                <a:tc>
+                  <a:txBody>
+                    <a:bodyPr/>
+                    <a:lstStyle/>
+                    <a:p>
+                      <a:r>
+                        <a:rPr kumimoji="1" lang="en-US" altLang="ja-JP" sz="1100"/>
+                        <a:t>26x26x32</a:t>
+                      </a:r>
+                      <a:endParaRPr kumimoji="1" lang="ja-JP" altLang="en-US" sz="1100"/>
+                    </a:p>
+                  </a:txBody>
+                  <a:tcPr marL="58140" marR="58140" marT="29070" marB="29070"/>
+                </a:tc>
+                <a:tc>
+                  <a:txBody>
+                    <a:bodyPr/>
+                    <a:lstStyle/>
+                    <a:p>
+                      <a:r>
+                        <a:rPr kumimoji="1" lang="en-US" altLang="ja-JP" sz="1100"/>
+                        <a:t>3x3</a:t>
+                      </a:r>
+                      <a:endParaRPr kumimoji="1" lang="ja-JP" altLang="en-US" sz="1100"/>
+                    </a:p>
+                  </a:txBody>
+                  <a:tcPr marL="58140" marR="58140" marT="29070" marB="29070"/>
+                </a:tc>
+                <a:tc>
+                  <a:txBody>
+                    <a:bodyPr/>
+                    <a:lstStyle/>
+                    <a:p>
+                      <a:r>
+                        <a:rPr kumimoji="1" lang="en-US" altLang="ja-JP" sz="1100"/>
+                        <a:t>(1,1)</a:t>
+                      </a:r>
+                      <a:endParaRPr kumimoji="1" lang="ja-JP" altLang="en-US" sz="1100"/>
+                    </a:p>
+                  </a:txBody>
+                  <a:tcPr marL="58140" marR="58140" marT="29070" marB="29070"/>
+                </a:tc>
+                <a:tc>
+                  <a:txBody>
+                    <a:bodyPr/>
+                    <a:lstStyle/>
+                    <a:p>
+                      <a:r>
+                        <a:rPr kumimoji="1" lang="en-US" altLang="ja-JP" sz="1100"/>
+                        <a:t>ReLU</a:t>
+                      </a:r>
+                      <a:endParaRPr kumimoji="1" lang="ja-JP" altLang="en-US" sz="1100"/>
+                    </a:p>
+                  </a:txBody>
+                  <a:tcPr marL="58140" marR="58140" marT="29070" marB="29070"/>
+                </a:tc>
+                <a:extLst>
+                  <a:ext uri="{0D108BD9-81ED-4DB2-BD59-A6C34878D82A}">
+                    <a16:rowId xmlns:a16="http://schemas.microsoft.com/office/drawing/2014/main" val="3886249736"/>
+                  </a:ext>
+                </a:extLst>
+              </a:tr>
+              <a:tr h="255815">
+                <a:tc>
+                  <a:txBody>
+                    <a:bodyPr/>
+                    <a:lstStyle/>
+                    <a:p>
+                      <a:r>
+                        <a:rPr kumimoji="1" lang="en-US" altLang="ja-JP" sz="1100"/>
+                        <a:t>2</a:t>
+                      </a:r>
+                      <a:endParaRPr kumimoji="1" lang="ja-JP" altLang="en-US" sz="1100"/>
+                    </a:p>
+                  </a:txBody>
+                  <a:tcPr marL="58140" marR="58140" marT="29070" marB="29070"/>
+                </a:tc>
+                <a:tc>
+                  <a:txBody>
+                    <a:bodyPr/>
+                    <a:lstStyle/>
+                    <a:p>
+                      <a:r>
+                        <a:rPr kumimoji="1" lang="en-US" altLang="ja-JP" sz="1100"/>
+                        <a:t>Convolution</a:t>
+                      </a:r>
+                      <a:endParaRPr kumimoji="1" lang="ja-JP" altLang="en-US" sz="1100"/>
+                    </a:p>
+                  </a:txBody>
+                  <a:tcPr marL="58140" marR="58140" marT="29070" marB="29070"/>
+                </a:tc>
+                <a:tc>
+                  <a:txBody>
+                    <a:bodyPr/>
+                    <a:lstStyle/>
+                    <a:p>
+                      <a:r>
+                        <a:rPr kumimoji="1" lang="en-US" altLang="ja-JP" sz="1100"/>
+                        <a:t>32</a:t>
+                      </a:r>
+                      <a:endParaRPr kumimoji="1" lang="ja-JP" altLang="en-US" sz="1100"/>
+                    </a:p>
+                  </a:txBody>
+                  <a:tcPr marL="58140" marR="58140" marT="29070" marB="29070"/>
+                </a:tc>
+                <a:tc>
+                  <a:txBody>
+                    <a:bodyPr/>
+                    <a:lstStyle/>
+                    <a:p>
+                      <a:r>
+                        <a:rPr kumimoji="1" lang="en-US" altLang="ja-JP" sz="1100"/>
+                        <a:t>24x24x32</a:t>
+                      </a:r>
+                      <a:endParaRPr kumimoji="1" lang="ja-JP" altLang="en-US" sz="1100"/>
+                    </a:p>
+                  </a:txBody>
+                  <a:tcPr marL="58140" marR="58140" marT="29070" marB="29070"/>
+                </a:tc>
+                <a:tc>
+                  <a:txBody>
+                    <a:bodyPr/>
+                    <a:lstStyle/>
+                    <a:p>
+                      <a:r>
+                        <a:rPr kumimoji="1" lang="en-US" altLang="ja-JP" sz="1100"/>
+                        <a:t>3x3</a:t>
+                      </a:r>
+                      <a:endParaRPr kumimoji="1" lang="ja-JP" altLang="en-US" sz="1100"/>
+                    </a:p>
+                  </a:txBody>
+                  <a:tcPr marL="58140" marR="58140" marT="29070" marB="29070"/>
+                </a:tc>
+                <a:tc>
+                  <a:txBody>
+                    <a:bodyPr/>
+                    <a:lstStyle/>
+                    <a:p>
+                      <a:r>
+                        <a:rPr kumimoji="1" lang="en-US" altLang="ja-JP" sz="1100"/>
+                        <a:t>(1,1)</a:t>
+                      </a:r>
+                      <a:endParaRPr kumimoji="1" lang="ja-JP" altLang="en-US" sz="1100"/>
+                    </a:p>
+                  </a:txBody>
+                  <a:tcPr marL="58140" marR="58140" marT="29070" marB="29070"/>
+                </a:tc>
+                <a:tc>
+                  <a:txBody>
+                    <a:bodyPr/>
+                    <a:lstStyle/>
+                    <a:p>
+                      <a:r>
+                        <a:rPr kumimoji="1" lang="en-US" altLang="ja-JP" sz="1100"/>
+                        <a:t>ReLU</a:t>
+                      </a:r>
+                      <a:endParaRPr kumimoji="1" lang="ja-JP" altLang="en-US" sz="1100"/>
+                    </a:p>
+                  </a:txBody>
+                  <a:tcPr marL="58140" marR="58140" marT="29070" marB="29070"/>
+                </a:tc>
+                <a:extLst>
+                  <a:ext uri="{0D108BD9-81ED-4DB2-BD59-A6C34878D82A}">
+                    <a16:rowId xmlns:a16="http://schemas.microsoft.com/office/drawing/2014/main" val="3027534296"/>
+                  </a:ext>
+                </a:extLst>
+              </a:tr>
+              <a:tr h="255815">
+                <a:tc>
+                  <a:txBody>
+                    <a:bodyPr/>
+                    <a:lstStyle/>
+                    <a:p>
+                      <a:endParaRPr kumimoji="1" lang="ja-JP" altLang="en-US" sz="1100"/>
+                    </a:p>
+                  </a:txBody>
+                  <a:tcPr marL="58140" marR="58140" marT="29070" marB="29070"/>
+                </a:tc>
+                <a:tc>
+                  <a:txBody>
+                    <a:bodyPr/>
+                    <a:lstStyle/>
+                    <a:p>
+                      <a:r>
+                        <a:rPr kumimoji="1" lang="en-US" altLang="ja-JP" sz="1100"/>
+                        <a:t>Max Pooling</a:t>
+                      </a:r>
+                      <a:endParaRPr kumimoji="1" lang="ja-JP" altLang="en-US" sz="1100"/>
+                    </a:p>
+                  </a:txBody>
+                  <a:tcPr marL="58140" marR="58140" marT="29070" marB="29070"/>
+                </a:tc>
+                <a:tc>
+                  <a:txBody>
+                    <a:bodyPr/>
+                    <a:lstStyle/>
+                    <a:p>
+                      <a:r>
+                        <a:rPr kumimoji="1" lang="en-US" altLang="ja-JP" sz="1100"/>
+                        <a:t>32</a:t>
+                      </a:r>
+                      <a:endParaRPr kumimoji="1" lang="ja-JP" altLang="en-US" sz="1100"/>
+                    </a:p>
+                  </a:txBody>
+                  <a:tcPr marL="58140" marR="58140" marT="29070" marB="29070"/>
+                </a:tc>
+                <a:tc>
+                  <a:txBody>
+                    <a:bodyPr/>
+                    <a:lstStyle/>
+                    <a:p>
+                      <a:r>
+                        <a:rPr kumimoji="1" lang="en-US" altLang="ja-JP" sz="1100"/>
+                        <a:t>12x12x32</a:t>
+                      </a:r>
+                      <a:endParaRPr kumimoji="1" lang="ja-JP" altLang="en-US" sz="1100"/>
+                    </a:p>
+                  </a:txBody>
+                  <a:tcPr marL="58140" marR="58140" marT="29070" marB="29070"/>
+                </a:tc>
+                <a:tc>
+                  <a:txBody>
+                    <a:bodyPr/>
+                    <a:lstStyle/>
+                    <a:p>
+                      <a:r>
+                        <a:rPr kumimoji="1" lang="en-US" altLang="ja-JP" sz="1100"/>
+                        <a:t>2x2</a:t>
+                      </a:r>
+                      <a:endParaRPr kumimoji="1" lang="ja-JP" altLang="en-US" sz="1100"/>
+                    </a:p>
+                  </a:txBody>
+                  <a:tcPr marL="58140" marR="58140" marT="29070" marB="29070"/>
+                </a:tc>
+                <a:tc>
+                  <a:txBody>
+                    <a:bodyPr/>
+                    <a:lstStyle/>
+                    <a:p>
+                      <a:r>
+                        <a:rPr kumimoji="1" lang="en-US" altLang="ja-JP" sz="1100"/>
+                        <a:t>(2,2)</a:t>
+                      </a:r>
+                      <a:endParaRPr kumimoji="1" lang="ja-JP" altLang="en-US" sz="1100"/>
+                    </a:p>
+                  </a:txBody>
+                  <a:tcPr marL="58140" marR="58140" marT="29070" marB="29070"/>
+                </a:tc>
+                <a:tc>
+                  <a:txBody>
+                    <a:bodyPr/>
+                    <a:lstStyle/>
+                    <a:p>
+                      <a:r>
+                        <a:rPr kumimoji="1" lang="en-US" altLang="ja-JP" sz="1100"/>
+                        <a:t>-</a:t>
+                      </a:r>
+                      <a:endParaRPr kumimoji="1" lang="ja-JP" altLang="en-US" sz="1100"/>
+                    </a:p>
+                  </a:txBody>
+                  <a:tcPr marL="58140" marR="58140" marT="29070" marB="29070"/>
+                </a:tc>
+                <a:extLst>
+                  <a:ext uri="{0D108BD9-81ED-4DB2-BD59-A6C34878D82A}">
+                    <a16:rowId xmlns:a16="http://schemas.microsoft.com/office/drawing/2014/main" val="244308664"/>
+                  </a:ext>
+                </a:extLst>
+              </a:tr>
+              <a:tr h="255815">
+                <a:tc>
+                  <a:txBody>
+                    <a:bodyPr/>
+                    <a:lstStyle/>
+                    <a:p>
+                      <a:r>
+                        <a:rPr kumimoji="1" lang="en-US" altLang="ja-JP" sz="1100"/>
+                        <a:t>3</a:t>
+                      </a:r>
+                      <a:endParaRPr kumimoji="1" lang="ja-JP" altLang="en-US" sz="1100"/>
+                    </a:p>
+                  </a:txBody>
+                  <a:tcPr marL="58140" marR="58140" marT="29070" marB="29070"/>
+                </a:tc>
+                <a:tc>
+                  <a:txBody>
+                    <a:bodyPr/>
+                    <a:lstStyle/>
+                    <a:p>
+                      <a:r>
+                        <a:rPr kumimoji="1" lang="en-US" altLang="ja-JP" sz="1100"/>
+                        <a:t>Convolution</a:t>
+                      </a:r>
+                      <a:endParaRPr kumimoji="1" lang="ja-JP" altLang="en-US" sz="1100"/>
+                    </a:p>
+                  </a:txBody>
+                  <a:tcPr marL="58140" marR="58140" marT="29070" marB="29070"/>
+                </a:tc>
+                <a:tc>
+                  <a:txBody>
+                    <a:bodyPr/>
+                    <a:lstStyle/>
+                    <a:p>
+                      <a:r>
+                        <a:rPr kumimoji="1" lang="en-US" altLang="ja-JP" sz="1100"/>
+                        <a:t>64</a:t>
+                      </a:r>
+                      <a:endParaRPr kumimoji="1" lang="ja-JP" altLang="en-US" sz="1100"/>
+                    </a:p>
+                  </a:txBody>
+                  <a:tcPr marL="58140" marR="58140" marT="29070" marB="29070"/>
+                </a:tc>
+                <a:tc>
+                  <a:txBody>
+                    <a:bodyPr/>
+                    <a:lstStyle/>
+                    <a:p>
+                      <a:r>
+                        <a:rPr kumimoji="1" lang="en-US" altLang="ja-JP" sz="1100"/>
+                        <a:t>10x10x64</a:t>
+                      </a:r>
+                      <a:endParaRPr kumimoji="1" lang="ja-JP" altLang="en-US" sz="1100"/>
+                    </a:p>
+                  </a:txBody>
+                  <a:tcPr marL="58140" marR="58140" marT="29070" marB="29070"/>
+                </a:tc>
+                <a:tc>
+                  <a:txBody>
+                    <a:bodyPr/>
+                    <a:lstStyle/>
+                    <a:p>
+                      <a:r>
+                        <a:rPr kumimoji="1" lang="en-US" altLang="ja-JP" sz="1100"/>
+                        <a:t>3x3</a:t>
+                      </a:r>
+                      <a:endParaRPr kumimoji="1" lang="ja-JP" altLang="en-US" sz="1100"/>
+                    </a:p>
+                  </a:txBody>
+                  <a:tcPr marL="58140" marR="58140" marT="29070" marB="29070"/>
+                </a:tc>
+                <a:tc>
+                  <a:txBody>
+                    <a:bodyPr/>
+                    <a:lstStyle/>
+                    <a:p>
+                      <a:r>
+                        <a:rPr kumimoji="1" lang="en-US" altLang="ja-JP" sz="1100"/>
+                        <a:t>(1,1)</a:t>
+                      </a:r>
+                      <a:endParaRPr kumimoji="1" lang="ja-JP" altLang="en-US" sz="1100"/>
+                    </a:p>
+                  </a:txBody>
+                  <a:tcPr marL="58140" marR="58140" marT="29070" marB="29070"/>
+                </a:tc>
+                <a:tc>
+                  <a:txBody>
+                    <a:bodyPr/>
+                    <a:lstStyle/>
+                    <a:p>
+                      <a:r>
+                        <a:rPr kumimoji="1" lang="en-US" altLang="ja-JP" sz="1100"/>
+                        <a:t>ReLU</a:t>
+                      </a:r>
+                      <a:endParaRPr kumimoji="1" lang="ja-JP" altLang="en-US" sz="1100"/>
+                    </a:p>
+                  </a:txBody>
+                  <a:tcPr marL="58140" marR="58140" marT="29070" marB="29070"/>
+                </a:tc>
+                <a:extLst>
+                  <a:ext uri="{0D108BD9-81ED-4DB2-BD59-A6C34878D82A}">
+                    <a16:rowId xmlns:a16="http://schemas.microsoft.com/office/drawing/2014/main" val="966646218"/>
+                  </a:ext>
+                </a:extLst>
+              </a:tr>
+              <a:tr h="255815">
+                <a:tc>
+                  <a:txBody>
+                    <a:bodyPr/>
+                    <a:lstStyle/>
+                    <a:p>
+                      <a:r>
+                        <a:rPr kumimoji="1" lang="en-US" altLang="ja-JP" sz="1100"/>
+                        <a:t>4</a:t>
+                      </a:r>
+                      <a:endParaRPr kumimoji="1" lang="ja-JP" altLang="en-US" sz="1100"/>
+                    </a:p>
+                  </a:txBody>
+                  <a:tcPr marL="58140" marR="58140" marT="29070" marB="29070"/>
+                </a:tc>
+                <a:tc>
+                  <a:txBody>
+                    <a:bodyPr/>
+                    <a:lstStyle/>
+                    <a:p>
+                      <a:r>
+                        <a:rPr kumimoji="1" lang="en-US" altLang="ja-JP" sz="1100"/>
+                        <a:t>Convolution</a:t>
+                      </a:r>
+                      <a:endParaRPr kumimoji="1" lang="ja-JP" altLang="en-US" sz="1100"/>
+                    </a:p>
+                  </a:txBody>
+                  <a:tcPr marL="58140" marR="58140" marT="29070" marB="29070"/>
+                </a:tc>
+                <a:tc>
+                  <a:txBody>
+                    <a:bodyPr/>
+                    <a:lstStyle/>
+                    <a:p>
+                      <a:r>
+                        <a:rPr kumimoji="1" lang="en-US" altLang="ja-JP" sz="1100"/>
+                        <a:t>64</a:t>
+                      </a:r>
+                      <a:endParaRPr kumimoji="1" lang="ja-JP" altLang="en-US" sz="1100"/>
+                    </a:p>
+                  </a:txBody>
+                  <a:tcPr marL="58140" marR="58140" marT="29070" marB="29070"/>
+                </a:tc>
+                <a:tc>
+                  <a:txBody>
+                    <a:bodyPr/>
+                    <a:lstStyle/>
+                    <a:p>
+                      <a:r>
+                        <a:rPr kumimoji="1" lang="en-US" altLang="ja-JP" sz="1100"/>
+                        <a:t>8x8x64</a:t>
+                      </a:r>
+                      <a:endParaRPr kumimoji="1" lang="ja-JP" altLang="en-US" sz="1100"/>
+                    </a:p>
+                  </a:txBody>
+                  <a:tcPr marL="58140" marR="58140" marT="29070" marB="29070"/>
+                </a:tc>
+                <a:tc>
+                  <a:txBody>
+                    <a:bodyPr/>
+                    <a:lstStyle/>
+                    <a:p>
+                      <a:r>
+                        <a:rPr kumimoji="1" lang="en-US" altLang="ja-JP" sz="1100"/>
+                        <a:t>3x3</a:t>
+                      </a:r>
+                      <a:endParaRPr kumimoji="1" lang="ja-JP" altLang="en-US" sz="1100"/>
+                    </a:p>
+                  </a:txBody>
+                  <a:tcPr marL="58140" marR="58140" marT="29070" marB="29070"/>
+                </a:tc>
+                <a:tc>
+                  <a:txBody>
+                    <a:bodyPr/>
+                    <a:lstStyle/>
+                    <a:p>
+                      <a:r>
+                        <a:rPr kumimoji="1" lang="en-US" altLang="ja-JP" sz="1100"/>
+                        <a:t>(1,1)</a:t>
+                      </a:r>
+                      <a:endParaRPr kumimoji="1" lang="ja-JP" altLang="en-US" sz="1100"/>
+                    </a:p>
+                  </a:txBody>
+                  <a:tcPr marL="58140" marR="58140" marT="29070" marB="29070"/>
+                </a:tc>
+                <a:tc>
+                  <a:txBody>
+                    <a:bodyPr/>
+                    <a:lstStyle/>
+                    <a:p>
+                      <a:r>
+                        <a:rPr kumimoji="1" lang="en-US" altLang="ja-JP" sz="1100"/>
+                        <a:t>ReLU</a:t>
+                      </a:r>
+                      <a:endParaRPr kumimoji="1" lang="ja-JP" altLang="en-US" sz="1100"/>
+                    </a:p>
+                  </a:txBody>
+                  <a:tcPr marL="58140" marR="58140" marT="29070" marB="29070"/>
+                </a:tc>
+                <a:extLst>
+                  <a:ext uri="{0D108BD9-81ED-4DB2-BD59-A6C34878D82A}">
+                    <a16:rowId xmlns:a16="http://schemas.microsoft.com/office/drawing/2014/main" val="2499623719"/>
+                  </a:ext>
+                </a:extLst>
+              </a:tr>
+              <a:tr h="255815">
+                <a:tc>
+                  <a:txBody>
+                    <a:bodyPr/>
+                    <a:lstStyle/>
+                    <a:p>
+                      <a:endParaRPr kumimoji="1" lang="ja-JP" altLang="en-US" sz="1100"/>
+                    </a:p>
+                  </a:txBody>
+                  <a:tcPr marL="58140" marR="58140" marT="29070" marB="29070"/>
+                </a:tc>
+                <a:tc>
+                  <a:txBody>
+                    <a:bodyPr/>
+                    <a:lstStyle/>
+                    <a:p>
+                      <a:r>
+                        <a:rPr kumimoji="1" lang="en-US" altLang="ja-JP" sz="1100"/>
+                        <a:t>Max Pooling</a:t>
+                      </a:r>
+                      <a:endParaRPr kumimoji="1" lang="ja-JP" altLang="en-US" sz="1100"/>
+                    </a:p>
+                  </a:txBody>
+                  <a:tcPr marL="58140" marR="58140" marT="29070" marB="29070"/>
+                </a:tc>
+                <a:tc>
+                  <a:txBody>
+                    <a:bodyPr/>
+                    <a:lstStyle/>
+                    <a:p>
+                      <a:r>
+                        <a:rPr kumimoji="1" lang="en-US" altLang="ja-JP" sz="1100"/>
+                        <a:t>64</a:t>
+                      </a:r>
+                      <a:endParaRPr kumimoji="1" lang="ja-JP" altLang="en-US" sz="1100"/>
+                    </a:p>
+                  </a:txBody>
+                  <a:tcPr marL="58140" marR="58140" marT="29070" marB="29070"/>
+                </a:tc>
+                <a:tc>
+                  <a:txBody>
+                    <a:bodyPr/>
+                    <a:lstStyle/>
+                    <a:p>
+                      <a:r>
+                        <a:rPr kumimoji="1" lang="en-US" altLang="ja-JP" sz="1100"/>
+                        <a:t>4x4x64</a:t>
+                      </a:r>
+                      <a:endParaRPr kumimoji="1" lang="ja-JP" altLang="en-US" sz="1100"/>
+                    </a:p>
+                  </a:txBody>
+                  <a:tcPr marL="58140" marR="58140" marT="29070" marB="29070"/>
+                </a:tc>
+                <a:tc>
+                  <a:txBody>
+                    <a:bodyPr/>
+                    <a:lstStyle/>
+                    <a:p>
+                      <a:r>
+                        <a:rPr kumimoji="1" lang="en-US" altLang="ja-JP" sz="1100"/>
+                        <a:t>2x2</a:t>
+                      </a:r>
+                      <a:endParaRPr kumimoji="1" lang="ja-JP" altLang="en-US" sz="1100"/>
+                    </a:p>
+                  </a:txBody>
+                  <a:tcPr marL="58140" marR="58140" marT="29070" marB="29070"/>
+                </a:tc>
+                <a:tc>
+                  <a:txBody>
+                    <a:bodyPr/>
+                    <a:lstStyle/>
+                    <a:p>
+                      <a:r>
+                        <a:rPr kumimoji="1" lang="en-US" altLang="ja-JP" sz="1100"/>
+                        <a:t>(2,2)</a:t>
+                      </a:r>
+                      <a:endParaRPr kumimoji="1" lang="ja-JP" altLang="en-US" sz="1100"/>
+                    </a:p>
+                  </a:txBody>
+                  <a:tcPr marL="58140" marR="58140" marT="29070" marB="29070"/>
+                </a:tc>
+                <a:tc>
+                  <a:txBody>
+                    <a:bodyPr/>
+                    <a:lstStyle/>
+                    <a:p>
+                      <a:r>
+                        <a:rPr kumimoji="1" lang="en-US" altLang="ja-JP" sz="1100"/>
+                        <a:t>-</a:t>
+                      </a:r>
+                      <a:endParaRPr kumimoji="1" lang="ja-JP" altLang="en-US" sz="1100"/>
+                    </a:p>
+                  </a:txBody>
+                  <a:tcPr marL="58140" marR="58140" marT="29070" marB="29070"/>
+                </a:tc>
+                <a:extLst>
+                  <a:ext uri="{0D108BD9-81ED-4DB2-BD59-A6C34878D82A}">
+                    <a16:rowId xmlns:a16="http://schemas.microsoft.com/office/drawing/2014/main" val="2615999554"/>
+                  </a:ext>
+                </a:extLst>
+              </a:tr>
+              <a:tr h="255815">
+                <a:tc>
+                  <a:txBody>
+                    <a:bodyPr/>
+                    <a:lstStyle/>
+                    <a:p>
+                      <a:endParaRPr kumimoji="1" lang="ja-JP" altLang="en-US" sz="1100"/>
+                    </a:p>
+                  </a:txBody>
+                  <a:tcPr marL="58140" marR="58140" marT="29070" marB="29070"/>
+                </a:tc>
+                <a:tc>
+                  <a:txBody>
+                    <a:bodyPr/>
+                    <a:lstStyle/>
+                    <a:p>
+                      <a:r>
+                        <a:rPr kumimoji="1" lang="en-US" altLang="ja-JP" sz="1100"/>
+                        <a:t>Flatten</a:t>
+                      </a:r>
+                      <a:endParaRPr kumimoji="1" lang="ja-JP" altLang="en-US" sz="1100"/>
+                    </a:p>
+                  </a:txBody>
+                  <a:tcPr marL="58140" marR="58140" marT="29070" marB="29070"/>
+                </a:tc>
+                <a:tc>
+                  <a:txBody>
+                    <a:bodyPr/>
+                    <a:lstStyle/>
+                    <a:p>
+                      <a:r>
+                        <a:rPr kumimoji="1" lang="en-US" altLang="ja-JP" sz="1100"/>
+                        <a:t>-</a:t>
+                      </a:r>
+                      <a:endParaRPr kumimoji="1" lang="ja-JP" altLang="en-US" sz="1100"/>
+                    </a:p>
+                  </a:txBody>
+                  <a:tcPr marL="58140" marR="58140" marT="29070" marB="29070"/>
+                </a:tc>
+                <a:tc>
+                  <a:txBody>
+                    <a:bodyPr/>
+                    <a:lstStyle/>
+                    <a:p>
+                      <a:r>
+                        <a:rPr kumimoji="1" lang="en-US" altLang="ja-JP" sz="1100"/>
+                        <a:t>1024</a:t>
+                      </a:r>
+                      <a:endParaRPr kumimoji="1" lang="ja-JP" altLang="en-US" sz="1100"/>
+                    </a:p>
+                  </a:txBody>
+                  <a:tcPr marL="58140" marR="58140" marT="29070" marB="29070"/>
+                </a:tc>
+                <a:tc>
+                  <a:txBody>
+                    <a:bodyPr/>
+                    <a:lstStyle/>
+                    <a:p>
+                      <a:r>
+                        <a:rPr kumimoji="1" lang="en-US" altLang="ja-JP" sz="1100"/>
+                        <a:t>-</a:t>
+                      </a:r>
+                      <a:endParaRPr kumimoji="1" lang="ja-JP" altLang="en-US" sz="1100"/>
+                    </a:p>
+                  </a:txBody>
+                  <a:tcPr marL="58140" marR="58140" marT="29070" marB="29070"/>
+                </a:tc>
+                <a:tc>
+                  <a:txBody>
+                    <a:bodyPr/>
+                    <a:lstStyle/>
+                    <a:p>
+                      <a:r>
+                        <a:rPr kumimoji="1" lang="en-US" altLang="ja-JP" sz="1100"/>
+                        <a:t>-</a:t>
+                      </a:r>
+                      <a:endParaRPr kumimoji="1" lang="ja-JP" altLang="en-US" sz="1100"/>
+                    </a:p>
+                  </a:txBody>
+                  <a:tcPr marL="58140" marR="58140" marT="29070" marB="29070"/>
+                </a:tc>
+                <a:tc>
+                  <a:txBody>
+                    <a:bodyPr/>
+                    <a:lstStyle/>
+                    <a:p>
+                      <a:r>
+                        <a:rPr kumimoji="1" lang="en-US" altLang="ja-JP" sz="1100"/>
+                        <a:t>-</a:t>
+                      </a:r>
+                      <a:endParaRPr kumimoji="1" lang="ja-JP" altLang="en-US" sz="1100"/>
+                    </a:p>
+                  </a:txBody>
+                  <a:tcPr marL="58140" marR="58140" marT="29070" marB="29070"/>
+                </a:tc>
+                <a:extLst>
+                  <a:ext uri="{0D108BD9-81ED-4DB2-BD59-A6C34878D82A}">
+                    <a16:rowId xmlns:a16="http://schemas.microsoft.com/office/drawing/2014/main" val="1776601208"/>
+                  </a:ext>
+                </a:extLst>
+              </a:tr>
+              <a:tr h="255815">
+                <a:tc>
+                  <a:txBody>
+                    <a:bodyPr/>
+                    <a:lstStyle/>
+                    <a:p>
+                      <a:r>
+                        <a:rPr kumimoji="1" lang="en-US" altLang="ja-JP" sz="1100"/>
+                        <a:t>5</a:t>
+                      </a:r>
+                      <a:endParaRPr kumimoji="1" lang="ja-JP" altLang="en-US" sz="1100"/>
+                    </a:p>
+                  </a:txBody>
+                  <a:tcPr marL="58140" marR="58140" marT="29070" marB="29070"/>
+                </a:tc>
+                <a:tc>
+                  <a:txBody>
+                    <a:bodyPr/>
+                    <a:lstStyle/>
+                    <a:p>
+                      <a:r>
+                        <a:rPr kumimoji="1" lang="en-US" altLang="ja-JP" sz="1100"/>
+                        <a:t>Linear</a:t>
+                      </a:r>
+                      <a:endParaRPr kumimoji="1" lang="ja-JP" altLang="en-US" sz="1100"/>
+                    </a:p>
+                  </a:txBody>
+                  <a:tcPr marL="58140" marR="58140" marT="29070" marB="29070"/>
+                </a:tc>
+                <a:tc>
+                  <a:txBody>
+                    <a:bodyPr/>
+                    <a:lstStyle/>
+                    <a:p>
+                      <a:r>
+                        <a:rPr kumimoji="1" lang="en-US" altLang="ja-JP" sz="1100"/>
+                        <a:t>-</a:t>
+                      </a:r>
+                      <a:endParaRPr kumimoji="1" lang="ja-JP" altLang="en-US" sz="1100"/>
+                    </a:p>
+                  </a:txBody>
+                  <a:tcPr marL="58140" marR="58140" marT="29070" marB="29070"/>
+                </a:tc>
+                <a:tc>
+                  <a:txBody>
+                    <a:bodyPr/>
+                    <a:lstStyle/>
+                    <a:p>
+                      <a:r>
+                        <a:rPr kumimoji="1" lang="en-US" altLang="ja-JP" sz="1100"/>
+                        <a:t>128</a:t>
+                      </a:r>
+                      <a:endParaRPr kumimoji="1" lang="ja-JP" altLang="en-US" sz="1100"/>
+                    </a:p>
+                  </a:txBody>
+                  <a:tcPr marL="58140" marR="58140" marT="29070" marB="29070"/>
+                </a:tc>
+                <a:tc>
+                  <a:txBody>
+                    <a:bodyPr/>
+                    <a:lstStyle/>
+                    <a:p>
+                      <a:r>
+                        <a:rPr kumimoji="1" lang="en-US" altLang="ja-JP" sz="1100"/>
+                        <a:t>-</a:t>
+                      </a:r>
+                      <a:endParaRPr kumimoji="1" lang="ja-JP" altLang="en-US" sz="1100"/>
+                    </a:p>
+                  </a:txBody>
+                  <a:tcPr marL="58140" marR="58140" marT="29070" marB="29070"/>
+                </a:tc>
+                <a:tc>
+                  <a:txBody>
+                    <a:bodyPr/>
+                    <a:lstStyle/>
+                    <a:p>
+                      <a:r>
+                        <a:rPr kumimoji="1" lang="en-US" altLang="ja-JP" sz="1100"/>
+                        <a:t>-</a:t>
+                      </a:r>
+                      <a:endParaRPr kumimoji="1" lang="ja-JP" altLang="en-US" sz="1100"/>
+                    </a:p>
+                  </a:txBody>
+                  <a:tcPr marL="58140" marR="58140" marT="29070" marB="29070"/>
+                </a:tc>
+                <a:tc>
+                  <a:txBody>
+                    <a:bodyPr/>
+                    <a:lstStyle/>
+                    <a:p>
+                      <a:r>
+                        <a:rPr kumimoji="1" lang="en-US" altLang="ja-JP" sz="1100"/>
+                        <a:t>ReLU</a:t>
+                      </a:r>
+                      <a:endParaRPr kumimoji="1" lang="ja-JP" altLang="en-US" sz="1100"/>
+                    </a:p>
+                  </a:txBody>
+                  <a:tcPr marL="58140" marR="58140" marT="29070" marB="29070"/>
+                </a:tc>
+                <a:extLst>
+                  <a:ext uri="{0D108BD9-81ED-4DB2-BD59-A6C34878D82A}">
+                    <a16:rowId xmlns:a16="http://schemas.microsoft.com/office/drawing/2014/main" val="2728840207"/>
+                  </a:ext>
+                </a:extLst>
+              </a:tr>
+              <a:tr h="255815">
+                <a:tc>
+                  <a:txBody>
+                    <a:bodyPr/>
+                    <a:lstStyle/>
+                    <a:p>
+                      <a:endParaRPr kumimoji="1" lang="ja-JP" altLang="en-US" sz="1100"/>
+                    </a:p>
+                  </a:txBody>
+                  <a:tcPr marL="58140" marR="58140" marT="29070" marB="29070"/>
+                </a:tc>
+                <a:tc>
+                  <a:txBody>
+                    <a:bodyPr/>
+                    <a:lstStyle/>
+                    <a:p>
+                      <a:r>
+                        <a:rPr kumimoji="1" lang="en-US" altLang="ja-JP" sz="1100"/>
+                        <a:t>Dropout</a:t>
+                      </a:r>
+                      <a:endParaRPr kumimoji="1" lang="ja-JP" altLang="en-US" sz="1100"/>
+                    </a:p>
+                  </a:txBody>
+                  <a:tcPr marL="58140" marR="58140" marT="29070" marB="29070"/>
+                </a:tc>
+                <a:tc>
+                  <a:txBody>
+                    <a:bodyPr/>
+                    <a:lstStyle/>
+                    <a:p>
+                      <a:r>
+                        <a:rPr kumimoji="1" lang="en-US" altLang="ja-JP" sz="1100"/>
+                        <a:t>-</a:t>
+                      </a:r>
+                      <a:endParaRPr kumimoji="1" lang="ja-JP" altLang="en-US" sz="1100"/>
+                    </a:p>
+                  </a:txBody>
+                  <a:tcPr marL="58140" marR="58140" marT="29070" marB="29070"/>
+                </a:tc>
+                <a:tc>
+                  <a:txBody>
+                    <a:bodyPr/>
+                    <a:lstStyle/>
+                    <a:p>
+                      <a:r>
+                        <a:rPr kumimoji="1" lang="en-US" altLang="ja-JP" sz="1100"/>
+                        <a:t>p=0.5</a:t>
+                      </a:r>
+                      <a:endParaRPr kumimoji="1" lang="ja-JP" altLang="en-US" sz="1100"/>
+                    </a:p>
+                  </a:txBody>
+                  <a:tcPr marL="58140" marR="58140" marT="29070" marB="29070"/>
+                </a:tc>
+                <a:tc>
+                  <a:txBody>
+                    <a:bodyPr/>
+                    <a:lstStyle/>
+                    <a:p>
+                      <a:r>
+                        <a:rPr kumimoji="1" lang="en-US" altLang="ja-JP" sz="1100"/>
+                        <a:t>-</a:t>
+                      </a:r>
+                      <a:endParaRPr kumimoji="1" lang="ja-JP" altLang="en-US" sz="1100"/>
+                    </a:p>
+                  </a:txBody>
+                  <a:tcPr marL="58140" marR="58140" marT="29070" marB="29070"/>
+                </a:tc>
+                <a:tc>
+                  <a:txBody>
+                    <a:bodyPr/>
+                    <a:lstStyle/>
+                    <a:p>
+                      <a:r>
+                        <a:rPr kumimoji="1" lang="en-US" altLang="ja-JP" sz="1100"/>
+                        <a:t>-</a:t>
+                      </a:r>
+                      <a:endParaRPr kumimoji="1" lang="ja-JP" altLang="en-US" sz="1100"/>
+                    </a:p>
+                  </a:txBody>
+                  <a:tcPr marL="58140" marR="58140" marT="29070" marB="29070"/>
+                </a:tc>
+                <a:tc>
+                  <a:txBody>
+                    <a:bodyPr/>
+                    <a:lstStyle/>
+                    <a:p>
+                      <a:r>
+                        <a:rPr kumimoji="1" lang="en-US" altLang="ja-JP" sz="1100"/>
+                        <a:t>-</a:t>
+                      </a:r>
+                      <a:endParaRPr kumimoji="1" lang="ja-JP" altLang="en-US" sz="1100"/>
+                    </a:p>
+                  </a:txBody>
+                  <a:tcPr marL="58140" marR="58140" marT="29070" marB="29070"/>
+                </a:tc>
+                <a:extLst>
+                  <a:ext uri="{0D108BD9-81ED-4DB2-BD59-A6C34878D82A}">
+                    <a16:rowId xmlns:a16="http://schemas.microsoft.com/office/drawing/2014/main" val="2386799453"/>
+                  </a:ext>
+                </a:extLst>
+              </a:tr>
+              <a:tr h="255815">
+                <a:tc>
+                  <a:txBody>
+                    <a:bodyPr/>
+                    <a:lstStyle/>
+                    <a:p>
+                      <a:r>
+                        <a:rPr kumimoji="1" lang="en-US" altLang="ja-JP" sz="1100"/>
+                        <a:t>6</a:t>
+                      </a:r>
+                      <a:endParaRPr kumimoji="1" lang="ja-JP" altLang="en-US" sz="1100"/>
+                    </a:p>
+                  </a:txBody>
+                  <a:tcPr marL="58140" marR="58140" marT="29070" marB="29070"/>
+                </a:tc>
+                <a:tc>
+                  <a:txBody>
+                    <a:bodyPr/>
+                    <a:lstStyle/>
+                    <a:p>
+                      <a:r>
+                        <a:rPr kumimoji="1" lang="en-US" altLang="ja-JP" sz="1100"/>
+                        <a:t>Linear</a:t>
+                      </a:r>
+                      <a:endParaRPr kumimoji="1" lang="ja-JP" altLang="en-US" sz="1100"/>
+                    </a:p>
+                  </a:txBody>
+                  <a:tcPr marL="58140" marR="58140" marT="29070" marB="29070"/>
+                </a:tc>
+                <a:tc>
+                  <a:txBody>
+                    <a:bodyPr/>
+                    <a:lstStyle/>
+                    <a:p>
+                      <a:r>
+                        <a:rPr kumimoji="1" lang="en-US" altLang="ja-JP" sz="1100"/>
+                        <a:t>-</a:t>
+                      </a:r>
+                      <a:endParaRPr kumimoji="1" lang="ja-JP" altLang="en-US" sz="1100"/>
+                    </a:p>
+                  </a:txBody>
+                  <a:tcPr marL="58140" marR="58140" marT="29070" marB="29070"/>
+                </a:tc>
+                <a:tc>
+                  <a:txBody>
+                    <a:bodyPr/>
+                    <a:lstStyle/>
+                    <a:p>
+                      <a:r>
+                        <a:rPr kumimoji="1" lang="en-US" altLang="ja-JP" sz="1100"/>
+                        <a:t>64</a:t>
+                      </a:r>
+                      <a:endParaRPr kumimoji="1" lang="ja-JP" altLang="en-US" sz="1100"/>
+                    </a:p>
+                  </a:txBody>
+                  <a:tcPr marL="58140" marR="58140" marT="29070" marB="29070"/>
+                </a:tc>
+                <a:tc>
+                  <a:txBody>
+                    <a:bodyPr/>
+                    <a:lstStyle/>
+                    <a:p>
+                      <a:r>
+                        <a:rPr kumimoji="1" lang="en-US" altLang="ja-JP" sz="1100"/>
+                        <a:t>-</a:t>
+                      </a:r>
+                      <a:endParaRPr kumimoji="1" lang="ja-JP" altLang="en-US" sz="1100"/>
+                    </a:p>
+                  </a:txBody>
+                  <a:tcPr marL="58140" marR="58140" marT="29070" marB="29070"/>
+                </a:tc>
+                <a:tc>
+                  <a:txBody>
+                    <a:bodyPr/>
+                    <a:lstStyle/>
+                    <a:p>
+                      <a:r>
+                        <a:rPr kumimoji="1" lang="en-US" altLang="ja-JP" sz="1100"/>
+                        <a:t>-</a:t>
+                      </a:r>
+                      <a:endParaRPr kumimoji="1" lang="ja-JP" altLang="en-US" sz="1100"/>
+                    </a:p>
+                  </a:txBody>
+                  <a:tcPr marL="58140" marR="58140" marT="29070" marB="29070"/>
+                </a:tc>
+                <a:tc>
+                  <a:txBody>
+                    <a:bodyPr/>
+                    <a:lstStyle/>
+                    <a:p>
+                      <a:r>
+                        <a:rPr kumimoji="1" lang="en-US" altLang="ja-JP" sz="1100"/>
+                        <a:t>ReLU</a:t>
+                      </a:r>
+                      <a:endParaRPr kumimoji="1" lang="ja-JP" altLang="en-US" sz="1100"/>
+                    </a:p>
+                  </a:txBody>
+                  <a:tcPr marL="58140" marR="58140" marT="29070" marB="29070"/>
+                </a:tc>
+                <a:extLst>
+                  <a:ext uri="{0D108BD9-81ED-4DB2-BD59-A6C34878D82A}">
+                    <a16:rowId xmlns:a16="http://schemas.microsoft.com/office/drawing/2014/main" val="4058937682"/>
+                  </a:ext>
+                </a:extLst>
+              </a:tr>
+              <a:tr h="255815">
+                <a:tc>
+                  <a:txBody>
+                    <a:bodyPr/>
+                    <a:lstStyle/>
+                    <a:p>
+                      <a:endParaRPr kumimoji="1" lang="ja-JP" altLang="en-US" sz="1100"/>
+                    </a:p>
+                  </a:txBody>
+                  <a:tcPr marL="58140" marR="58140" marT="29070" marB="29070"/>
+                </a:tc>
+                <a:tc>
+                  <a:txBody>
+                    <a:bodyPr/>
+                    <a:lstStyle/>
+                    <a:p>
+                      <a:r>
+                        <a:rPr kumimoji="1" lang="en-US" altLang="ja-JP" sz="1100"/>
+                        <a:t>Dropout</a:t>
+                      </a:r>
+                      <a:endParaRPr kumimoji="1" lang="ja-JP" altLang="en-US" sz="1100"/>
+                    </a:p>
+                  </a:txBody>
+                  <a:tcPr marL="58140" marR="58140" marT="29070" marB="29070"/>
+                </a:tc>
+                <a:tc>
+                  <a:txBody>
+                    <a:bodyPr/>
+                    <a:lstStyle/>
+                    <a:p>
+                      <a:r>
+                        <a:rPr kumimoji="1" lang="en-US" altLang="ja-JP" sz="1100"/>
+                        <a:t>-</a:t>
+                      </a:r>
+                      <a:endParaRPr kumimoji="1" lang="ja-JP" altLang="en-US" sz="1100"/>
+                    </a:p>
+                  </a:txBody>
+                  <a:tcPr marL="58140" marR="58140" marT="29070" marB="29070"/>
+                </a:tc>
+                <a:tc>
+                  <a:txBody>
+                    <a:bodyPr/>
+                    <a:lstStyle/>
+                    <a:p>
+                      <a:r>
+                        <a:rPr kumimoji="1" lang="en-US" altLang="ja-JP" sz="1100"/>
+                        <a:t>p=0.5</a:t>
+                      </a:r>
+                      <a:endParaRPr kumimoji="1" lang="ja-JP" altLang="en-US" sz="1100"/>
+                    </a:p>
+                  </a:txBody>
+                  <a:tcPr marL="58140" marR="58140" marT="29070" marB="29070"/>
+                </a:tc>
+                <a:tc>
+                  <a:txBody>
+                    <a:bodyPr/>
+                    <a:lstStyle/>
+                    <a:p>
+                      <a:r>
+                        <a:rPr kumimoji="1" lang="en-US" altLang="ja-JP" sz="1100"/>
+                        <a:t>-</a:t>
+                      </a:r>
+                      <a:endParaRPr kumimoji="1" lang="ja-JP" altLang="en-US" sz="1100"/>
+                    </a:p>
+                  </a:txBody>
+                  <a:tcPr marL="58140" marR="58140" marT="29070" marB="29070"/>
+                </a:tc>
+                <a:tc>
+                  <a:txBody>
+                    <a:bodyPr/>
+                    <a:lstStyle/>
+                    <a:p>
+                      <a:r>
+                        <a:rPr kumimoji="1" lang="en-US" altLang="ja-JP" sz="1100"/>
+                        <a:t>-</a:t>
+                      </a:r>
+                      <a:endParaRPr kumimoji="1" lang="ja-JP" altLang="en-US" sz="1100"/>
+                    </a:p>
+                  </a:txBody>
+                  <a:tcPr marL="58140" marR="58140" marT="29070" marB="29070"/>
+                </a:tc>
+                <a:tc>
+                  <a:txBody>
+                    <a:bodyPr/>
+                    <a:lstStyle/>
+                    <a:p>
+                      <a:r>
+                        <a:rPr kumimoji="1" lang="en-US" altLang="ja-JP" sz="1100"/>
+                        <a:t>-</a:t>
+                      </a:r>
+                      <a:endParaRPr kumimoji="1" lang="ja-JP" altLang="en-US" sz="1100"/>
+                    </a:p>
+                  </a:txBody>
+                  <a:tcPr marL="58140" marR="58140" marT="29070" marB="29070"/>
+                </a:tc>
+                <a:extLst>
+                  <a:ext uri="{0D108BD9-81ED-4DB2-BD59-A6C34878D82A}">
+                    <a16:rowId xmlns:a16="http://schemas.microsoft.com/office/drawing/2014/main" val="2936755122"/>
+                  </a:ext>
+                </a:extLst>
+              </a:tr>
+              <a:tr h="255815">
+                <a:tc>
+                  <a:txBody>
+                    <a:bodyPr/>
+                    <a:lstStyle/>
+                    <a:p>
+                      <a:r>
+                        <a:rPr kumimoji="1" lang="en-US" altLang="ja-JP" sz="1100"/>
+                        <a:t>Output</a:t>
+                      </a:r>
+                      <a:endParaRPr kumimoji="1" lang="ja-JP" altLang="en-US" sz="1100"/>
+                    </a:p>
+                  </a:txBody>
+                  <a:tcPr marL="58140" marR="58140" marT="29070" marB="29070"/>
+                </a:tc>
+                <a:tc>
+                  <a:txBody>
+                    <a:bodyPr/>
+                    <a:lstStyle/>
+                    <a:p>
+                      <a:r>
+                        <a:rPr kumimoji="1" lang="en-US" altLang="ja-JP" sz="1100"/>
+                        <a:t>Linear</a:t>
+                      </a:r>
+                      <a:endParaRPr kumimoji="1" lang="ja-JP" altLang="en-US" sz="1100"/>
+                    </a:p>
+                  </a:txBody>
+                  <a:tcPr marL="58140" marR="58140" marT="29070" marB="29070"/>
+                </a:tc>
+                <a:tc>
+                  <a:txBody>
+                    <a:bodyPr/>
+                    <a:lstStyle/>
+                    <a:p>
+                      <a:r>
+                        <a:rPr kumimoji="1" lang="en-US" altLang="ja-JP" sz="1100"/>
+                        <a:t>-</a:t>
+                      </a:r>
+                      <a:endParaRPr kumimoji="1" lang="ja-JP" altLang="en-US" sz="1100"/>
+                    </a:p>
+                  </a:txBody>
+                  <a:tcPr marL="58140" marR="58140" marT="29070" marB="29070"/>
+                </a:tc>
+                <a:tc>
+                  <a:txBody>
+                    <a:bodyPr/>
+                    <a:lstStyle/>
+                    <a:p>
+                      <a:r>
+                        <a:rPr kumimoji="1" lang="en-US" altLang="ja-JP" sz="1100"/>
+                        <a:t>10</a:t>
+                      </a:r>
+                      <a:endParaRPr kumimoji="1" lang="ja-JP" altLang="en-US" sz="1100"/>
+                    </a:p>
+                  </a:txBody>
+                  <a:tcPr marL="58140" marR="58140" marT="29070" marB="29070"/>
+                </a:tc>
+                <a:tc>
+                  <a:txBody>
+                    <a:bodyPr/>
+                    <a:lstStyle/>
+                    <a:p>
+                      <a:r>
+                        <a:rPr kumimoji="1" lang="en-US" altLang="ja-JP" sz="1100"/>
+                        <a:t>-</a:t>
+                      </a:r>
+                      <a:endParaRPr kumimoji="1" lang="ja-JP" altLang="en-US" sz="1100"/>
+                    </a:p>
+                  </a:txBody>
+                  <a:tcPr marL="58140" marR="58140" marT="29070" marB="29070"/>
+                </a:tc>
+                <a:tc>
+                  <a:txBody>
+                    <a:bodyPr/>
+                    <a:lstStyle/>
+                    <a:p>
+                      <a:r>
+                        <a:rPr kumimoji="1" lang="en-US" altLang="ja-JP" sz="1100"/>
+                        <a:t>-</a:t>
+                      </a:r>
+                      <a:endParaRPr kumimoji="1" lang="ja-JP" altLang="en-US" sz="1100"/>
+                    </a:p>
+                  </a:txBody>
+                  <a:tcPr marL="58140" marR="58140" marT="29070" marB="29070"/>
+                </a:tc>
+                <a:tc>
+                  <a:txBody>
+                    <a:bodyPr/>
+                    <a:lstStyle/>
+                    <a:p>
+                      <a:r>
+                        <a:rPr kumimoji="1" lang="en-US" altLang="ja-JP" sz="1100" dirty="0"/>
+                        <a:t>Log </a:t>
+                      </a:r>
+                      <a:r>
+                        <a:rPr kumimoji="1" lang="en-US" altLang="ja-JP" sz="1100" dirty="0" err="1"/>
+                        <a:t>Softmax</a:t>
+                      </a:r>
+                      <a:endParaRPr kumimoji="1" lang="ja-JP" altLang="en-US" sz="1100" dirty="0"/>
+                    </a:p>
+                  </a:txBody>
+                  <a:tcPr marL="58140" marR="58140" marT="29070" marB="29070"/>
+                </a:tc>
+                <a:extLst>
+                  <a:ext uri="{0D108BD9-81ED-4DB2-BD59-A6C34878D82A}">
+                    <a16:rowId xmlns:a16="http://schemas.microsoft.com/office/drawing/2014/main" val="3344011669"/>
+                  </a:ext>
+                </a:extLst>
+              </a:tr>
+            </a:tbl>
+          </a:graphicData>
+        </a:graphic>
+      </p:graphicFrame>
     </p:spTree>
     <p:extLst>
       <p:ext uri="{BB962C8B-B14F-4D97-AF65-F5344CB8AC3E}">
-        <p14:creationId xmlns:p14="http://schemas.microsoft.com/office/powerpoint/2010/main" val="2874762361"/>
+        <p14:creationId xmlns:p14="http://schemas.microsoft.com/office/powerpoint/2010/main" val="13035706"/>
       </p:ext>
     </p:extLst>
   </p:cSld>
@@ -5011,7 +8250,7 @@
           <p:cNvPr id="2" name="タイトル 1">
             <a:extLst>
               <a:ext uri="{FF2B5EF4-FFF2-40B4-BE49-F238E27FC236}">
-                <a16:creationId xmlns:a16="http://schemas.microsoft.com/office/drawing/2014/main" id="{B699C8C9-B30B-85F4-51F3-CB98D10DB310}"/>
+                <a16:creationId xmlns:a16="http://schemas.microsoft.com/office/drawing/2014/main" id="{52AFB445-6F04-B5E1-A6F4-012DD571DF58}"/>
               </a:ext>
             </a:extLst>
           </p:cNvPr>
@@ -5029,41 +8268,86 @@
           <a:p>
             <a:r>
               <a:rPr kumimoji="1" lang="en-US" altLang="ja-JP" dirty="0"/>
-              <a:t>Shortcomings of my models</a:t>
+              <a:t>Performance</a:t>
             </a:r>
             <a:endParaRPr kumimoji="1" lang="ja-JP" altLang="en-US" dirty="0"/>
           </a:p>
         </p:txBody>
       </p:sp>
-      <p:sp>
-        <p:nvSpPr>
-          <p:cNvPr id="3" name="コンテンツ プレースホルダー 2">
+      <p:pic>
+        <p:nvPicPr>
+          <p:cNvPr id="7" name="コンテンツ プレースホルダー 6" descr="グラフ, 折れ線グラフ&#10;&#10;AI 生成コンテンツは誤りを含む可能性があります。">
             <a:extLst>
               <a:ext uri="{FF2B5EF4-FFF2-40B4-BE49-F238E27FC236}">
-                <a16:creationId xmlns:a16="http://schemas.microsoft.com/office/drawing/2014/main" id="{BD1045F1-DF05-A688-D377-9C499A89347C}"/>
+                <a16:creationId xmlns:a16="http://schemas.microsoft.com/office/drawing/2014/main" id="{610E0627-3749-3F00-7229-DBE133B512E8}"/>
               </a:ext>
             </a:extLst>
           </p:cNvPr>
-          <p:cNvSpPr>
-            <a:spLocks noGrp="1"/>
-          </p:cNvSpPr>
-          <p:nvPr>
-            <p:ph idx="1"/>
-          </p:nvPr>
-        </p:nvSpPr>
-        <p:spPr/>
-        <p:txBody>
-          <a:bodyPr/>
-          <a:lstStyle/>
-          <a:p>
-            <a:endParaRPr kumimoji="1" lang="ja-JP" altLang="en-US"/>
-          </a:p>
-        </p:txBody>
-      </p:sp>
+          <p:cNvPicPr>
+            <a:picLocks noGrp="1" noChangeAspect="1"/>
+          </p:cNvPicPr>
+          <p:nvPr>
+            <p:ph sz="half" idx="1"/>
+          </p:nvPr>
+        </p:nvPicPr>
+        <p:blipFill>
+          <a:blip r:embed="rId2">
+            <a:extLst>
+              <a:ext uri="{28A0092B-C50C-407E-A947-70E740481C1C}">
+                <a14:useLocalDpi xmlns:a14="http://schemas.microsoft.com/office/drawing/2010/main" val="0"/>
+              </a:ext>
+            </a:extLst>
+          </a:blip>
+          <a:stretch>
+            <a:fillRect/>
+          </a:stretch>
+        </p:blipFill>
+        <p:spPr>
+          <a:xfrm>
+            <a:off x="1371600" y="2298212"/>
+            <a:ext cx="4448175" cy="3556976"/>
+          </a:xfrm>
+        </p:spPr>
+      </p:pic>
+      <p:pic>
+        <p:nvPicPr>
+          <p:cNvPr id="9" name="コンテンツ プレースホルダー 8" descr="グラフ が含まれている画像&#10;&#10;AI 生成コンテンツは誤りを含む可能性があります。">
+            <a:extLst>
+              <a:ext uri="{FF2B5EF4-FFF2-40B4-BE49-F238E27FC236}">
+                <a16:creationId xmlns:a16="http://schemas.microsoft.com/office/drawing/2014/main" id="{F381ACAB-7409-E807-A94C-5FAA5717A6DB}"/>
+              </a:ext>
+            </a:extLst>
+          </p:cNvPr>
+          <p:cNvPicPr>
+            <a:picLocks noGrp="1" noChangeAspect="1"/>
+          </p:cNvPicPr>
+          <p:nvPr>
+            <p:ph sz="half" idx="2"/>
+          </p:nvPr>
+        </p:nvPicPr>
+        <p:blipFill>
+          <a:blip r:embed="rId3">
+            <a:extLst>
+              <a:ext uri="{28A0092B-C50C-407E-A947-70E740481C1C}">
+                <a14:useLocalDpi xmlns:a14="http://schemas.microsoft.com/office/drawing/2010/main" val="0"/>
+              </a:ext>
+            </a:extLst>
+          </a:blip>
+          <a:stretch>
+            <a:fillRect/>
+          </a:stretch>
+        </p:blipFill>
+        <p:spPr>
+          <a:xfrm>
+            <a:off x="6671646" y="2286000"/>
+            <a:ext cx="4154133" cy="3581400"/>
+          </a:xfrm>
+        </p:spPr>
+      </p:pic>
     </p:spTree>
     <p:extLst>
       <p:ext uri="{BB962C8B-B14F-4D97-AF65-F5344CB8AC3E}">
-        <p14:creationId xmlns:p14="http://schemas.microsoft.com/office/powerpoint/2010/main" val="112109742"/>
+        <p14:creationId xmlns:p14="http://schemas.microsoft.com/office/powerpoint/2010/main" val="600951004"/>
       </p:ext>
     </p:extLst>
   </p:cSld>
@@ -5095,7 +8379,7 @@
           <p:cNvPr id="2" name="タイトル 1">
             <a:extLst>
               <a:ext uri="{FF2B5EF4-FFF2-40B4-BE49-F238E27FC236}">
-                <a16:creationId xmlns:a16="http://schemas.microsoft.com/office/drawing/2014/main" id="{43273D1C-8DF5-9BC7-395C-19AEFCD4C743}"/>
+                <a16:creationId xmlns:a16="http://schemas.microsoft.com/office/drawing/2014/main" id="{20D3DF80-F0DA-1556-353B-295C73F06B7D}"/>
               </a:ext>
             </a:extLst>
           </p:cNvPr>
@@ -5113,41 +8397,86 @@
           <a:p>
             <a:r>
               <a:rPr lang="en-US" altLang="ja-JP" dirty="0"/>
-              <a:t>Adam vs SGD</a:t>
+              <a:t>Accuracy Comparison</a:t>
             </a:r>
             <a:endParaRPr kumimoji="1" lang="ja-JP" altLang="en-US" dirty="0"/>
           </a:p>
         </p:txBody>
       </p:sp>
-      <p:sp>
-        <p:nvSpPr>
-          <p:cNvPr id="3" name="コンテンツ プレースホルダー 2">
+      <p:pic>
+        <p:nvPicPr>
+          <p:cNvPr id="7" name="コンテンツ プレースホルダー 6" descr="グラフ, 折れ線グラフ&#10;&#10;AI 生成コンテンツは誤りを含む可能性があります。">
             <a:extLst>
               <a:ext uri="{FF2B5EF4-FFF2-40B4-BE49-F238E27FC236}">
-                <a16:creationId xmlns:a16="http://schemas.microsoft.com/office/drawing/2014/main" id="{17A2C808-DADE-6C6C-80CC-E55857884A4F}"/>
+                <a16:creationId xmlns:a16="http://schemas.microsoft.com/office/drawing/2014/main" id="{608C8627-C224-C413-5DA2-0F7CD501D0C1}"/>
               </a:ext>
             </a:extLst>
           </p:cNvPr>
-          <p:cNvSpPr>
-            <a:spLocks noGrp="1"/>
-          </p:cNvSpPr>
-          <p:nvPr>
-            <p:ph idx="1"/>
-          </p:nvPr>
-        </p:nvSpPr>
-        <p:spPr/>
-        <p:txBody>
-          <a:bodyPr/>
-          <a:lstStyle/>
-          <a:p>
-            <a:endParaRPr kumimoji="1" lang="ja-JP" altLang="en-US"/>
-          </a:p>
-        </p:txBody>
-      </p:sp>
+          <p:cNvPicPr>
+            <a:picLocks noGrp="1" noChangeAspect="1"/>
+          </p:cNvPicPr>
+          <p:nvPr>
+            <p:ph sz="half" idx="1"/>
+          </p:nvPr>
+        </p:nvPicPr>
+        <p:blipFill>
+          <a:blip r:embed="rId2">
+            <a:extLst>
+              <a:ext uri="{28A0092B-C50C-407E-A947-70E740481C1C}">
+                <a14:useLocalDpi xmlns:a14="http://schemas.microsoft.com/office/drawing/2010/main" val="0"/>
+              </a:ext>
+            </a:extLst>
+          </a:blip>
+          <a:stretch>
+            <a:fillRect/>
+          </a:stretch>
+        </p:blipFill>
+        <p:spPr>
+          <a:xfrm>
+            <a:off x="1376007" y="2286000"/>
+            <a:ext cx="4439361" cy="3581400"/>
+          </a:xfrm>
+        </p:spPr>
+      </p:pic>
+      <p:pic>
+        <p:nvPicPr>
+          <p:cNvPr id="9" name="コンテンツ プレースホルダー 8" descr="グラフ, 棒グラフ&#10;&#10;AI 生成コンテンツは誤りを含む可能性があります。">
+            <a:extLst>
+              <a:ext uri="{FF2B5EF4-FFF2-40B4-BE49-F238E27FC236}">
+                <a16:creationId xmlns:a16="http://schemas.microsoft.com/office/drawing/2014/main" id="{B4D58F83-5323-94B8-664D-AF310C78A6EA}"/>
+              </a:ext>
+            </a:extLst>
+          </p:cNvPr>
+          <p:cNvPicPr>
+            <a:picLocks noGrp="1" noChangeAspect="1"/>
+          </p:cNvPicPr>
+          <p:nvPr>
+            <p:ph sz="half" idx="2"/>
+          </p:nvPr>
+        </p:nvPicPr>
+        <p:blipFill>
+          <a:blip r:embed="rId3">
+            <a:extLst>
+              <a:ext uri="{28A0092B-C50C-407E-A947-70E740481C1C}">
+                <a14:useLocalDpi xmlns:a14="http://schemas.microsoft.com/office/drawing/2010/main" val="0"/>
+              </a:ext>
+            </a:extLst>
+          </a:blip>
+          <a:stretch>
+            <a:fillRect/>
+          </a:stretch>
+        </p:blipFill>
+        <p:spPr>
+          <a:xfrm>
+            <a:off x="6532967" y="2286000"/>
+            <a:ext cx="4431490" cy="3581400"/>
+          </a:xfrm>
+        </p:spPr>
+      </p:pic>
     </p:spTree>
     <p:extLst>
       <p:ext uri="{BB962C8B-B14F-4D97-AF65-F5344CB8AC3E}">
-        <p14:creationId xmlns:p14="http://schemas.microsoft.com/office/powerpoint/2010/main" val="1025219748"/>
+        <p14:creationId xmlns:p14="http://schemas.microsoft.com/office/powerpoint/2010/main" val="2874762361"/>
       </p:ext>
     </p:extLst>
   </p:cSld>

</xml_diff>

<commit_message>
Almost the final commit ### Changes - Notable changes to code including use of seaborn instead of just plt. - Addition of comparison between SGD and Adam. -  Added Report.tex along with associated graphics (will continue to add)
### Todo
- Finalise report for hand in (add additional graphs from notebook etc.)
- Visualise a sample prediction from each model (with probability spread after activation function).
- Add closing thoughts to notebook.
</commit_message>
<xml_diff>
--- a/P2963116/P2963116_ppt.pptx
+++ b/P2963116/P2963116_ppt.pptx
@@ -292,7 +292,7 @@
           <a:p>
             <a:fld id="{4A62E54F-74CC-41CA-B59D-BE68632D6B50}" type="datetimeFigureOut">
               <a:rPr kumimoji="1" lang="ja-JP" altLang="en-US" smtClean="0"/>
-              <a:t>2025/10/29</a:t>
+              <a:t>2025/11/3</a:t>
             </a:fld>
             <a:endParaRPr kumimoji="1" lang="ja-JP" altLang="en-US"/>
           </a:p>
@@ -668,7 +668,7 @@
           <a:p>
             <a:fld id="{4A62E54F-74CC-41CA-B59D-BE68632D6B50}" type="datetimeFigureOut">
               <a:rPr kumimoji="1" lang="ja-JP" altLang="en-US" smtClean="0"/>
-              <a:t>2025/10/29</a:t>
+              <a:t>2025/11/3</a:t>
             </a:fld>
             <a:endParaRPr kumimoji="1" lang="ja-JP" altLang="en-US"/>
           </a:p>
@@ -880,7 +880,7 @@
           <a:p>
             <a:fld id="{4A62E54F-74CC-41CA-B59D-BE68632D6B50}" type="datetimeFigureOut">
               <a:rPr kumimoji="1" lang="ja-JP" altLang="en-US" smtClean="0"/>
-              <a:t>2025/10/29</a:t>
+              <a:t>2025/11/3</a:t>
             </a:fld>
             <a:endParaRPr kumimoji="1" lang="ja-JP" altLang="en-US"/>
           </a:p>
@@ -1082,7 +1082,7 @@
           <a:p>
             <a:fld id="{4A62E54F-74CC-41CA-B59D-BE68632D6B50}" type="datetimeFigureOut">
               <a:rPr kumimoji="1" lang="ja-JP" altLang="en-US" smtClean="0"/>
-              <a:t>2025/10/29</a:t>
+              <a:t>2025/11/3</a:t>
             </a:fld>
             <a:endParaRPr kumimoji="1" lang="ja-JP" altLang="en-US"/>
           </a:p>
@@ -1359,7 +1359,7 @@
           <a:p>
             <a:fld id="{4A62E54F-74CC-41CA-B59D-BE68632D6B50}" type="datetimeFigureOut">
               <a:rPr kumimoji="1" lang="ja-JP" altLang="en-US" smtClean="0"/>
-              <a:t>2025/10/29</a:t>
+              <a:t>2025/11/3</a:t>
             </a:fld>
             <a:endParaRPr kumimoji="1" lang="ja-JP" altLang="en-US"/>
           </a:p>
@@ -1817,7 +1817,7 @@
           <a:p>
             <a:fld id="{4A62E54F-74CC-41CA-B59D-BE68632D6B50}" type="datetimeFigureOut">
               <a:rPr kumimoji="1" lang="ja-JP" altLang="en-US" smtClean="0"/>
-              <a:t>2025/10/29</a:t>
+              <a:t>2025/11/3</a:t>
             </a:fld>
             <a:endParaRPr kumimoji="1" lang="ja-JP" altLang="en-US"/>
           </a:p>
@@ -2358,7 +2358,7 @@
           <a:p>
             <a:fld id="{4A62E54F-74CC-41CA-B59D-BE68632D6B50}" type="datetimeFigureOut">
               <a:rPr kumimoji="1" lang="ja-JP" altLang="en-US" smtClean="0"/>
-              <a:t>2025/10/29</a:t>
+              <a:t>2025/11/3</a:t>
             </a:fld>
             <a:endParaRPr kumimoji="1" lang="ja-JP" altLang="en-US"/>
           </a:p>
@@ -2476,7 +2476,7 @@
           <a:p>
             <a:fld id="{4A62E54F-74CC-41CA-B59D-BE68632D6B50}" type="datetimeFigureOut">
               <a:rPr kumimoji="1" lang="ja-JP" altLang="en-US" smtClean="0"/>
-              <a:t>2025/10/29</a:t>
+              <a:t>2025/11/3</a:t>
             </a:fld>
             <a:endParaRPr kumimoji="1" lang="ja-JP" altLang="en-US"/>
           </a:p>
@@ -2571,7 +2571,7 @@
           <a:p>
             <a:fld id="{4A62E54F-74CC-41CA-B59D-BE68632D6B50}" type="datetimeFigureOut">
               <a:rPr kumimoji="1" lang="ja-JP" altLang="en-US" smtClean="0"/>
-              <a:t>2025/10/29</a:t>
+              <a:t>2025/11/3</a:t>
             </a:fld>
             <a:endParaRPr kumimoji="1" lang="ja-JP" altLang="en-US"/>
           </a:p>
@@ -2949,7 +2949,7 @@
           <a:p>
             <a:fld id="{4A62E54F-74CC-41CA-B59D-BE68632D6B50}" type="datetimeFigureOut">
               <a:rPr kumimoji="1" lang="ja-JP" altLang="en-US" smtClean="0"/>
-              <a:t>2025/10/29</a:t>
+              <a:t>2025/11/3</a:t>
             </a:fld>
             <a:endParaRPr kumimoji="1" lang="ja-JP" altLang="en-US"/>
           </a:p>
@@ -3337,7 +3337,7 @@
           <a:p>
             <a:fld id="{4A62E54F-74CC-41CA-B59D-BE68632D6B50}" type="datetimeFigureOut">
               <a:rPr kumimoji="1" lang="ja-JP" altLang="en-US" smtClean="0"/>
-              <a:t>2025/10/29</a:t>
+              <a:t>2025/11/3</a:t>
             </a:fld>
             <a:endParaRPr kumimoji="1" lang="ja-JP" altLang="en-US"/>
           </a:p>
@@ -3647,7 +3647,7 @@
           <a:p>
             <a:fld id="{4A62E54F-74CC-41CA-B59D-BE68632D6B50}" type="datetimeFigureOut">
               <a:rPr kumimoji="1" lang="ja-JP" altLang="en-US" smtClean="0"/>
-              <a:t>2025/10/29</a:t>
+              <a:t>2025/11/3</a:t>
             </a:fld>
             <a:endParaRPr kumimoji="1" lang="ja-JP" altLang="en-US"/>
           </a:p>
@@ -5510,76 +5510,56 @@
           </a:p>
         </p:txBody>
       </p:sp>
-      <p:pic>
-        <p:nvPicPr>
-          <p:cNvPr id="12" name="コンテンツ プレースホルダー 11" descr="グラフ, 折れ線グラフ, ヒストグラム&#10;&#10;AI 生成コンテンツは誤りを含む可能性があります。">
+      <p:sp>
+        <p:nvSpPr>
+          <p:cNvPr id="4" name="コンテンツ プレースホルダー 3">
             <a:extLst>
               <a:ext uri="{FF2B5EF4-FFF2-40B4-BE49-F238E27FC236}">
-                <a16:creationId xmlns:a16="http://schemas.microsoft.com/office/drawing/2014/main" id="{F9BDD864-BB02-C470-65F6-A515428454C0}"/>
+                <a16:creationId xmlns:a16="http://schemas.microsoft.com/office/drawing/2014/main" id="{1BD60C0A-2CE4-6B18-38B2-E434249C9016}"/>
               </a:ext>
             </a:extLst>
           </p:cNvPr>
-          <p:cNvPicPr>
-            <a:picLocks noGrp="1" noChangeAspect="1"/>
-          </p:cNvPicPr>
+          <p:cNvSpPr>
+            <a:spLocks noGrp="1"/>
+          </p:cNvSpPr>
           <p:nvPr>
             <p:ph sz="half" idx="1"/>
           </p:nvPr>
-        </p:nvPicPr>
-        <p:blipFill>
-          <a:blip r:embed="rId2">
-            <a:extLst>
-              <a:ext uri="{28A0092B-C50C-407E-A947-70E740481C1C}">
-                <a14:useLocalDpi xmlns:a14="http://schemas.microsoft.com/office/drawing/2010/main" val="0"/>
-              </a:ext>
-            </a:extLst>
-          </a:blip>
-          <a:stretch>
-            <a:fillRect/>
-          </a:stretch>
-        </p:blipFill>
-        <p:spPr>
-          <a:xfrm>
-            <a:off x="1371600" y="2298212"/>
-            <a:ext cx="4448175" cy="3556976"/>
-          </a:xfrm>
-        </p:spPr>
-      </p:pic>
-      <p:pic>
-        <p:nvPicPr>
-          <p:cNvPr id="14" name="コンテンツ プレースホルダー 13" descr="グラフィカル ユーザー インターフェイス&#10;&#10;AI 生成コンテンツは誤りを含む可能性があります。">
+        </p:nvSpPr>
+        <p:spPr/>
+        <p:txBody>
+          <a:bodyPr/>
+          <a:lstStyle/>
+          <a:p>
+            <a:endParaRPr lang="ja-JP" altLang="en-US"/>
+          </a:p>
+        </p:txBody>
+      </p:sp>
+      <p:sp>
+        <p:nvSpPr>
+          <p:cNvPr id="6" name="コンテンツ プレースホルダー 5">
             <a:extLst>
               <a:ext uri="{FF2B5EF4-FFF2-40B4-BE49-F238E27FC236}">
-                <a16:creationId xmlns:a16="http://schemas.microsoft.com/office/drawing/2014/main" id="{D6F5E5C2-88B1-D72A-99FA-85F12A81F7DB}"/>
+                <a16:creationId xmlns:a16="http://schemas.microsoft.com/office/drawing/2014/main" id="{18E61C90-992C-1D07-7E73-9B813800843B}"/>
               </a:ext>
             </a:extLst>
           </p:cNvPr>
-          <p:cNvPicPr>
-            <a:picLocks noGrp="1" noChangeAspect="1"/>
-          </p:cNvPicPr>
+          <p:cNvSpPr>
+            <a:spLocks noGrp="1"/>
+          </p:cNvSpPr>
           <p:nvPr>
             <p:ph sz="half" idx="2"/>
           </p:nvPr>
-        </p:nvPicPr>
-        <p:blipFill>
-          <a:blip r:embed="rId3">
-            <a:extLst>
-              <a:ext uri="{28A0092B-C50C-407E-A947-70E740481C1C}">
-                <a14:useLocalDpi xmlns:a14="http://schemas.microsoft.com/office/drawing/2010/main" val="0"/>
-              </a:ext>
-            </a:extLst>
-          </a:blip>
-          <a:stretch>
-            <a:fillRect/>
-          </a:stretch>
-        </p:blipFill>
-        <p:spPr>
-          <a:xfrm>
-            <a:off x="6671646" y="2286000"/>
-            <a:ext cx="4154133" cy="3581400"/>
-          </a:xfrm>
-        </p:spPr>
-      </p:pic>
+        </p:nvSpPr>
+        <p:spPr/>
+        <p:txBody>
+          <a:bodyPr/>
+          <a:lstStyle/>
+          <a:p>
+            <a:endParaRPr lang="ja-JP" altLang="en-US"/>
+          </a:p>
+        </p:txBody>
+      </p:sp>
     </p:spTree>
     <p:extLst>
       <p:ext uri="{BB962C8B-B14F-4D97-AF65-F5344CB8AC3E}">
@@ -6404,76 +6384,56 @@
           </a:p>
         </p:txBody>
       </p:sp>
-      <p:pic>
-        <p:nvPicPr>
-          <p:cNvPr id="7" name="コンテンツ プレースホルダー 6" descr="グラフ, 折れ線グラフ&#10;&#10;AI 生成コンテンツは誤りを含む可能性があります。">
+      <p:sp>
+        <p:nvSpPr>
+          <p:cNvPr id="4" name="コンテンツ プレースホルダー 3">
             <a:extLst>
               <a:ext uri="{FF2B5EF4-FFF2-40B4-BE49-F238E27FC236}">
-                <a16:creationId xmlns:a16="http://schemas.microsoft.com/office/drawing/2014/main" id="{7146BF29-0052-D5A7-4667-774DB36C6938}"/>
+                <a16:creationId xmlns:a16="http://schemas.microsoft.com/office/drawing/2014/main" id="{FBFD1179-9630-E040-35CD-6506CE97DD96}"/>
               </a:ext>
             </a:extLst>
           </p:cNvPr>
-          <p:cNvPicPr>
-            <a:picLocks noGrp="1" noChangeAspect="1"/>
-          </p:cNvPicPr>
+          <p:cNvSpPr>
+            <a:spLocks noGrp="1"/>
+          </p:cNvSpPr>
           <p:nvPr>
             <p:ph sz="half" idx="1"/>
           </p:nvPr>
-        </p:nvPicPr>
-        <p:blipFill>
-          <a:blip r:embed="rId2">
-            <a:extLst>
-              <a:ext uri="{28A0092B-C50C-407E-A947-70E740481C1C}">
-                <a14:useLocalDpi xmlns:a14="http://schemas.microsoft.com/office/drawing/2010/main" val="0"/>
-              </a:ext>
-            </a:extLst>
-          </a:blip>
-          <a:stretch>
-            <a:fillRect/>
-          </a:stretch>
-        </p:blipFill>
-        <p:spPr>
-          <a:xfrm>
-            <a:off x="1371600" y="2322870"/>
-            <a:ext cx="4448175" cy="3507659"/>
-          </a:xfrm>
-        </p:spPr>
-      </p:pic>
-      <p:pic>
-        <p:nvPicPr>
-          <p:cNvPr id="9" name="コンテンツ プレースホルダー 8" descr="グラフィカル ユーザー インターフェイス が含まれている画像&#10;&#10;AI 生成コンテンツは誤りを含む可能性があります。">
+        </p:nvSpPr>
+        <p:spPr/>
+        <p:txBody>
+          <a:bodyPr/>
+          <a:lstStyle/>
+          <a:p>
+            <a:endParaRPr lang="ja-JP" altLang="en-US"/>
+          </a:p>
+        </p:txBody>
+      </p:sp>
+      <p:sp>
+        <p:nvSpPr>
+          <p:cNvPr id="6" name="コンテンツ プレースホルダー 5">
             <a:extLst>
               <a:ext uri="{FF2B5EF4-FFF2-40B4-BE49-F238E27FC236}">
-                <a16:creationId xmlns:a16="http://schemas.microsoft.com/office/drawing/2014/main" id="{E5A10D4D-2A40-B36F-3F90-3C435901EBE1}"/>
+                <a16:creationId xmlns:a16="http://schemas.microsoft.com/office/drawing/2014/main" id="{1A91333B-19CF-A394-876D-5F12F19FA76F}"/>
               </a:ext>
             </a:extLst>
           </p:cNvPr>
-          <p:cNvPicPr>
-            <a:picLocks noGrp="1" noChangeAspect="1"/>
-          </p:cNvPicPr>
+          <p:cNvSpPr>
+            <a:spLocks noGrp="1"/>
+          </p:cNvSpPr>
           <p:nvPr>
             <p:ph sz="half" idx="2"/>
           </p:nvPr>
-        </p:nvPicPr>
-        <p:blipFill>
-          <a:blip r:embed="rId3">
-            <a:extLst>
-              <a:ext uri="{28A0092B-C50C-407E-A947-70E740481C1C}">
-                <a14:useLocalDpi xmlns:a14="http://schemas.microsoft.com/office/drawing/2010/main" val="0"/>
-              </a:ext>
-            </a:extLst>
-          </a:blip>
-          <a:stretch>
-            <a:fillRect/>
-          </a:stretch>
-        </p:blipFill>
-        <p:spPr>
-          <a:xfrm>
-            <a:off x="6671646" y="2286000"/>
-            <a:ext cx="4154133" cy="3581400"/>
-          </a:xfrm>
-        </p:spPr>
-      </p:pic>
+        </p:nvSpPr>
+        <p:spPr/>
+        <p:txBody>
+          <a:bodyPr/>
+          <a:lstStyle/>
+          <a:p>
+            <a:endParaRPr lang="ja-JP" altLang="en-US"/>
+          </a:p>
+        </p:txBody>
+      </p:sp>
     </p:spTree>
     <p:extLst>
       <p:ext uri="{BB962C8B-B14F-4D97-AF65-F5344CB8AC3E}">
@@ -8274,76 +8234,56 @@
           </a:p>
         </p:txBody>
       </p:sp>
-      <p:pic>
-        <p:nvPicPr>
-          <p:cNvPr id="7" name="コンテンツ プレースホルダー 6" descr="グラフ, 折れ線グラフ&#10;&#10;AI 生成コンテンツは誤りを含む可能性があります。">
+      <p:sp>
+        <p:nvSpPr>
+          <p:cNvPr id="4" name="コンテンツ プレースホルダー 3">
             <a:extLst>
               <a:ext uri="{FF2B5EF4-FFF2-40B4-BE49-F238E27FC236}">
-                <a16:creationId xmlns:a16="http://schemas.microsoft.com/office/drawing/2014/main" id="{610E0627-3749-3F00-7229-DBE133B512E8}"/>
+                <a16:creationId xmlns:a16="http://schemas.microsoft.com/office/drawing/2014/main" id="{D5A41333-EF7C-4189-A23C-AD425B8F5854}"/>
               </a:ext>
             </a:extLst>
           </p:cNvPr>
-          <p:cNvPicPr>
-            <a:picLocks noGrp="1" noChangeAspect="1"/>
-          </p:cNvPicPr>
+          <p:cNvSpPr>
+            <a:spLocks noGrp="1"/>
+          </p:cNvSpPr>
           <p:nvPr>
             <p:ph sz="half" idx="1"/>
           </p:nvPr>
-        </p:nvPicPr>
-        <p:blipFill>
-          <a:blip r:embed="rId2">
-            <a:extLst>
-              <a:ext uri="{28A0092B-C50C-407E-A947-70E740481C1C}">
-                <a14:useLocalDpi xmlns:a14="http://schemas.microsoft.com/office/drawing/2010/main" val="0"/>
-              </a:ext>
-            </a:extLst>
-          </a:blip>
-          <a:stretch>
-            <a:fillRect/>
-          </a:stretch>
-        </p:blipFill>
-        <p:spPr>
-          <a:xfrm>
-            <a:off x="1371600" y="2298212"/>
-            <a:ext cx="4448175" cy="3556976"/>
-          </a:xfrm>
-        </p:spPr>
-      </p:pic>
-      <p:pic>
-        <p:nvPicPr>
-          <p:cNvPr id="9" name="コンテンツ プレースホルダー 8" descr="グラフ が含まれている画像&#10;&#10;AI 生成コンテンツは誤りを含む可能性があります。">
+        </p:nvSpPr>
+        <p:spPr/>
+        <p:txBody>
+          <a:bodyPr/>
+          <a:lstStyle/>
+          <a:p>
+            <a:endParaRPr lang="ja-JP" altLang="en-US"/>
+          </a:p>
+        </p:txBody>
+      </p:sp>
+      <p:sp>
+        <p:nvSpPr>
+          <p:cNvPr id="6" name="コンテンツ プレースホルダー 5">
             <a:extLst>
               <a:ext uri="{FF2B5EF4-FFF2-40B4-BE49-F238E27FC236}">
-                <a16:creationId xmlns:a16="http://schemas.microsoft.com/office/drawing/2014/main" id="{F381ACAB-7409-E807-A94C-5FAA5717A6DB}"/>
+                <a16:creationId xmlns:a16="http://schemas.microsoft.com/office/drawing/2014/main" id="{F43C5936-EE1B-6595-23FF-B167E25C20CC}"/>
               </a:ext>
             </a:extLst>
           </p:cNvPr>
-          <p:cNvPicPr>
-            <a:picLocks noGrp="1" noChangeAspect="1"/>
-          </p:cNvPicPr>
+          <p:cNvSpPr>
+            <a:spLocks noGrp="1"/>
+          </p:cNvSpPr>
           <p:nvPr>
             <p:ph sz="half" idx="2"/>
           </p:nvPr>
-        </p:nvPicPr>
-        <p:blipFill>
-          <a:blip r:embed="rId3">
-            <a:extLst>
-              <a:ext uri="{28A0092B-C50C-407E-A947-70E740481C1C}">
-                <a14:useLocalDpi xmlns:a14="http://schemas.microsoft.com/office/drawing/2010/main" val="0"/>
-              </a:ext>
-            </a:extLst>
-          </a:blip>
-          <a:stretch>
-            <a:fillRect/>
-          </a:stretch>
-        </p:blipFill>
-        <p:spPr>
-          <a:xfrm>
-            <a:off x="6671646" y="2286000"/>
-            <a:ext cx="4154133" cy="3581400"/>
-          </a:xfrm>
-        </p:spPr>
-      </p:pic>
+        </p:nvSpPr>
+        <p:spPr/>
+        <p:txBody>
+          <a:bodyPr/>
+          <a:lstStyle/>
+          <a:p>
+            <a:endParaRPr lang="ja-JP" altLang="en-US"/>
+          </a:p>
+        </p:txBody>
+      </p:sp>
     </p:spTree>
     <p:extLst>
       <p:ext uri="{BB962C8B-B14F-4D97-AF65-F5344CB8AC3E}">
@@ -8403,76 +8343,56 @@
           </a:p>
         </p:txBody>
       </p:sp>
-      <p:pic>
-        <p:nvPicPr>
-          <p:cNvPr id="7" name="コンテンツ プレースホルダー 6" descr="グラフ, 折れ線グラフ&#10;&#10;AI 生成コンテンツは誤りを含む可能性があります。">
+      <p:sp>
+        <p:nvSpPr>
+          <p:cNvPr id="4" name="コンテンツ プレースホルダー 3">
             <a:extLst>
               <a:ext uri="{FF2B5EF4-FFF2-40B4-BE49-F238E27FC236}">
-                <a16:creationId xmlns:a16="http://schemas.microsoft.com/office/drawing/2014/main" id="{608C8627-C224-C413-5DA2-0F7CD501D0C1}"/>
+                <a16:creationId xmlns:a16="http://schemas.microsoft.com/office/drawing/2014/main" id="{6EE84C3D-D12A-2859-2464-0561424A57A5}"/>
               </a:ext>
             </a:extLst>
           </p:cNvPr>
-          <p:cNvPicPr>
-            <a:picLocks noGrp="1" noChangeAspect="1"/>
-          </p:cNvPicPr>
+          <p:cNvSpPr>
+            <a:spLocks noGrp="1"/>
+          </p:cNvSpPr>
           <p:nvPr>
             <p:ph sz="half" idx="1"/>
           </p:nvPr>
-        </p:nvPicPr>
-        <p:blipFill>
-          <a:blip r:embed="rId2">
-            <a:extLst>
-              <a:ext uri="{28A0092B-C50C-407E-A947-70E740481C1C}">
-                <a14:useLocalDpi xmlns:a14="http://schemas.microsoft.com/office/drawing/2010/main" val="0"/>
-              </a:ext>
-            </a:extLst>
-          </a:blip>
-          <a:stretch>
-            <a:fillRect/>
-          </a:stretch>
-        </p:blipFill>
-        <p:spPr>
-          <a:xfrm>
-            <a:off x="1376007" y="2286000"/>
-            <a:ext cx="4439361" cy="3581400"/>
-          </a:xfrm>
-        </p:spPr>
-      </p:pic>
-      <p:pic>
-        <p:nvPicPr>
-          <p:cNvPr id="9" name="コンテンツ プレースホルダー 8" descr="グラフ, 棒グラフ&#10;&#10;AI 生成コンテンツは誤りを含む可能性があります。">
+        </p:nvSpPr>
+        <p:spPr/>
+        <p:txBody>
+          <a:bodyPr/>
+          <a:lstStyle/>
+          <a:p>
+            <a:endParaRPr lang="ja-JP" altLang="en-US"/>
+          </a:p>
+        </p:txBody>
+      </p:sp>
+      <p:sp>
+        <p:nvSpPr>
+          <p:cNvPr id="6" name="コンテンツ プレースホルダー 5">
             <a:extLst>
               <a:ext uri="{FF2B5EF4-FFF2-40B4-BE49-F238E27FC236}">
-                <a16:creationId xmlns:a16="http://schemas.microsoft.com/office/drawing/2014/main" id="{B4D58F83-5323-94B8-664D-AF310C78A6EA}"/>
+                <a16:creationId xmlns:a16="http://schemas.microsoft.com/office/drawing/2014/main" id="{10DDD725-1198-1AF2-A8E9-E826956E3992}"/>
               </a:ext>
             </a:extLst>
           </p:cNvPr>
-          <p:cNvPicPr>
-            <a:picLocks noGrp="1" noChangeAspect="1"/>
-          </p:cNvPicPr>
+          <p:cNvSpPr>
+            <a:spLocks noGrp="1"/>
+          </p:cNvSpPr>
           <p:nvPr>
             <p:ph sz="half" idx="2"/>
           </p:nvPr>
-        </p:nvPicPr>
-        <p:blipFill>
-          <a:blip r:embed="rId3">
-            <a:extLst>
-              <a:ext uri="{28A0092B-C50C-407E-A947-70E740481C1C}">
-                <a14:useLocalDpi xmlns:a14="http://schemas.microsoft.com/office/drawing/2010/main" val="0"/>
-              </a:ext>
-            </a:extLst>
-          </a:blip>
-          <a:stretch>
-            <a:fillRect/>
-          </a:stretch>
-        </p:blipFill>
-        <p:spPr>
-          <a:xfrm>
-            <a:off x="6532967" y="2286000"/>
-            <a:ext cx="4431490" cy="3581400"/>
-          </a:xfrm>
-        </p:spPr>
-      </p:pic>
+        </p:nvSpPr>
+        <p:spPr/>
+        <p:txBody>
+          <a:bodyPr/>
+          <a:lstStyle/>
+          <a:p>
+            <a:endParaRPr lang="ja-JP" altLang="en-US"/>
+          </a:p>
+        </p:txBody>
+      </p:sp>
     </p:spTree>
     <p:extLst>
       <p:ext uri="{BB962C8B-B14F-4D97-AF65-F5344CB8AC3E}">

</xml_diff>

<commit_message>
Small Adjustments ### Changes - Adjusted some text in the notebook - Added all figures to Report.tex (see images included in commit) - Added relevant final graphs to powerpoint.
### Todo
- Closing thoughts
- Proofread/get some critique on report.
</commit_message>
<xml_diff>
--- a/P2963116/P2963116_ppt.pptx
+++ b/P2963116/P2963116_ppt.pptx
@@ -4676,31 +4676,41 @@
           </a:p>
         </p:txBody>
       </p:sp>
-      <p:sp>
-        <p:nvSpPr>
-          <p:cNvPr id="3" name="コンテンツ プレースホルダー 2">
+      <p:pic>
+        <p:nvPicPr>
+          <p:cNvPr id="5" name="コンテンツ プレースホルダー 4" descr="グラフ, 折れ線グラフ&#10;&#10;AI 生成コンテンツは誤りを含む可能性があります。">
             <a:extLst>
               <a:ext uri="{FF2B5EF4-FFF2-40B4-BE49-F238E27FC236}">
-                <a16:creationId xmlns:a16="http://schemas.microsoft.com/office/drawing/2014/main" id="{61A88A68-9D7E-59D9-C730-272DA5A36964}"/>
+                <a16:creationId xmlns:a16="http://schemas.microsoft.com/office/drawing/2014/main" id="{50F20051-49EF-079F-7FC7-F646C3C5AFBF}"/>
               </a:ext>
             </a:extLst>
           </p:cNvPr>
-          <p:cNvSpPr>
-            <a:spLocks noGrp="1"/>
-          </p:cNvSpPr>
+          <p:cNvPicPr>
+            <a:picLocks noGrp="1" noChangeAspect="1"/>
+          </p:cNvPicPr>
           <p:nvPr>
             <p:ph idx="1"/>
           </p:nvPr>
-        </p:nvSpPr>
-        <p:spPr/>
-        <p:txBody>
-          <a:bodyPr/>
-          <a:lstStyle/>
-          <a:p>
-            <a:endParaRPr kumimoji="1" lang="ja-JP" altLang="en-US" dirty="0"/>
-          </a:p>
-        </p:txBody>
-      </p:sp>
+        </p:nvPicPr>
+        <p:blipFill>
+          <a:blip r:embed="rId2">
+            <a:extLst>
+              <a:ext uri="{28A0092B-C50C-407E-A947-70E740481C1C}">
+                <a14:useLocalDpi xmlns:a14="http://schemas.microsoft.com/office/drawing/2010/main" val="0"/>
+              </a:ext>
+            </a:extLst>
+          </a:blip>
+          <a:stretch>
+            <a:fillRect/>
+          </a:stretch>
+        </p:blipFill>
+        <p:spPr>
+          <a:xfrm>
+            <a:off x="3541045" y="2286000"/>
+            <a:ext cx="5262310" cy="3581400"/>
+          </a:xfrm>
+        </p:spPr>
+      </p:pic>
     </p:spTree>
     <p:extLst>
       <p:ext uri="{BB962C8B-B14F-4D97-AF65-F5344CB8AC3E}">
@@ -5510,56 +5520,76 @@
           </a:p>
         </p:txBody>
       </p:sp>
-      <p:sp>
-        <p:nvSpPr>
-          <p:cNvPr id="4" name="コンテンツ プレースホルダー 3">
+      <p:pic>
+        <p:nvPicPr>
+          <p:cNvPr id="10" name="コンテンツ プレースホルダー 9" descr="グラフ, 折れ線グラフ&#10;&#10;AI 生成コンテンツは誤りを含む可能性があります。">
             <a:extLst>
               <a:ext uri="{FF2B5EF4-FFF2-40B4-BE49-F238E27FC236}">
-                <a16:creationId xmlns:a16="http://schemas.microsoft.com/office/drawing/2014/main" id="{1BD60C0A-2CE4-6B18-38B2-E434249C9016}"/>
+                <a16:creationId xmlns:a16="http://schemas.microsoft.com/office/drawing/2014/main" id="{26FA4427-E75D-C086-FEB5-E8315A2F5C73}"/>
               </a:ext>
             </a:extLst>
           </p:cNvPr>
-          <p:cNvSpPr>
-            <a:spLocks noGrp="1"/>
-          </p:cNvSpPr>
+          <p:cNvPicPr>
+            <a:picLocks noGrp="1" noChangeAspect="1"/>
+          </p:cNvPicPr>
           <p:nvPr>
             <p:ph sz="half" idx="1"/>
           </p:nvPr>
-        </p:nvSpPr>
-        <p:spPr/>
-        <p:txBody>
-          <a:bodyPr/>
-          <a:lstStyle/>
-          <a:p>
-            <a:endParaRPr lang="ja-JP" altLang="en-US"/>
-          </a:p>
-        </p:txBody>
-      </p:sp>
-      <p:sp>
-        <p:nvSpPr>
-          <p:cNvPr id="6" name="コンテンツ プレースホルダー 5">
+        </p:nvPicPr>
+        <p:blipFill>
+          <a:blip r:embed="rId2">
+            <a:extLst>
+              <a:ext uri="{28A0092B-C50C-407E-A947-70E740481C1C}">
+                <a14:useLocalDpi xmlns:a14="http://schemas.microsoft.com/office/drawing/2010/main" val="0"/>
+              </a:ext>
+            </a:extLst>
+          </a:blip>
+          <a:stretch>
+            <a:fillRect/>
+          </a:stretch>
+        </p:blipFill>
+        <p:spPr>
+          <a:xfrm>
+            <a:off x="1371600" y="2563040"/>
+            <a:ext cx="4448175" cy="3027319"/>
+          </a:xfrm>
+        </p:spPr>
+      </p:pic>
+      <p:pic>
+        <p:nvPicPr>
+          <p:cNvPr id="13" name="コンテンツ プレースホルダー 12" descr="テキスト が含まれている画像&#10;&#10;AI 生成コンテンツは誤りを含む可能性があります。">
             <a:extLst>
               <a:ext uri="{FF2B5EF4-FFF2-40B4-BE49-F238E27FC236}">
-                <a16:creationId xmlns:a16="http://schemas.microsoft.com/office/drawing/2014/main" id="{18E61C90-992C-1D07-7E73-9B813800843B}"/>
+                <a16:creationId xmlns:a16="http://schemas.microsoft.com/office/drawing/2014/main" id="{CB9F198B-7B46-5E57-262C-F36B2AAFAC6F}"/>
               </a:ext>
             </a:extLst>
           </p:cNvPr>
-          <p:cNvSpPr>
-            <a:spLocks noGrp="1"/>
-          </p:cNvSpPr>
+          <p:cNvPicPr>
+            <a:picLocks noGrp="1" noChangeAspect="1"/>
+          </p:cNvPicPr>
           <p:nvPr>
             <p:ph sz="half" idx="2"/>
           </p:nvPr>
-        </p:nvSpPr>
-        <p:spPr/>
-        <p:txBody>
-          <a:bodyPr/>
-          <a:lstStyle/>
-          <a:p>
-            <a:endParaRPr lang="ja-JP" altLang="en-US"/>
-          </a:p>
-        </p:txBody>
-      </p:sp>
+        </p:nvPicPr>
+        <p:blipFill>
+          <a:blip r:embed="rId3">
+            <a:extLst>
+              <a:ext uri="{28A0092B-C50C-407E-A947-70E740481C1C}">
+                <a14:useLocalDpi xmlns:a14="http://schemas.microsoft.com/office/drawing/2010/main" val="0"/>
+              </a:ext>
+            </a:extLst>
+          </a:blip>
+          <a:stretch>
+            <a:fillRect/>
+          </a:stretch>
+        </p:blipFill>
+        <p:spPr>
+          <a:xfrm>
+            <a:off x="6662565" y="2286000"/>
+            <a:ext cx="4172295" cy="3581400"/>
+          </a:xfrm>
+        </p:spPr>
+      </p:pic>
     </p:spTree>
     <p:extLst>
       <p:ext uri="{BB962C8B-B14F-4D97-AF65-F5344CB8AC3E}">
@@ -6384,56 +6414,76 @@
           </a:p>
         </p:txBody>
       </p:sp>
-      <p:sp>
-        <p:nvSpPr>
-          <p:cNvPr id="4" name="コンテンツ プレースホルダー 3">
+      <p:pic>
+        <p:nvPicPr>
+          <p:cNvPr id="10" name="コンテンツ プレースホルダー 9" descr="グラフ, 折れ線グラフ&#10;&#10;AI 生成コンテンツは誤りを含む可能性があります。">
             <a:extLst>
               <a:ext uri="{FF2B5EF4-FFF2-40B4-BE49-F238E27FC236}">
-                <a16:creationId xmlns:a16="http://schemas.microsoft.com/office/drawing/2014/main" id="{FBFD1179-9630-E040-35CD-6506CE97DD96}"/>
+                <a16:creationId xmlns:a16="http://schemas.microsoft.com/office/drawing/2014/main" id="{DDD95C91-B6D3-1881-CB75-CB62B687B055}"/>
               </a:ext>
             </a:extLst>
           </p:cNvPr>
-          <p:cNvSpPr>
-            <a:spLocks noGrp="1"/>
-          </p:cNvSpPr>
+          <p:cNvPicPr>
+            <a:picLocks noGrp="1" noChangeAspect="1"/>
+          </p:cNvPicPr>
           <p:nvPr>
             <p:ph sz="half" idx="1"/>
           </p:nvPr>
-        </p:nvSpPr>
-        <p:spPr/>
-        <p:txBody>
-          <a:bodyPr/>
-          <a:lstStyle/>
-          <a:p>
-            <a:endParaRPr lang="ja-JP" altLang="en-US"/>
-          </a:p>
-        </p:txBody>
-      </p:sp>
-      <p:sp>
-        <p:nvSpPr>
-          <p:cNvPr id="6" name="コンテンツ プレースホルダー 5">
+        </p:nvPicPr>
+        <p:blipFill>
+          <a:blip r:embed="rId2">
+            <a:extLst>
+              <a:ext uri="{28A0092B-C50C-407E-A947-70E740481C1C}">
+                <a14:useLocalDpi xmlns:a14="http://schemas.microsoft.com/office/drawing/2010/main" val="0"/>
+              </a:ext>
+            </a:extLst>
+          </a:blip>
+          <a:stretch>
+            <a:fillRect/>
+          </a:stretch>
+        </p:blipFill>
+        <p:spPr>
+          <a:xfrm>
+            <a:off x="1371600" y="2580266"/>
+            <a:ext cx="4448175" cy="2992868"/>
+          </a:xfrm>
+        </p:spPr>
+      </p:pic>
+      <p:pic>
+        <p:nvPicPr>
+          <p:cNvPr id="12" name="コンテンツ プレースホルダー 11" descr="テキスト が含まれている画像&#10;&#10;AI 生成コンテンツは誤りを含む可能性があります。">
             <a:extLst>
               <a:ext uri="{FF2B5EF4-FFF2-40B4-BE49-F238E27FC236}">
-                <a16:creationId xmlns:a16="http://schemas.microsoft.com/office/drawing/2014/main" id="{1A91333B-19CF-A394-876D-5F12F19FA76F}"/>
+                <a16:creationId xmlns:a16="http://schemas.microsoft.com/office/drawing/2014/main" id="{B6C28BEA-D87F-E7AD-F25A-B14A161C9D84}"/>
               </a:ext>
             </a:extLst>
           </p:cNvPr>
-          <p:cNvSpPr>
-            <a:spLocks noGrp="1"/>
-          </p:cNvSpPr>
+          <p:cNvPicPr>
+            <a:picLocks noGrp="1" noChangeAspect="1"/>
+          </p:cNvPicPr>
           <p:nvPr>
             <p:ph sz="half" idx="2"/>
           </p:nvPr>
-        </p:nvSpPr>
-        <p:spPr/>
-        <p:txBody>
-          <a:bodyPr/>
-          <a:lstStyle/>
-          <a:p>
-            <a:endParaRPr lang="ja-JP" altLang="en-US"/>
-          </a:p>
-        </p:txBody>
-      </p:sp>
+        </p:nvPicPr>
+        <p:blipFill>
+          <a:blip r:embed="rId3">
+            <a:extLst>
+              <a:ext uri="{28A0092B-C50C-407E-A947-70E740481C1C}">
+                <a14:useLocalDpi xmlns:a14="http://schemas.microsoft.com/office/drawing/2010/main" val="0"/>
+              </a:ext>
+            </a:extLst>
+          </a:blip>
+          <a:stretch>
+            <a:fillRect/>
+          </a:stretch>
+        </p:blipFill>
+        <p:spPr>
+          <a:xfrm>
+            <a:off x="6662565" y="2286000"/>
+            <a:ext cx="4172295" cy="3581400"/>
+          </a:xfrm>
+        </p:spPr>
+      </p:pic>
     </p:spTree>
     <p:extLst>
       <p:ext uri="{BB962C8B-B14F-4D97-AF65-F5344CB8AC3E}">
@@ -8234,56 +8284,76 @@
           </a:p>
         </p:txBody>
       </p:sp>
-      <p:sp>
-        <p:nvSpPr>
-          <p:cNvPr id="4" name="コンテンツ プレースホルダー 3">
+      <p:pic>
+        <p:nvPicPr>
+          <p:cNvPr id="10" name="コンテンツ プレースホルダー 9" descr="グラフ, 折れ線グラフ&#10;&#10;AI 生成コンテンツは誤りを含む可能性があります。">
             <a:extLst>
               <a:ext uri="{FF2B5EF4-FFF2-40B4-BE49-F238E27FC236}">
-                <a16:creationId xmlns:a16="http://schemas.microsoft.com/office/drawing/2014/main" id="{D5A41333-EF7C-4189-A23C-AD425B8F5854}"/>
+                <a16:creationId xmlns:a16="http://schemas.microsoft.com/office/drawing/2014/main" id="{07C78D06-155A-F4D3-2D89-D246AF54385C}"/>
               </a:ext>
             </a:extLst>
           </p:cNvPr>
-          <p:cNvSpPr>
-            <a:spLocks noGrp="1"/>
-          </p:cNvSpPr>
+          <p:cNvPicPr>
+            <a:picLocks noGrp="1" noChangeAspect="1"/>
+          </p:cNvPicPr>
           <p:nvPr>
             <p:ph sz="half" idx="1"/>
           </p:nvPr>
-        </p:nvSpPr>
-        <p:spPr/>
-        <p:txBody>
-          <a:bodyPr/>
-          <a:lstStyle/>
-          <a:p>
-            <a:endParaRPr lang="ja-JP" altLang="en-US"/>
-          </a:p>
-        </p:txBody>
-      </p:sp>
-      <p:sp>
-        <p:nvSpPr>
-          <p:cNvPr id="6" name="コンテンツ プレースホルダー 5">
+        </p:nvPicPr>
+        <p:blipFill>
+          <a:blip r:embed="rId2">
+            <a:extLst>
+              <a:ext uri="{28A0092B-C50C-407E-A947-70E740481C1C}">
+                <a14:useLocalDpi xmlns:a14="http://schemas.microsoft.com/office/drawing/2010/main" val="0"/>
+              </a:ext>
+            </a:extLst>
+          </a:blip>
+          <a:stretch>
+            <a:fillRect/>
+          </a:stretch>
+        </p:blipFill>
+        <p:spPr>
+          <a:xfrm>
+            <a:off x="1371600" y="2563040"/>
+            <a:ext cx="4448175" cy="3027319"/>
+          </a:xfrm>
+        </p:spPr>
+      </p:pic>
+      <p:pic>
+        <p:nvPicPr>
+          <p:cNvPr id="12" name="コンテンツ プレースホルダー 11" descr="テキスト が含まれている画像&#10;&#10;AI 生成コンテンツは誤りを含む可能性があります。">
             <a:extLst>
               <a:ext uri="{FF2B5EF4-FFF2-40B4-BE49-F238E27FC236}">
-                <a16:creationId xmlns:a16="http://schemas.microsoft.com/office/drawing/2014/main" id="{F43C5936-EE1B-6595-23FF-B167E25C20CC}"/>
+                <a16:creationId xmlns:a16="http://schemas.microsoft.com/office/drawing/2014/main" id="{8C47CBDD-9D8D-2299-5FAC-C4F5616B1E93}"/>
               </a:ext>
             </a:extLst>
           </p:cNvPr>
-          <p:cNvSpPr>
-            <a:spLocks noGrp="1"/>
-          </p:cNvSpPr>
+          <p:cNvPicPr>
+            <a:picLocks noGrp="1" noChangeAspect="1"/>
+          </p:cNvPicPr>
           <p:nvPr>
             <p:ph sz="half" idx="2"/>
           </p:nvPr>
-        </p:nvSpPr>
-        <p:spPr/>
-        <p:txBody>
-          <a:bodyPr/>
-          <a:lstStyle/>
-          <a:p>
-            <a:endParaRPr lang="ja-JP" altLang="en-US"/>
-          </a:p>
-        </p:txBody>
-      </p:sp>
+        </p:nvPicPr>
+        <p:blipFill>
+          <a:blip r:embed="rId3">
+            <a:extLst>
+              <a:ext uri="{28A0092B-C50C-407E-A947-70E740481C1C}">
+                <a14:useLocalDpi xmlns:a14="http://schemas.microsoft.com/office/drawing/2010/main" val="0"/>
+              </a:ext>
+            </a:extLst>
+          </a:blip>
+          <a:stretch>
+            <a:fillRect/>
+          </a:stretch>
+        </p:blipFill>
+        <p:spPr>
+          <a:xfrm>
+            <a:off x="6662565" y="2286000"/>
+            <a:ext cx="4172295" cy="3581400"/>
+          </a:xfrm>
+        </p:spPr>
+      </p:pic>
     </p:spTree>
     <p:extLst>
       <p:ext uri="{BB962C8B-B14F-4D97-AF65-F5344CB8AC3E}">
@@ -8343,31 +8413,41 @@
           </a:p>
         </p:txBody>
       </p:sp>
-      <p:sp>
-        <p:nvSpPr>
-          <p:cNvPr id="4" name="コンテンツ プレースホルダー 3">
+      <p:pic>
+        <p:nvPicPr>
+          <p:cNvPr id="10" name="コンテンツ プレースホルダー 9" descr="グラフ, 折れ線グラフ&#10;&#10;AI 生成コンテンツは誤りを含む可能性があります。">
             <a:extLst>
               <a:ext uri="{FF2B5EF4-FFF2-40B4-BE49-F238E27FC236}">
-                <a16:creationId xmlns:a16="http://schemas.microsoft.com/office/drawing/2014/main" id="{6EE84C3D-D12A-2859-2464-0561424A57A5}"/>
+                <a16:creationId xmlns:a16="http://schemas.microsoft.com/office/drawing/2014/main" id="{9EB287AF-8088-59D4-9830-BE9F2D4F8F3E}"/>
               </a:ext>
             </a:extLst>
           </p:cNvPr>
-          <p:cNvSpPr>
-            <a:spLocks noGrp="1"/>
-          </p:cNvSpPr>
+          <p:cNvPicPr>
+            <a:picLocks noGrp="1" noChangeAspect="1"/>
+          </p:cNvPicPr>
           <p:nvPr>
             <p:ph sz="half" idx="1"/>
           </p:nvPr>
-        </p:nvSpPr>
-        <p:spPr/>
-        <p:txBody>
-          <a:bodyPr/>
-          <a:lstStyle/>
-          <a:p>
-            <a:endParaRPr lang="ja-JP" altLang="en-US"/>
-          </a:p>
-        </p:txBody>
-      </p:sp>
+        </p:nvPicPr>
+        <p:blipFill>
+          <a:blip r:embed="rId2">
+            <a:extLst>
+              <a:ext uri="{28A0092B-C50C-407E-A947-70E740481C1C}">
+                <a14:useLocalDpi xmlns:a14="http://schemas.microsoft.com/office/drawing/2010/main" val="0"/>
+              </a:ext>
+            </a:extLst>
+          </a:blip>
+          <a:stretch>
+            <a:fillRect/>
+          </a:stretch>
+        </p:blipFill>
+        <p:spPr>
+          <a:xfrm>
+            <a:off x="1371600" y="2558672"/>
+            <a:ext cx="4448175" cy="3036056"/>
+          </a:xfrm>
+        </p:spPr>
+      </p:pic>
       <p:sp>
         <p:nvSpPr>
           <p:cNvPr id="6" name="コンテンツ プレースホルダー 5">

</xml_diff>